<commit_message>
Unidad 2 actualizado 19 jun 2013
</commit_message>
<xml_diff>
--- a/Técnicas de Programación SESIONES UNIDAD 2.pptx
+++ b/Técnicas de Programación SESIONES UNIDAD 2.pptx
@@ -13,6 +13,8 @@
     <p:sldId id="263" r:id="rId7"/>
     <p:sldId id="260" r:id="rId8"/>
     <p:sldId id="264" r:id="rId9"/>
+    <p:sldId id="265" r:id="rId10"/>
+    <p:sldId id="266" r:id="rId11"/>
   </p:sldIdLst>
   <p:sldSz cx="12192000" cy="6858000"/>
   <p:notesSz cx="6858000" cy="9144000"/>
@@ -330,7 +332,7 @@
             <a:fld id="{B61BEF0D-F0BB-DE4B-95CE-6DB70DBA9567}" type="datetimeFigureOut">
               <a:rPr lang="en-US" dirty="0"/>
               <a:pPr/>
-              <a:t>6/18/2013</a:t>
+              <a:t>6/19/2013</a:t>
             </a:fld>
             <a:endParaRPr lang="en-US" dirty="0"/>
           </a:p>
@@ -583,7 +585,7 @@
             <a:fld id="{B61BEF0D-F0BB-DE4B-95CE-6DB70DBA9567}" type="datetimeFigureOut">
               <a:rPr lang="en-US" dirty="0"/>
               <a:pPr/>
-              <a:t>6/18/2013</a:t>
+              <a:t>6/19/2013</a:t>
             </a:fld>
             <a:endParaRPr lang="en-US" dirty="0"/>
           </a:p>
@@ -981,7 +983,7 @@
             <a:fld id="{B61BEF0D-F0BB-DE4B-95CE-6DB70DBA9567}" type="datetimeFigureOut">
               <a:rPr lang="en-US" dirty="0"/>
               <a:pPr/>
-              <a:t>6/18/2013</a:t>
+              <a:t>6/19/2013</a:t>
             </a:fld>
             <a:endParaRPr lang="en-US" dirty="0"/>
           </a:p>
@@ -1314,7 +1316,7 @@
             <a:fld id="{B61BEF0D-F0BB-DE4B-95CE-6DB70DBA9567}" type="datetimeFigureOut">
               <a:rPr lang="en-US" dirty="0"/>
               <a:pPr/>
-              <a:t>6/18/2013</a:t>
+              <a:t>6/19/2013</a:t>
             </a:fld>
             <a:endParaRPr lang="en-US" dirty="0"/>
           </a:p>
@@ -1631,7 +1633,7 @@
             <a:fld id="{B61BEF0D-F0BB-DE4B-95CE-6DB70DBA9567}" type="datetimeFigureOut">
               <a:rPr lang="en-US" dirty="0"/>
               <a:pPr/>
-              <a:t>6/18/2013</a:t>
+              <a:t>6/19/2013</a:t>
             </a:fld>
             <a:endParaRPr lang="en-US" dirty="0"/>
           </a:p>
@@ -2024,7 +2026,7 @@
             <a:fld id="{B61BEF0D-F0BB-DE4B-95CE-6DB70DBA9567}" type="datetimeFigureOut">
               <a:rPr lang="en-US" dirty="0"/>
               <a:pPr/>
-              <a:t>6/18/2013</a:t>
+              <a:t>6/19/2013</a:t>
             </a:fld>
             <a:endParaRPr lang="en-US" dirty="0"/>
           </a:p>
@@ -2278,7 +2280,7 @@
             <a:fld id="{B61BEF0D-F0BB-DE4B-95CE-6DB70DBA9567}" type="datetimeFigureOut">
               <a:rPr lang="en-US" dirty="0"/>
               <a:pPr/>
-              <a:t>6/18/2013</a:t>
+              <a:t>6/19/2013</a:t>
             </a:fld>
             <a:endParaRPr lang="en-US" dirty="0"/>
           </a:p>
@@ -2537,7 +2539,7 @@
             <a:fld id="{B61BEF0D-F0BB-DE4B-95CE-6DB70DBA9567}" type="datetimeFigureOut">
               <a:rPr lang="en-US" dirty="0"/>
               <a:pPr/>
-              <a:t>6/18/2013</a:t>
+              <a:t>6/19/2013</a:t>
             </a:fld>
             <a:endParaRPr lang="en-US" dirty="0"/>
           </a:p>
@@ -2818,7 +2820,7 @@
             <a:fld id="{B61BEF0D-F0BB-DE4B-95CE-6DB70DBA9567}" type="datetimeFigureOut">
               <a:rPr lang="en-US" dirty="0"/>
               <a:pPr/>
-              <a:t>6/18/2013</a:t>
+              <a:t>6/19/2013</a:t>
             </a:fld>
             <a:endParaRPr lang="en-US" dirty="0"/>
           </a:p>
@@ -3062,7 +3064,7 @@
             <a:fld id="{B61BEF0D-F0BB-DE4B-95CE-6DB70DBA9567}" type="datetimeFigureOut">
               <a:rPr lang="en-US" dirty="0"/>
               <a:pPr/>
-              <a:t>6/18/2013</a:t>
+              <a:t>6/19/2013</a:t>
             </a:fld>
             <a:endParaRPr lang="en-US" dirty="0"/>
           </a:p>
@@ -3300,7 +3302,7 @@
             <a:fld id="{B61BEF0D-F0BB-DE4B-95CE-6DB70DBA9567}" type="datetimeFigureOut">
               <a:rPr lang="en-US" dirty="0"/>
               <a:pPr/>
-              <a:t>6/18/2013</a:t>
+              <a:t>6/19/2013</a:t>
             </a:fld>
             <a:endParaRPr lang="en-US" dirty="0"/>
           </a:p>
@@ -3672,7 +3674,7 @@
             <a:fld id="{B61BEF0D-F0BB-DE4B-95CE-6DB70DBA9567}" type="datetimeFigureOut">
               <a:rPr lang="en-US" dirty="0"/>
               <a:pPr/>
-              <a:t>6/18/2013</a:t>
+              <a:t>6/19/2013</a:t>
             </a:fld>
             <a:endParaRPr lang="en-US" dirty="0"/>
           </a:p>
@@ -3792,7 +3794,7 @@
             <a:fld id="{B61BEF0D-F0BB-DE4B-95CE-6DB70DBA9567}" type="datetimeFigureOut">
               <a:rPr lang="en-US" dirty="0"/>
               <a:pPr/>
-              <a:t>6/18/2013</a:t>
+              <a:t>6/19/2013</a:t>
             </a:fld>
             <a:endParaRPr lang="en-US" dirty="0"/>
           </a:p>
@@ -3884,7 +3886,7 @@
             <a:fld id="{B61BEF0D-F0BB-DE4B-95CE-6DB70DBA9567}" type="datetimeFigureOut">
               <a:rPr lang="en-US" dirty="0"/>
               <a:pPr/>
-              <a:t>6/18/2013</a:t>
+              <a:t>6/19/2013</a:t>
             </a:fld>
             <a:endParaRPr lang="en-US" dirty="0"/>
           </a:p>
@@ -4132,7 +4134,7 @@
             <a:fld id="{B61BEF0D-F0BB-DE4B-95CE-6DB70DBA9567}" type="datetimeFigureOut">
               <a:rPr lang="en-US" dirty="0"/>
               <a:pPr/>
-              <a:t>6/18/2013</a:t>
+              <a:t>6/19/2013</a:t>
             </a:fld>
             <a:endParaRPr lang="en-US" dirty="0"/>
           </a:p>
@@ -4392,7 +4394,7 @@
             <a:fld id="{B61BEF0D-F0BB-DE4B-95CE-6DB70DBA9567}" type="datetimeFigureOut">
               <a:rPr lang="en-US" dirty="0"/>
               <a:pPr/>
-              <a:t>6/18/2013</a:t>
+              <a:t>6/19/2013</a:t>
             </a:fld>
             <a:endParaRPr lang="en-US" dirty="0"/>
           </a:p>
@@ -4743,7 +4745,7 @@
             <a:fld id="{B61BEF0D-F0BB-DE4B-95CE-6DB70DBA9567}" type="datetimeFigureOut">
               <a:rPr lang="en-US" dirty="0"/>
               <a:pPr/>
-              <a:t>6/18/2013</a:t>
+              <a:t>6/19/2013</a:t>
             </a:fld>
             <a:endParaRPr lang="en-US" dirty="0"/>
           </a:p>
@@ -5295,11 +5297,7 @@
             </a:br>
             <a:r>
               <a:rPr lang="es-MX" sz="7200" dirty="0" smtClean="0"/>
-              <a:t>UNIDAD </a:t>
-            </a:r>
-            <a:r>
-              <a:rPr lang="es-MX" sz="7200" dirty="0" smtClean="0"/>
-              <a:t>II</a:t>
+              <a:t>UNIDAD II</a:t>
             </a:r>
             <a:endParaRPr lang="es-MX" sz="7200" dirty="0"/>
           </a:p>
@@ -5333,6 +5331,462 @@
     <p:extLst>
       <p:ext uri="{BB962C8B-B14F-4D97-AF65-F5344CB8AC3E}">
         <p14:creationId xmlns:p14="http://schemas.microsoft.com/office/powerpoint/2010/main" val="1663122206"/>
+      </p:ext>
+    </p:extLst>
+  </p:cSld>
+  <p:clrMapOvr>
+    <a:masterClrMapping/>
+  </p:clrMapOvr>
+  <p:timing>
+    <p:tnLst>
+      <p:par>
+        <p:cTn id="1" dur="indefinite" restart="never" nodeType="tmRoot"/>
+      </p:par>
+    </p:tnLst>
+  </p:timing>
+</p:sld>
+</file>
+
+<file path=ppt/slides/slide10.xml><?xml version="1.0" encoding="utf-8"?>
+<p:sld xmlns:a="http://schemas.openxmlformats.org/drawingml/2006/main" xmlns:r="http://schemas.openxmlformats.org/officeDocument/2006/relationships" xmlns:p="http://schemas.openxmlformats.org/presentationml/2006/main">
+  <p:cSld>
+    <p:spTree>
+      <p:nvGrpSpPr>
+        <p:cNvPr id="1" name=""/>
+        <p:cNvGrpSpPr/>
+        <p:nvPr/>
+      </p:nvGrpSpPr>
+      <p:grpSpPr>
+        <a:xfrm>
+          <a:off x="0" y="0"/>
+          <a:ext cx="0" cy="0"/>
+          <a:chOff x="0" y="0"/>
+          <a:chExt cx="0" cy="0"/>
+        </a:xfrm>
+      </p:grpSpPr>
+      <p:sp>
+        <p:nvSpPr>
+          <p:cNvPr id="2" name="Título 1"/>
+          <p:cNvSpPr>
+            <a:spLocks noGrp="1"/>
+          </p:cNvSpPr>
+          <p:nvPr>
+            <p:ph type="title"/>
+          </p:nvPr>
+        </p:nvSpPr>
+        <p:spPr>
+          <a:xfrm>
+            <a:off x="862599" y="525637"/>
+            <a:ext cx="8911687" cy="1280890"/>
+          </a:xfrm>
+        </p:spPr>
+        <p:txBody>
+          <a:bodyPr>
+            <a:noAutofit/>
+          </a:bodyPr>
+          <a:lstStyle/>
+          <a:p>
+            <a:r>
+              <a:rPr lang="es-MX" sz="4400" dirty="0" smtClean="0"/>
+              <a:t>Ciclo do-</a:t>
+            </a:r>
+            <a:r>
+              <a:rPr lang="es-MX" sz="4400" dirty="0" err="1" smtClean="0"/>
+              <a:t>while</a:t>
+            </a:r>
+            <a:endParaRPr lang="es-MX" sz="4400" dirty="0"/>
+          </a:p>
+        </p:txBody>
+      </p:sp>
+      <p:sp>
+        <p:nvSpPr>
+          <p:cNvPr id="3" name="Marcador de contenido 2"/>
+          <p:cNvSpPr>
+            <a:spLocks noGrp="1"/>
+          </p:cNvSpPr>
+          <p:nvPr>
+            <p:ph idx="1"/>
+          </p:nvPr>
+        </p:nvSpPr>
+        <p:spPr>
+          <a:xfrm>
+            <a:off x="862599" y="1489026"/>
+            <a:ext cx="9997659" cy="4835574"/>
+          </a:xfrm>
+        </p:spPr>
+        <p:txBody>
+          <a:bodyPr>
+            <a:normAutofit fontScale="47500" lnSpcReduction="20000"/>
+          </a:bodyPr>
+          <a:lstStyle/>
+          <a:p>
+            <a:pPr marL="0" indent="0">
+              <a:buNone/>
+            </a:pPr>
+            <a:r>
+              <a:rPr lang="es-MX" sz="4400" dirty="0" smtClean="0"/>
+              <a:t>El ciclo do-</a:t>
+            </a:r>
+            <a:r>
+              <a:rPr lang="es-MX" sz="4400" dirty="0" err="1" smtClean="0"/>
+              <a:t>while</a:t>
+            </a:r>
+            <a:r>
+              <a:rPr lang="es-MX" sz="4400" dirty="0"/>
+              <a:t>, que evalúa la condición al final </a:t>
+            </a:r>
+            <a:r>
+              <a:rPr lang="es-MX" sz="4400" dirty="0" smtClean="0"/>
+              <a:t>de cada </a:t>
+            </a:r>
+            <a:r>
+              <a:rPr lang="es-MX" sz="4400" dirty="0"/>
+              <a:t>repetición. </a:t>
+            </a:r>
+            <a:r>
+              <a:rPr lang="es-MX" sz="4400" dirty="0" smtClean="0"/>
+              <a:t>Ejemplo con los números del 1 al 10</a:t>
+            </a:r>
+            <a:endParaRPr lang="es-MX" sz="4400" dirty="0"/>
+          </a:p>
+          <a:p>
+            <a:pPr marL="0" indent="0">
+              <a:spcBef>
+                <a:spcPts val="0"/>
+              </a:spcBef>
+              <a:buNone/>
+            </a:pPr>
+            <a:r>
+              <a:rPr lang="es-MX" sz="4400" dirty="0">
+                <a:latin typeface="Courier New" panose="02070309020205020404" pitchFamily="49" charset="0"/>
+                <a:cs typeface="Courier New" panose="02070309020205020404" pitchFamily="49" charset="0"/>
+              </a:rPr>
+              <a:t>&lt;?</a:t>
+            </a:r>
+            <a:r>
+              <a:rPr lang="es-MX" sz="4400" dirty="0" err="1">
+                <a:latin typeface="Courier New" panose="02070309020205020404" pitchFamily="49" charset="0"/>
+                <a:cs typeface="Courier New" panose="02070309020205020404" pitchFamily="49" charset="0"/>
+              </a:rPr>
+              <a:t>php</a:t>
+            </a:r>
+            <a:endParaRPr lang="es-MX" sz="4400" dirty="0">
+              <a:latin typeface="Courier New" panose="02070309020205020404" pitchFamily="49" charset="0"/>
+              <a:cs typeface="Courier New" panose="02070309020205020404" pitchFamily="49" charset="0"/>
+            </a:endParaRPr>
+          </a:p>
+          <a:p>
+            <a:pPr marL="400050" lvl="1" indent="0">
+              <a:spcBef>
+                <a:spcPts val="0"/>
+              </a:spcBef>
+              <a:buNone/>
+            </a:pPr>
+            <a:r>
+              <a:rPr lang="es-MX" sz="4200" dirty="0" smtClean="0">
+                <a:latin typeface="Courier New" panose="02070309020205020404" pitchFamily="49" charset="0"/>
+                <a:cs typeface="Courier New" panose="02070309020205020404" pitchFamily="49" charset="0"/>
+              </a:rPr>
+              <a:t>// escribe los número del 1 al 10</a:t>
+            </a:r>
+            <a:endParaRPr lang="es-MX" sz="4200" dirty="0">
+              <a:latin typeface="Courier New" panose="02070309020205020404" pitchFamily="49" charset="0"/>
+              <a:cs typeface="Courier New" panose="02070309020205020404" pitchFamily="49" charset="0"/>
+            </a:endParaRPr>
+          </a:p>
+          <a:p>
+            <a:pPr marL="400050" lvl="1" indent="0">
+              <a:spcBef>
+                <a:spcPts val="0"/>
+              </a:spcBef>
+              <a:buNone/>
+            </a:pPr>
+            <a:r>
+              <a:rPr lang="es-MX" sz="4200" dirty="0">
+                <a:latin typeface="Courier New" panose="02070309020205020404" pitchFamily="49" charset="0"/>
+                <a:cs typeface="Courier New" panose="02070309020205020404" pitchFamily="49" charset="0"/>
+              </a:rPr>
+              <a:t>$contador = 1</a:t>
+            </a:r>
+            <a:r>
+              <a:rPr lang="es-MX" sz="4200" dirty="0" smtClean="0">
+                <a:latin typeface="Courier New" panose="02070309020205020404" pitchFamily="49" charset="0"/>
+                <a:cs typeface="Courier New" panose="02070309020205020404" pitchFamily="49" charset="0"/>
+              </a:rPr>
+              <a:t>;</a:t>
+            </a:r>
+          </a:p>
+          <a:p>
+            <a:pPr marL="400050" lvl="1" indent="0">
+              <a:spcBef>
+                <a:spcPts val="0"/>
+              </a:spcBef>
+              <a:buNone/>
+            </a:pPr>
+            <a:r>
+              <a:rPr lang="es-MX" sz="4200" b="1" dirty="0" smtClean="0">
+                <a:latin typeface="Courier New" panose="02070309020205020404" pitchFamily="49" charset="0"/>
+                <a:cs typeface="Courier New" panose="02070309020205020404" pitchFamily="49" charset="0"/>
+              </a:rPr>
+              <a:t>do</a:t>
+            </a:r>
+            <a:endParaRPr lang="es-MX" sz="4200" b="1" dirty="0">
+              <a:latin typeface="Courier New" panose="02070309020205020404" pitchFamily="49" charset="0"/>
+              <a:cs typeface="Courier New" panose="02070309020205020404" pitchFamily="49" charset="0"/>
+            </a:endParaRPr>
+          </a:p>
+          <a:p>
+            <a:pPr marL="400050" lvl="1" indent="0">
+              <a:spcBef>
+                <a:spcPts val="0"/>
+              </a:spcBef>
+              <a:buNone/>
+            </a:pPr>
+            <a:r>
+              <a:rPr lang="es-MX" sz="4200" dirty="0" smtClean="0">
+                <a:latin typeface="Courier New" panose="02070309020205020404" pitchFamily="49" charset="0"/>
+                <a:cs typeface="Courier New" panose="02070309020205020404" pitchFamily="49" charset="0"/>
+              </a:rPr>
+              <a:t>{</a:t>
+            </a:r>
+            <a:endParaRPr lang="es-MX" sz="4200" dirty="0">
+              <a:latin typeface="Courier New" panose="02070309020205020404" pitchFamily="49" charset="0"/>
+              <a:cs typeface="Courier New" panose="02070309020205020404" pitchFamily="49" charset="0"/>
+            </a:endParaRPr>
+          </a:p>
+          <a:p>
+            <a:pPr marL="800100" lvl="2" indent="0">
+              <a:spcBef>
+                <a:spcPts val="0"/>
+              </a:spcBef>
+              <a:buNone/>
+            </a:pPr>
+            <a:r>
+              <a:rPr lang="es-MX" sz="4000" dirty="0">
+                <a:latin typeface="Courier New" panose="02070309020205020404" pitchFamily="49" charset="0"/>
+                <a:cs typeface="Courier New" panose="02070309020205020404" pitchFamily="49" charset="0"/>
+              </a:rPr>
+              <a:t>e</a:t>
+            </a:r>
+            <a:r>
+              <a:rPr lang="es-MX" sz="4000" dirty="0" smtClean="0">
+                <a:latin typeface="Courier New" panose="02070309020205020404" pitchFamily="49" charset="0"/>
+                <a:cs typeface="Courier New" panose="02070309020205020404" pitchFamily="49" charset="0"/>
+              </a:rPr>
+              <a:t>cho '$contador';</a:t>
+            </a:r>
+            <a:endParaRPr lang="es-MX" sz="4000" dirty="0">
+              <a:latin typeface="Courier New" panose="02070309020205020404" pitchFamily="49" charset="0"/>
+              <a:cs typeface="Courier New" panose="02070309020205020404" pitchFamily="49" charset="0"/>
+            </a:endParaRPr>
+          </a:p>
+          <a:p>
+            <a:pPr marL="800100" lvl="2" indent="0">
+              <a:spcBef>
+                <a:spcPts val="0"/>
+              </a:spcBef>
+              <a:buNone/>
+            </a:pPr>
+            <a:r>
+              <a:rPr lang="es-MX" sz="4000" dirty="0">
+                <a:latin typeface="Courier New" panose="02070309020205020404" pitchFamily="49" charset="0"/>
+                <a:cs typeface="Courier New" panose="02070309020205020404" pitchFamily="49" charset="0"/>
+              </a:rPr>
+              <a:t>$contador++;</a:t>
+            </a:r>
+          </a:p>
+          <a:p>
+            <a:pPr marL="400050" lvl="1" indent="0">
+              <a:spcBef>
+                <a:spcPts val="0"/>
+              </a:spcBef>
+              <a:buNone/>
+            </a:pPr>
+            <a:r>
+              <a:rPr lang="es-MX" sz="4200" dirty="0" smtClean="0">
+                <a:latin typeface="Courier New" panose="02070309020205020404" pitchFamily="49" charset="0"/>
+                <a:cs typeface="Courier New" panose="02070309020205020404" pitchFamily="49" charset="0"/>
+              </a:rPr>
+              <a:t>}</a:t>
+            </a:r>
+            <a:r>
+              <a:rPr lang="es-MX" sz="4200" dirty="0">
+                <a:latin typeface="Courier New" panose="02070309020205020404" pitchFamily="49" charset="0"/>
+                <a:cs typeface="Courier New" panose="02070309020205020404" pitchFamily="49" charset="0"/>
+              </a:rPr>
+              <a:t> </a:t>
+            </a:r>
+            <a:r>
+              <a:rPr lang="es-MX" sz="4200" b="1" dirty="0" err="1">
+                <a:latin typeface="Courier New" panose="02070309020205020404" pitchFamily="49" charset="0"/>
+                <a:cs typeface="Courier New" panose="02070309020205020404" pitchFamily="49" charset="0"/>
+              </a:rPr>
+              <a:t>while</a:t>
+            </a:r>
+            <a:r>
+              <a:rPr lang="es-MX" sz="4200" dirty="0">
+                <a:latin typeface="Courier New" panose="02070309020205020404" pitchFamily="49" charset="0"/>
+                <a:cs typeface="Courier New" panose="02070309020205020404" pitchFamily="49" charset="0"/>
+              </a:rPr>
+              <a:t> ($contador &lt;= 10</a:t>
+            </a:r>
+            <a:r>
+              <a:rPr lang="es-MX" sz="4200" dirty="0" smtClean="0">
+                <a:latin typeface="Courier New" panose="02070309020205020404" pitchFamily="49" charset="0"/>
+                <a:cs typeface="Courier New" panose="02070309020205020404" pitchFamily="49" charset="0"/>
+              </a:rPr>
+              <a:t>);</a:t>
+            </a:r>
+          </a:p>
+          <a:p>
+            <a:pPr marL="400050" lvl="1" indent="0">
+              <a:spcBef>
+                <a:spcPts val="0"/>
+              </a:spcBef>
+              <a:buNone/>
+            </a:pPr>
+            <a:r>
+              <a:rPr lang="es-MX" sz="4200" dirty="0" smtClean="0">
+                <a:latin typeface="Courier New" panose="02070309020205020404" pitchFamily="49" charset="0"/>
+                <a:cs typeface="Courier New" panose="02070309020205020404" pitchFamily="49" charset="0"/>
+              </a:rPr>
+              <a:t>echo “Hemos terminado”;</a:t>
+            </a:r>
+            <a:endParaRPr lang="es-MX" sz="4200" dirty="0">
+              <a:latin typeface="Courier New" panose="02070309020205020404" pitchFamily="49" charset="0"/>
+              <a:cs typeface="Courier New" panose="02070309020205020404" pitchFamily="49" charset="0"/>
+            </a:endParaRPr>
+          </a:p>
+          <a:p>
+            <a:pPr marL="0" indent="0">
+              <a:spcBef>
+                <a:spcPts val="0"/>
+              </a:spcBef>
+              <a:buNone/>
+            </a:pPr>
+            <a:r>
+              <a:rPr lang="es-MX" sz="4400" dirty="0" smtClean="0">
+                <a:latin typeface="Courier New" panose="02070309020205020404" pitchFamily="49" charset="0"/>
+                <a:cs typeface="Courier New" panose="02070309020205020404" pitchFamily="49" charset="0"/>
+              </a:rPr>
+              <a:t>?&gt;</a:t>
+            </a:r>
+          </a:p>
+          <a:p>
+            <a:pPr marL="0" indent="0">
+              <a:spcBef>
+                <a:spcPts val="0"/>
+              </a:spcBef>
+              <a:buNone/>
+            </a:pPr>
+            <a:endParaRPr lang="es-MX" sz="4400" dirty="0">
+              <a:latin typeface="Courier New" panose="02070309020205020404" pitchFamily="49" charset="0"/>
+              <a:cs typeface="Courier New" panose="02070309020205020404" pitchFamily="49" charset="0"/>
+            </a:endParaRPr>
+          </a:p>
+          <a:p>
+            <a:pPr marL="0" indent="0">
+              <a:buNone/>
+            </a:pPr>
+            <a:r>
+              <a:rPr lang="es-MX" sz="4400" dirty="0" smtClean="0"/>
+              <a:t>La principal diferencia con los ciclos </a:t>
+            </a:r>
+            <a:r>
+              <a:rPr lang="es-MX" sz="4400" b="1" dirty="0" err="1" smtClean="0"/>
+              <a:t>while</a:t>
+            </a:r>
+            <a:r>
+              <a:rPr lang="es-MX" sz="4400" dirty="0" smtClean="0"/>
+              <a:t> y </a:t>
+            </a:r>
+            <a:r>
+              <a:rPr lang="es-MX" sz="4400" b="1" dirty="0" smtClean="0"/>
+              <a:t>do-</a:t>
+            </a:r>
+            <a:r>
+              <a:rPr lang="es-MX" sz="4400" b="1" dirty="0" err="1" smtClean="0"/>
+              <a:t>while</a:t>
+            </a:r>
+            <a:r>
+              <a:rPr lang="es-MX" sz="4400" dirty="0" smtClean="0"/>
+              <a:t>, en primer caso </a:t>
+            </a:r>
+            <a:r>
+              <a:rPr lang="es-MX" sz="4400" b="1" dirty="0" err="1"/>
+              <a:t>while</a:t>
+            </a:r>
+            <a:r>
+              <a:rPr lang="es-MX" sz="4400" dirty="0"/>
+              <a:t>, si la expresión condicional es </a:t>
+            </a:r>
+            <a:r>
+              <a:rPr lang="es-MX" sz="4400" dirty="0" smtClean="0"/>
+              <a:t>falsa en </a:t>
+            </a:r>
+            <a:r>
+              <a:rPr lang="es-MX" sz="4400" dirty="0"/>
+              <a:t>la primera pasada, el </a:t>
+            </a:r>
+            <a:r>
+              <a:rPr lang="es-MX" sz="4400" dirty="0" smtClean="0"/>
+              <a:t>ciclo nunca </a:t>
+            </a:r>
+            <a:r>
+              <a:rPr lang="es-MX" sz="4400" dirty="0"/>
+              <a:t>se ejecutará. En cambio, el </a:t>
+            </a:r>
+            <a:r>
+              <a:rPr lang="es-MX" sz="4400" dirty="0" smtClean="0"/>
+              <a:t>ciclo </a:t>
+            </a:r>
+            <a:r>
+              <a:rPr lang="es-MX" sz="4400" b="1" dirty="0" smtClean="0"/>
+              <a:t>do-</a:t>
+            </a:r>
+            <a:r>
+              <a:rPr lang="es-MX" sz="4400" b="1" dirty="0" err="1" smtClean="0"/>
+              <a:t>while</a:t>
+            </a:r>
+            <a:r>
+              <a:rPr lang="es-MX" sz="4400" dirty="0" smtClean="0"/>
+              <a:t> </a:t>
+            </a:r>
+            <a:r>
+              <a:rPr lang="es-MX" sz="4400" dirty="0"/>
+              <a:t>siempre </a:t>
+            </a:r>
+            <a:r>
+              <a:rPr lang="es-MX" sz="4400" dirty="0" smtClean="0"/>
+              <a:t>se ejecutará </a:t>
+            </a:r>
+            <a:r>
+              <a:rPr lang="es-MX" sz="4400" dirty="0"/>
+              <a:t>por lo menos una vez, aunque la expresión condicional sea falsa, porque la </a:t>
+            </a:r>
+            <a:r>
+              <a:rPr lang="es-MX" sz="4400" dirty="0" smtClean="0"/>
+              <a:t>condición se </a:t>
+            </a:r>
+            <a:r>
+              <a:rPr lang="es-MX" sz="4400" dirty="0"/>
+              <a:t>evalúa al final de la repetición del </a:t>
+            </a:r>
+            <a:r>
+              <a:rPr lang="es-MX" sz="4400" dirty="0" smtClean="0"/>
+              <a:t>ciclo y </a:t>
+            </a:r>
+            <a:r>
+              <a:rPr lang="es-MX" sz="4400" dirty="0"/>
+              <a:t>no al principio.</a:t>
+            </a:r>
+          </a:p>
+        </p:txBody>
+      </p:sp>
+    </p:spTree>
+    <p:extLst>
+      <p:ext uri="{BB962C8B-B14F-4D97-AF65-F5344CB8AC3E}">
+        <p14:creationId xmlns:p14="http://schemas.microsoft.com/office/powerpoint/2010/main" val="812291226"/>
       </p:ext>
     </p:extLst>
   </p:cSld>
@@ -7514,6 +7968,407 @@
     <p:bldLst>
       <p:bldP spid="5" grpId="0"/>
     </p:bldLst>
+  </p:timing>
+</p:sld>
+</file>
+
+<file path=ppt/slides/slide9.xml><?xml version="1.0" encoding="utf-8"?>
+<p:sld xmlns:a="http://schemas.openxmlformats.org/drawingml/2006/main" xmlns:r="http://schemas.openxmlformats.org/officeDocument/2006/relationships" xmlns:p="http://schemas.openxmlformats.org/presentationml/2006/main">
+  <p:cSld>
+    <p:spTree>
+      <p:nvGrpSpPr>
+        <p:cNvPr id="1" name=""/>
+        <p:cNvGrpSpPr/>
+        <p:nvPr/>
+      </p:nvGrpSpPr>
+      <p:grpSpPr>
+        <a:xfrm>
+          <a:off x="0" y="0"/>
+          <a:ext cx="0" cy="0"/>
+          <a:chOff x="0" y="0"/>
+          <a:chExt cx="0" cy="0"/>
+        </a:xfrm>
+      </p:grpSpPr>
+      <p:sp>
+        <p:nvSpPr>
+          <p:cNvPr id="2" name="Título 1"/>
+          <p:cNvSpPr>
+            <a:spLocks noGrp="1"/>
+          </p:cNvSpPr>
+          <p:nvPr>
+            <p:ph type="title"/>
+          </p:nvPr>
+        </p:nvSpPr>
+        <p:spPr>
+          <a:xfrm>
+            <a:off x="862599" y="525637"/>
+            <a:ext cx="8911687" cy="1280890"/>
+          </a:xfrm>
+        </p:spPr>
+        <p:txBody>
+          <a:bodyPr>
+            <a:noAutofit/>
+          </a:bodyPr>
+          <a:lstStyle/>
+          <a:p>
+            <a:r>
+              <a:rPr lang="es-MX" sz="4400" dirty="0" smtClean="0"/>
+              <a:t>Ciclo </a:t>
+            </a:r>
+            <a:r>
+              <a:rPr lang="es-MX" sz="4400" dirty="0" err="1" smtClean="0"/>
+              <a:t>while</a:t>
+            </a:r>
+            <a:endParaRPr lang="es-MX" sz="4400" dirty="0"/>
+          </a:p>
+        </p:txBody>
+      </p:sp>
+      <p:sp>
+        <p:nvSpPr>
+          <p:cNvPr id="3" name="Marcador de contenido 2"/>
+          <p:cNvSpPr>
+            <a:spLocks noGrp="1"/>
+          </p:cNvSpPr>
+          <p:nvPr>
+            <p:ph idx="1"/>
+          </p:nvPr>
+        </p:nvSpPr>
+        <p:spPr>
+          <a:xfrm>
+            <a:off x="862599" y="1489026"/>
+            <a:ext cx="9997659" cy="4481731"/>
+          </a:xfrm>
+        </p:spPr>
+        <p:txBody>
+          <a:bodyPr>
+            <a:normAutofit fontScale="47500" lnSpcReduction="20000"/>
+          </a:bodyPr>
+          <a:lstStyle/>
+          <a:p>
+            <a:pPr marL="0" indent="0">
+              <a:spcBef>
+                <a:spcPts val="0"/>
+              </a:spcBef>
+              <a:buNone/>
+            </a:pPr>
+            <a:r>
+              <a:rPr lang="es-MX" sz="4400" dirty="0" smtClean="0"/>
+              <a:t>El ciclo </a:t>
+            </a:r>
+            <a:r>
+              <a:rPr lang="es-MX" sz="4400" dirty="0" err="1" smtClean="0"/>
+              <a:t>while</a:t>
+            </a:r>
+            <a:r>
+              <a:rPr lang="es-MX" sz="4400" dirty="0"/>
+              <a:t> </a:t>
+            </a:r>
+            <a:r>
+              <a:rPr lang="es-MX" sz="4400" dirty="0" smtClean="0"/>
+              <a:t> </a:t>
+            </a:r>
+            <a:r>
+              <a:rPr lang="es-MX" sz="4400" dirty="0"/>
+              <a:t>se repite continuamente mientras </a:t>
+            </a:r>
+            <a:r>
+              <a:rPr lang="es-MX" sz="4400" dirty="0" smtClean="0"/>
+              <a:t>una condición </a:t>
+            </a:r>
+            <a:r>
+              <a:rPr lang="es-MX" sz="4400" dirty="0"/>
+              <a:t>específica sea verdadera. A continuación </a:t>
+            </a:r>
+            <a:r>
+              <a:rPr lang="es-MX" sz="4400" dirty="0" smtClean="0"/>
+              <a:t>un </a:t>
+            </a:r>
+            <a:r>
+              <a:rPr lang="es-MX" sz="4400" dirty="0"/>
+              <a:t>ejemplo, que utiliza </a:t>
+            </a:r>
+            <a:r>
+              <a:rPr lang="es-MX" sz="4400" dirty="0" smtClean="0"/>
+              <a:t>un ciclo </a:t>
+            </a:r>
+            <a:r>
+              <a:rPr lang="es-MX" sz="4400" dirty="0" err="1" smtClean="0"/>
+              <a:t>while</a:t>
+            </a:r>
+            <a:r>
+              <a:rPr lang="es-MX" sz="4400" dirty="0" smtClean="0"/>
+              <a:t> para </a:t>
+            </a:r>
+            <a:r>
+              <a:rPr lang="es-MX" sz="4400" dirty="0"/>
+              <a:t>escribir </a:t>
+            </a:r>
+            <a:r>
+              <a:rPr lang="es-MX" sz="4400" dirty="0" smtClean="0"/>
+              <a:t>los número del 1 al 10.</a:t>
+            </a:r>
+          </a:p>
+          <a:p>
+            <a:pPr marL="0" indent="0">
+              <a:spcBef>
+                <a:spcPts val="0"/>
+              </a:spcBef>
+              <a:buNone/>
+            </a:pPr>
+            <a:endParaRPr lang="es-MX" sz="4400" dirty="0"/>
+          </a:p>
+          <a:p>
+            <a:pPr marL="0" indent="0">
+              <a:spcBef>
+                <a:spcPts val="0"/>
+              </a:spcBef>
+              <a:buNone/>
+            </a:pPr>
+            <a:r>
+              <a:rPr lang="es-MX" sz="4400" dirty="0">
+                <a:latin typeface="Courier New" panose="02070309020205020404" pitchFamily="49" charset="0"/>
+                <a:cs typeface="Courier New" panose="02070309020205020404" pitchFamily="49" charset="0"/>
+              </a:rPr>
+              <a:t>&lt;?</a:t>
+            </a:r>
+            <a:r>
+              <a:rPr lang="es-MX" sz="4400" dirty="0" err="1">
+                <a:latin typeface="Courier New" panose="02070309020205020404" pitchFamily="49" charset="0"/>
+                <a:cs typeface="Courier New" panose="02070309020205020404" pitchFamily="49" charset="0"/>
+              </a:rPr>
+              <a:t>php</a:t>
+            </a:r>
+            <a:endParaRPr lang="es-MX" sz="4400" dirty="0">
+              <a:latin typeface="Courier New" panose="02070309020205020404" pitchFamily="49" charset="0"/>
+              <a:cs typeface="Courier New" panose="02070309020205020404" pitchFamily="49" charset="0"/>
+            </a:endParaRPr>
+          </a:p>
+          <a:p>
+            <a:pPr marL="400050" lvl="1" indent="0">
+              <a:spcBef>
+                <a:spcPts val="0"/>
+              </a:spcBef>
+              <a:buNone/>
+            </a:pPr>
+            <a:r>
+              <a:rPr lang="es-MX" sz="4200" dirty="0" smtClean="0">
+                <a:latin typeface="Courier New" panose="02070309020205020404" pitchFamily="49" charset="0"/>
+                <a:cs typeface="Courier New" panose="02070309020205020404" pitchFamily="49" charset="0"/>
+              </a:rPr>
+              <a:t>// escribe los número del 1 al 10</a:t>
+            </a:r>
+            <a:endParaRPr lang="es-MX" sz="4200" dirty="0">
+              <a:latin typeface="Courier New" panose="02070309020205020404" pitchFamily="49" charset="0"/>
+              <a:cs typeface="Courier New" panose="02070309020205020404" pitchFamily="49" charset="0"/>
+            </a:endParaRPr>
+          </a:p>
+          <a:p>
+            <a:pPr marL="400050" lvl="1" indent="0">
+              <a:spcBef>
+                <a:spcPts val="0"/>
+              </a:spcBef>
+              <a:buNone/>
+            </a:pPr>
+            <a:r>
+              <a:rPr lang="es-MX" sz="4200" dirty="0">
+                <a:latin typeface="Courier New" panose="02070309020205020404" pitchFamily="49" charset="0"/>
+                <a:cs typeface="Courier New" panose="02070309020205020404" pitchFamily="49" charset="0"/>
+              </a:rPr>
+              <a:t>$contador = 1;</a:t>
+            </a:r>
+          </a:p>
+          <a:p>
+            <a:pPr marL="400050" lvl="1" indent="0">
+              <a:spcBef>
+                <a:spcPts val="0"/>
+              </a:spcBef>
+              <a:buNone/>
+            </a:pPr>
+            <a:r>
+              <a:rPr lang="es-MX" sz="4200" b="1" dirty="0" err="1">
+                <a:latin typeface="Courier New" panose="02070309020205020404" pitchFamily="49" charset="0"/>
+                <a:cs typeface="Courier New" panose="02070309020205020404" pitchFamily="49" charset="0"/>
+              </a:rPr>
+              <a:t>while</a:t>
+            </a:r>
+            <a:r>
+              <a:rPr lang="es-MX" sz="4200" dirty="0">
+                <a:latin typeface="Courier New" panose="02070309020205020404" pitchFamily="49" charset="0"/>
+                <a:cs typeface="Courier New" panose="02070309020205020404" pitchFamily="49" charset="0"/>
+              </a:rPr>
+              <a:t> ($contador </a:t>
+            </a:r>
+            <a:r>
+              <a:rPr lang="es-MX" sz="4200" dirty="0" smtClean="0">
+                <a:latin typeface="Courier New" panose="02070309020205020404" pitchFamily="49" charset="0"/>
+                <a:cs typeface="Courier New" panose="02070309020205020404" pitchFamily="49" charset="0"/>
+              </a:rPr>
+              <a:t>&lt;= </a:t>
+            </a:r>
+            <a:r>
+              <a:rPr lang="es-MX" sz="4200" dirty="0">
+                <a:latin typeface="Courier New" panose="02070309020205020404" pitchFamily="49" charset="0"/>
+                <a:cs typeface="Courier New" panose="02070309020205020404" pitchFamily="49" charset="0"/>
+              </a:rPr>
+              <a:t>10) {</a:t>
+            </a:r>
+          </a:p>
+          <a:p>
+            <a:pPr marL="800100" lvl="2" indent="0">
+              <a:spcBef>
+                <a:spcPts val="0"/>
+              </a:spcBef>
+              <a:buNone/>
+            </a:pPr>
+            <a:r>
+              <a:rPr lang="es-MX" sz="4000" dirty="0">
+                <a:latin typeface="Courier New" panose="02070309020205020404" pitchFamily="49" charset="0"/>
+                <a:cs typeface="Courier New" panose="02070309020205020404" pitchFamily="49" charset="0"/>
+              </a:rPr>
+              <a:t>e</a:t>
+            </a:r>
+            <a:r>
+              <a:rPr lang="es-MX" sz="4000" dirty="0" smtClean="0">
+                <a:latin typeface="Courier New" panose="02070309020205020404" pitchFamily="49" charset="0"/>
+                <a:cs typeface="Courier New" panose="02070309020205020404" pitchFamily="49" charset="0"/>
+              </a:rPr>
+              <a:t>cho '$contador';</a:t>
+            </a:r>
+            <a:endParaRPr lang="es-MX" sz="4000" dirty="0">
+              <a:latin typeface="Courier New" panose="02070309020205020404" pitchFamily="49" charset="0"/>
+              <a:cs typeface="Courier New" panose="02070309020205020404" pitchFamily="49" charset="0"/>
+            </a:endParaRPr>
+          </a:p>
+          <a:p>
+            <a:pPr marL="800100" lvl="2" indent="0">
+              <a:spcBef>
+                <a:spcPts val="0"/>
+              </a:spcBef>
+              <a:buNone/>
+            </a:pPr>
+            <a:r>
+              <a:rPr lang="es-MX" sz="4000" dirty="0">
+                <a:latin typeface="Courier New" panose="02070309020205020404" pitchFamily="49" charset="0"/>
+                <a:cs typeface="Courier New" panose="02070309020205020404" pitchFamily="49" charset="0"/>
+              </a:rPr>
+              <a:t>$contador++;</a:t>
+            </a:r>
+          </a:p>
+          <a:p>
+            <a:pPr marL="400050" lvl="1" indent="0">
+              <a:spcBef>
+                <a:spcPts val="0"/>
+              </a:spcBef>
+              <a:buNone/>
+            </a:pPr>
+            <a:r>
+              <a:rPr lang="es-MX" sz="4200" dirty="0" smtClean="0">
+                <a:latin typeface="Courier New" panose="02070309020205020404" pitchFamily="49" charset="0"/>
+                <a:cs typeface="Courier New" panose="02070309020205020404" pitchFamily="49" charset="0"/>
+              </a:rPr>
+              <a:t>}</a:t>
+            </a:r>
+          </a:p>
+          <a:p>
+            <a:pPr marL="400050" lvl="1" indent="0">
+              <a:spcBef>
+                <a:spcPts val="0"/>
+              </a:spcBef>
+              <a:buNone/>
+            </a:pPr>
+            <a:r>
+              <a:rPr lang="es-MX" sz="4200" dirty="0" smtClean="0">
+                <a:latin typeface="Courier New" panose="02070309020205020404" pitchFamily="49" charset="0"/>
+                <a:cs typeface="Courier New" panose="02070309020205020404" pitchFamily="49" charset="0"/>
+              </a:rPr>
+              <a:t>echo “Hemos terminado”;</a:t>
+            </a:r>
+            <a:endParaRPr lang="es-MX" sz="4200" dirty="0">
+              <a:latin typeface="Courier New" panose="02070309020205020404" pitchFamily="49" charset="0"/>
+              <a:cs typeface="Courier New" panose="02070309020205020404" pitchFamily="49" charset="0"/>
+            </a:endParaRPr>
+          </a:p>
+          <a:p>
+            <a:pPr marL="0" indent="0">
+              <a:spcBef>
+                <a:spcPts val="0"/>
+              </a:spcBef>
+              <a:buNone/>
+            </a:pPr>
+            <a:r>
+              <a:rPr lang="es-MX" sz="4400" dirty="0" smtClean="0">
+                <a:latin typeface="Courier New" panose="02070309020205020404" pitchFamily="49" charset="0"/>
+                <a:cs typeface="Courier New" panose="02070309020205020404" pitchFamily="49" charset="0"/>
+              </a:rPr>
+              <a:t>?&gt;</a:t>
+            </a:r>
+          </a:p>
+          <a:p>
+            <a:pPr marL="0" indent="0">
+              <a:spcBef>
+                <a:spcPts val="0"/>
+              </a:spcBef>
+              <a:buNone/>
+            </a:pPr>
+            <a:endParaRPr lang="es-MX" sz="4400" dirty="0">
+              <a:latin typeface="Courier New" panose="02070309020205020404" pitchFamily="49" charset="0"/>
+              <a:cs typeface="Courier New" panose="02070309020205020404" pitchFamily="49" charset="0"/>
+            </a:endParaRPr>
+          </a:p>
+          <a:p>
+            <a:pPr marL="0" indent="0">
+              <a:spcBef>
+                <a:spcPts val="0"/>
+              </a:spcBef>
+              <a:buNone/>
+            </a:pPr>
+            <a:r>
+              <a:rPr lang="es-MX" sz="4400" dirty="0"/>
+              <a:t>Observa la condición encerrada entre paréntesis: mientras sea verdadera, se ejecutará </a:t>
+            </a:r>
+            <a:r>
+              <a:rPr lang="es-MX" sz="4400" dirty="0" smtClean="0"/>
+              <a:t>el código </a:t>
+            </a:r>
+            <a:r>
+              <a:rPr lang="es-MX" sz="4400" dirty="0"/>
+              <a:t>entre las llaves. En cuanto la condición sea falsa, el </a:t>
+            </a:r>
+            <a:r>
+              <a:rPr lang="es-MX" sz="4400" dirty="0" smtClean="0"/>
+              <a:t>ciclo se </a:t>
+            </a:r>
+            <a:r>
+              <a:rPr lang="es-MX" sz="4400" dirty="0"/>
+              <a:t>detiene y las líneas que </a:t>
+            </a:r>
+            <a:r>
+              <a:rPr lang="es-MX" sz="4400" dirty="0" smtClean="0"/>
+              <a:t>le siguen </a:t>
+            </a:r>
+            <a:r>
+              <a:rPr lang="es-MX" sz="4400" dirty="0"/>
+              <a:t>se ejecutan de la manera usual.</a:t>
+            </a:r>
+          </a:p>
+        </p:txBody>
+      </p:sp>
+    </p:spTree>
+    <p:extLst>
+      <p:ext uri="{BB962C8B-B14F-4D97-AF65-F5344CB8AC3E}">
+        <p14:creationId xmlns:p14="http://schemas.microsoft.com/office/powerpoint/2010/main" val="3521697758"/>
+      </p:ext>
+    </p:extLst>
+  </p:cSld>
+  <p:clrMapOvr>
+    <a:masterClrMapping/>
+  </p:clrMapOvr>
+  <p:timing>
+    <p:tnLst>
+      <p:par>
+        <p:cTn id="1" dur="indefinite" restart="never" nodeType="tmRoot"/>
+      </p:par>
+    </p:tnLst>
   </p:timing>
 </p:sld>
 </file>

</xml_diff>

<commit_message>
Revert "Unidad 2 actualizado 19 jun 2013"
This reverts commit 759e26abbe55fb99546a9a333f8ad94ddf1694ef.
</commit_message>
<xml_diff>
--- a/Técnicas de Programación SESIONES UNIDAD 2.pptx
+++ b/Técnicas de Programación SESIONES UNIDAD 2.pptx
@@ -13,8 +13,6 @@
     <p:sldId id="263" r:id="rId7"/>
     <p:sldId id="260" r:id="rId8"/>
     <p:sldId id="264" r:id="rId9"/>
-    <p:sldId id="265" r:id="rId10"/>
-    <p:sldId id="266" r:id="rId11"/>
   </p:sldIdLst>
   <p:sldSz cx="12192000" cy="6858000"/>
   <p:notesSz cx="6858000" cy="9144000"/>
@@ -332,7 +330,7 @@
             <a:fld id="{B61BEF0D-F0BB-DE4B-95CE-6DB70DBA9567}" type="datetimeFigureOut">
               <a:rPr lang="en-US" dirty="0"/>
               <a:pPr/>
-              <a:t>6/19/2013</a:t>
+              <a:t>6/18/2013</a:t>
             </a:fld>
             <a:endParaRPr lang="en-US" dirty="0"/>
           </a:p>
@@ -585,7 +583,7 @@
             <a:fld id="{B61BEF0D-F0BB-DE4B-95CE-6DB70DBA9567}" type="datetimeFigureOut">
               <a:rPr lang="en-US" dirty="0"/>
               <a:pPr/>
-              <a:t>6/19/2013</a:t>
+              <a:t>6/18/2013</a:t>
             </a:fld>
             <a:endParaRPr lang="en-US" dirty="0"/>
           </a:p>
@@ -983,7 +981,7 @@
             <a:fld id="{B61BEF0D-F0BB-DE4B-95CE-6DB70DBA9567}" type="datetimeFigureOut">
               <a:rPr lang="en-US" dirty="0"/>
               <a:pPr/>
-              <a:t>6/19/2013</a:t>
+              <a:t>6/18/2013</a:t>
             </a:fld>
             <a:endParaRPr lang="en-US" dirty="0"/>
           </a:p>
@@ -1316,7 +1314,7 @@
             <a:fld id="{B61BEF0D-F0BB-DE4B-95CE-6DB70DBA9567}" type="datetimeFigureOut">
               <a:rPr lang="en-US" dirty="0"/>
               <a:pPr/>
-              <a:t>6/19/2013</a:t>
+              <a:t>6/18/2013</a:t>
             </a:fld>
             <a:endParaRPr lang="en-US" dirty="0"/>
           </a:p>
@@ -1633,7 +1631,7 @@
             <a:fld id="{B61BEF0D-F0BB-DE4B-95CE-6DB70DBA9567}" type="datetimeFigureOut">
               <a:rPr lang="en-US" dirty="0"/>
               <a:pPr/>
-              <a:t>6/19/2013</a:t>
+              <a:t>6/18/2013</a:t>
             </a:fld>
             <a:endParaRPr lang="en-US" dirty="0"/>
           </a:p>
@@ -2026,7 +2024,7 @@
             <a:fld id="{B61BEF0D-F0BB-DE4B-95CE-6DB70DBA9567}" type="datetimeFigureOut">
               <a:rPr lang="en-US" dirty="0"/>
               <a:pPr/>
-              <a:t>6/19/2013</a:t>
+              <a:t>6/18/2013</a:t>
             </a:fld>
             <a:endParaRPr lang="en-US" dirty="0"/>
           </a:p>
@@ -2280,7 +2278,7 @@
             <a:fld id="{B61BEF0D-F0BB-DE4B-95CE-6DB70DBA9567}" type="datetimeFigureOut">
               <a:rPr lang="en-US" dirty="0"/>
               <a:pPr/>
-              <a:t>6/19/2013</a:t>
+              <a:t>6/18/2013</a:t>
             </a:fld>
             <a:endParaRPr lang="en-US" dirty="0"/>
           </a:p>
@@ -2539,7 +2537,7 @@
             <a:fld id="{B61BEF0D-F0BB-DE4B-95CE-6DB70DBA9567}" type="datetimeFigureOut">
               <a:rPr lang="en-US" dirty="0"/>
               <a:pPr/>
-              <a:t>6/19/2013</a:t>
+              <a:t>6/18/2013</a:t>
             </a:fld>
             <a:endParaRPr lang="en-US" dirty="0"/>
           </a:p>
@@ -2820,7 +2818,7 @@
             <a:fld id="{B61BEF0D-F0BB-DE4B-95CE-6DB70DBA9567}" type="datetimeFigureOut">
               <a:rPr lang="en-US" dirty="0"/>
               <a:pPr/>
-              <a:t>6/19/2013</a:t>
+              <a:t>6/18/2013</a:t>
             </a:fld>
             <a:endParaRPr lang="en-US" dirty="0"/>
           </a:p>
@@ -3064,7 +3062,7 @@
             <a:fld id="{B61BEF0D-F0BB-DE4B-95CE-6DB70DBA9567}" type="datetimeFigureOut">
               <a:rPr lang="en-US" dirty="0"/>
               <a:pPr/>
-              <a:t>6/19/2013</a:t>
+              <a:t>6/18/2013</a:t>
             </a:fld>
             <a:endParaRPr lang="en-US" dirty="0"/>
           </a:p>
@@ -3302,7 +3300,7 @@
             <a:fld id="{B61BEF0D-F0BB-DE4B-95CE-6DB70DBA9567}" type="datetimeFigureOut">
               <a:rPr lang="en-US" dirty="0"/>
               <a:pPr/>
-              <a:t>6/19/2013</a:t>
+              <a:t>6/18/2013</a:t>
             </a:fld>
             <a:endParaRPr lang="en-US" dirty="0"/>
           </a:p>
@@ -3674,7 +3672,7 @@
             <a:fld id="{B61BEF0D-F0BB-DE4B-95CE-6DB70DBA9567}" type="datetimeFigureOut">
               <a:rPr lang="en-US" dirty="0"/>
               <a:pPr/>
-              <a:t>6/19/2013</a:t>
+              <a:t>6/18/2013</a:t>
             </a:fld>
             <a:endParaRPr lang="en-US" dirty="0"/>
           </a:p>
@@ -3794,7 +3792,7 @@
             <a:fld id="{B61BEF0D-F0BB-DE4B-95CE-6DB70DBA9567}" type="datetimeFigureOut">
               <a:rPr lang="en-US" dirty="0"/>
               <a:pPr/>
-              <a:t>6/19/2013</a:t>
+              <a:t>6/18/2013</a:t>
             </a:fld>
             <a:endParaRPr lang="en-US" dirty="0"/>
           </a:p>
@@ -3886,7 +3884,7 @@
             <a:fld id="{B61BEF0D-F0BB-DE4B-95CE-6DB70DBA9567}" type="datetimeFigureOut">
               <a:rPr lang="en-US" dirty="0"/>
               <a:pPr/>
-              <a:t>6/19/2013</a:t>
+              <a:t>6/18/2013</a:t>
             </a:fld>
             <a:endParaRPr lang="en-US" dirty="0"/>
           </a:p>
@@ -4134,7 +4132,7 @@
             <a:fld id="{B61BEF0D-F0BB-DE4B-95CE-6DB70DBA9567}" type="datetimeFigureOut">
               <a:rPr lang="en-US" dirty="0"/>
               <a:pPr/>
-              <a:t>6/19/2013</a:t>
+              <a:t>6/18/2013</a:t>
             </a:fld>
             <a:endParaRPr lang="en-US" dirty="0"/>
           </a:p>
@@ -4394,7 +4392,7 @@
             <a:fld id="{B61BEF0D-F0BB-DE4B-95CE-6DB70DBA9567}" type="datetimeFigureOut">
               <a:rPr lang="en-US" dirty="0"/>
               <a:pPr/>
-              <a:t>6/19/2013</a:t>
+              <a:t>6/18/2013</a:t>
             </a:fld>
             <a:endParaRPr lang="en-US" dirty="0"/>
           </a:p>
@@ -4745,7 +4743,7 @@
             <a:fld id="{B61BEF0D-F0BB-DE4B-95CE-6DB70DBA9567}" type="datetimeFigureOut">
               <a:rPr lang="en-US" dirty="0"/>
               <a:pPr/>
-              <a:t>6/19/2013</a:t>
+              <a:t>6/18/2013</a:t>
             </a:fld>
             <a:endParaRPr lang="en-US" dirty="0"/>
           </a:p>
@@ -5297,7 +5295,11 @@
             </a:br>
             <a:r>
               <a:rPr lang="es-MX" sz="7200" dirty="0" smtClean="0"/>
-              <a:t>UNIDAD II</a:t>
+              <a:t>UNIDAD </a:t>
+            </a:r>
+            <a:r>
+              <a:rPr lang="es-MX" sz="7200" dirty="0" smtClean="0"/>
+              <a:t>II</a:t>
             </a:r>
             <a:endParaRPr lang="es-MX" sz="7200" dirty="0"/>
           </a:p>
@@ -5331,462 +5333,6 @@
     <p:extLst>
       <p:ext uri="{BB962C8B-B14F-4D97-AF65-F5344CB8AC3E}">
         <p14:creationId xmlns:p14="http://schemas.microsoft.com/office/powerpoint/2010/main" val="1663122206"/>
-      </p:ext>
-    </p:extLst>
-  </p:cSld>
-  <p:clrMapOvr>
-    <a:masterClrMapping/>
-  </p:clrMapOvr>
-  <p:timing>
-    <p:tnLst>
-      <p:par>
-        <p:cTn id="1" dur="indefinite" restart="never" nodeType="tmRoot"/>
-      </p:par>
-    </p:tnLst>
-  </p:timing>
-</p:sld>
-</file>
-
-<file path=ppt/slides/slide10.xml><?xml version="1.0" encoding="utf-8"?>
-<p:sld xmlns:a="http://schemas.openxmlformats.org/drawingml/2006/main" xmlns:r="http://schemas.openxmlformats.org/officeDocument/2006/relationships" xmlns:p="http://schemas.openxmlformats.org/presentationml/2006/main">
-  <p:cSld>
-    <p:spTree>
-      <p:nvGrpSpPr>
-        <p:cNvPr id="1" name=""/>
-        <p:cNvGrpSpPr/>
-        <p:nvPr/>
-      </p:nvGrpSpPr>
-      <p:grpSpPr>
-        <a:xfrm>
-          <a:off x="0" y="0"/>
-          <a:ext cx="0" cy="0"/>
-          <a:chOff x="0" y="0"/>
-          <a:chExt cx="0" cy="0"/>
-        </a:xfrm>
-      </p:grpSpPr>
-      <p:sp>
-        <p:nvSpPr>
-          <p:cNvPr id="2" name="Título 1"/>
-          <p:cNvSpPr>
-            <a:spLocks noGrp="1"/>
-          </p:cNvSpPr>
-          <p:nvPr>
-            <p:ph type="title"/>
-          </p:nvPr>
-        </p:nvSpPr>
-        <p:spPr>
-          <a:xfrm>
-            <a:off x="862599" y="525637"/>
-            <a:ext cx="8911687" cy="1280890"/>
-          </a:xfrm>
-        </p:spPr>
-        <p:txBody>
-          <a:bodyPr>
-            <a:noAutofit/>
-          </a:bodyPr>
-          <a:lstStyle/>
-          <a:p>
-            <a:r>
-              <a:rPr lang="es-MX" sz="4400" dirty="0" smtClean="0"/>
-              <a:t>Ciclo do-</a:t>
-            </a:r>
-            <a:r>
-              <a:rPr lang="es-MX" sz="4400" dirty="0" err="1" smtClean="0"/>
-              <a:t>while</a:t>
-            </a:r>
-            <a:endParaRPr lang="es-MX" sz="4400" dirty="0"/>
-          </a:p>
-        </p:txBody>
-      </p:sp>
-      <p:sp>
-        <p:nvSpPr>
-          <p:cNvPr id="3" name="Marcador de contenido 2"/>
-          <p:cNvSpPr>
-            <a:spLocks noGrp="1"/>
-          </p:cNvSpPr>
-          <p:nvPr>
-            <p:ph idx="1"/>
-          </p:nvPr>
-        </p:nvSpPr>
-        <p:spPr>
-          <a:xfrm>
-            <a:off x="862599" y="1489026"/>
-            <a:ext cx="9997659" cy="4835574"/>
-          </a:xfrm>
-        </p:spPr>
-        <p:txBody>
-          <a:bodyPr>
-            <a:normAutofit fontScale="47500" lnSpcReduction="20000"/>
-          </a:bodyPr>
-          <a:lstStyle/>
-          <a:p>
-            <a:pPr marL="0" indent="0">
-              <a:buNone/>
-            </a:pPr>
-            <a:r>
-              <a:rPr lang="es-MX" sz="4400" dirty="0" smtClean="0"/>
-              <a:t>El ciclo do-</a:t>
-            </a:r>
-            <a:r>
-              <a:rPr lang="es-MX" sz="4400" dirty="0" err="1" smtClean="0"/>
-              <a:t>while</a:t>
-            </a:r>
-            <a:r>
-              <a:rPr lang="es-MX" sz="4400" dirty="0"/>
-              <a:t>, que evalúa la condición al final </a:t>
-            </a:r>
-            <a:r>
-              <a:rPr lang="es-MX" sz="4400" dirty="0" smtClean="0"/>
-              <a:t>de cada </a:t>
-            </a:r>
-            <a:r>
-              <a:rPr lang="es-MX" sz="4400" dirty="0"/>
-              <a:t>repetición. </a:t>
-            </a:r>
-            <a:r>
-              <a:rPr lang="es-MX" sz="4400" dirty="0" smtClean="0"/>
-              <a:t>Ejemplo con los números del 1 al 10</a:t>
-            </a:r>
-            <a:endParaRPr lang="es-MX" sz="4400" dirty="0"/>
-          </a:p>
-          <a:p>
-            <a:pPr marL="0" indent="0">
-              <a:spcBef>
-                <a:spcPts val="0"/>
-              </a:spcBef>
-              <a:buNone/>
-            </a:pPr>
-            <a:r>
-              <a:rPr lang="es-MX" sz="4400" dirty="0">
-                <a:latin typeface="Courier New" panose="02070309020205020404" pitchFamily="49" charset="0"/>
-                <a:cs typeface="Courier New" panose="02070309020205020404" pitchFamily="49" charset="0"/>
-              </a:rPr>
-              <a:t>&lt;?</a:t>
-            </a:r>
-            <a:r>
-              <a:rPr lang="es-MX" sz="4400" dirty="0" err="1">
-                <a:latin typeface="Courier New" panose="02070309020205020404" pitchFamily="49" charset="0"/>
-                <a:cs typeface="Courier New" panose="02070309020205020404" pitchFamily="49" charset="0"/>
-              </a:rPr>
-              <a:t>php</a:t>
-            </a:r>
-            <a:endParaRPr lang="es-MX" sz="4400" dirty="0">
-              <a:latin typeface="Courier New" panose="02070309020205020404" pitchFamily="49" charset="0"/>
-              <a:cs typeface="Courier New" panose="02070309020205020404" pitchFamily="49" charset="0"/>
-            </a:endParaRPr>
-          </a:p>
-          <a:p>
-            <a:pPr marL="400050" lvl="1" indent="0">
-              <a:spcBef>
-                <a:spcPts val="0"/>
-              </a:spcBef>
-              <a:buNone/>
-            </a:pPr>
-            <a:r>
-              <a:rPr lang="es-MX" sz="4200" dirty="0" smtClean="0">
-                <a:latin typeface="Courier New" panose="02070309020205020404" pitchFamily="49" charset="0"/>
-                <a:cs typeface="Courier New" panose="02070309020205020404" pitchFamily="49" charset="0"/>
-              </a:rPr>
-              <a:t>// escribe los número del 1 al 10</a:t>
-            </a:r>
-            <a:endParaRPr lang="es-MX" sz="4200" dirty="0">
-              <a:latin typeface="Courier New" panose="02070309020205020404" pitchFamily="49" charset="0"/>
-              <a:cs typeface="Courier New" panose="02070309020205020404" pitchFamily="49" charset="0"/>
-            </a:endParaRPr>
-          </a:p>
-          <a:p>
-            <a:pPr marL="400050" lvl="1" indent="0">
-              <a:spcBef>
-                <a:spcPts val="0"/>
-              </a:spcBef>
-              <a:buNone/>
-            </a:pPr>
-            <a:r>
-              <a:rPr lang="es-MX" sz="4200" dirty="0">
-                <a:latin typeface="Courier New" panose="02070309020205020404" pitchFamily="49" charset="0"/>
-                <a:cs typeface="Courier New" panose="02070309020205020404" pitchFamily="49" charset="0"/>
-              </a:rPr>
-              <a:t>$contador = 1</a:t>
-            </a:r>
-            <a:r>
-              <a:rPr lang="es-MX" sz="4200" dirty="0" smtClean="0">
-                <a:latin typeface="Courier New" panose="02070309020205020404" pitchFamily="49" charset="0"/>
-                <a:cs typeface="Courier New" panose="02070309020205020404" pitchFamily="49" charset="0"/>
-              </a:rPr>
-              <a:t>;</a:t>
-            </a:r>
-          </a:p>
-          <a:p>
-            <a:pPr marL="400050" lvl="1" indent="0">
-              <a:spcBef>
-                <a:spcPts val="0"/>
-              </a:spcBef>
-              <a:buNone/>
-            </a:pPr>
-            <a:r>
-              <a:rPr lang="es-MX" sz="4200" b="1" dirty="0" smtClean="0">
-                <a:latin typeface="Courier New" panose="02070309020205020404" pitchFamily="49" charset="0"/>
-                <a:cs typeface="Courier New" panose="02070309020205020404" pitchFamily="49" charset="0"/>
-              </a:rPr>
-              <a:t>do</a:t>
-            </a:r>
-            <a:endParaRPr lang="es-MX" sz="4200" b="1" dirty="0">
-              <a:latin typeface="Courier New" panose="02070309020205020404" pitchFamily="49" charset="0"/>
-              <a:cs typeface="Courier New" panose="02070309020205020404" pitchFamily="49" charset="0"/>
-            </a:endParaRPr>
-          </a:p>
-          <a:p>
-            <a:pPr marL="400050" lvl="1" indent="0">
-              <a:spcBef>
-                <a:spcPts val="0"/>
-              </a:spcBef>
-              <a:buNone/>
-            </a:pPr>
-            <a:r>
-              <a:rPr lang="es-MX" sz="4200" dirty="0" smtClean="0">
-                <a:latin typeface="Courier New" panose="02070309020205020404" pitchFamily="49" charset="0"/>
-                <a:cs typeface="Courier New" panose="02070309020205020404" pitchFamily="49" charset="0"/>
-              </a:rPr>
-              <a:t>{</a:t>
-            </a:r>
-            <a:endParaRPr lang="es-MX" sz="4200" dirty="0">
-              <a:latin typeface="Courier New" panose="02070309020205020404" pitchFamily="49" charset="0"/>
-              <a:cs typeface="Courier New" panose="02070309020205020404" pitchFamily="49" charset="0"/>
-            </a:endParaRPr>
-          </a:p>
-          <a:p>
-            <a:pPr marL="800100" lvl="2" indent="0">
-              <a:spcBef>
-                <a:spcPts val="0"/>
-              </a:spcBef>
-              <a:buNone/>
-            </a:pPr>
-            <a:r>
-              <a:rPr lang="es-MX" sz="4000" dirty="0">
-                <a:latin typeface="Courier New" panose="02070309020205020404" pitchFamily="49" charset="0"/>
-                <a:cs typeface="Courier New" panose="02070309020205020404" pitchFamily="49" charset="0"/>
-              </a:rPr>
-              <a:t>e</a:t>
-            </a:r>
-            <a:r>
-              <a:rPr lang="es-MX" sz="4000" dirty="0" smtClean="0">
-                <a:latin typeface="Courier New" panose="02070309020205020404" pitchFamily="49" charset="0"/>
-                <a:cs typeface="Courier New" panose="02070309020205020404" pitchFamily="49" charset="0"/>
-              </a:rPr>
-              <a:t>cho '$contador';</a:t>
-            </a:r>
-            <a:endParaRPr lang="es-MX" sz="4000" dirty="0">
-              <a:latin typeface="Courier New" panose="02070309020205020404" pitchFamily="49" charset="0"/>
-              <a:cs typeface="Courier New" panose="02070309020205020404" pitchFamily="49" charset="0"/>
-            </a:endParaRPr>
-          </a:p>
-          <a:p>
-            <a:pPr marL="800100" lvl="2" indent="0">
-              <a:spcBef>
-                <a:spcPts val="0"/>
-              </a:spcBef>
-              <a:buNone/>
-            </a:pPr>
-            <a:r>
-              <a:rPr lang="es-MX" sz="4000" dirty="0">
-                <a:latin typeface="Courier New" panose="02070309020205020404" pitchFamily="49" charset="0"/>
-                <a:cs typeface="Courier New" panose="02070309020205020404" pitchFamily="49" charset="0"/>
-              </a:rPr>
-              <a:t>$contador++;</a:t>
-            </a:r>
-          </a:p>
-          <a:p>
-            <a:pPr marL="400050" lvl="1" indent="0">
-              <a:spcBef>
-                <a:spcPts val="0"/>
-              </a:spcBef>
-              <a:buNone/>
-            </a:pPr>
-            <a:r>
-              <a:rPr lang="es-MX" sz="4200" dirty="0" smtClean="0">
-                <a:latin typeface="Courier New" panose="02070309020205020404" pitchFamily="49" charset="0"/>
-                <a:cs typeface="Courier New" panose="02070309020205020404" pitchFamily="49" charset="0"/>
-              </a:rPr>
-              <a:t>}</a:t>
-            </a:r>
-            <a:r>
-              <a:rPr lang="es-MX" sz="4200" dirty="0">
-                <a:latin typeface="Courier New" panose="02070309020205020404" pitchFamily="49" charset="0"/>
-                <a:cs typeface="Courier New" panose="02070309020205020404" pitchFamily="49" charset="0"/>
-              </a:rPr>
-              <a:t> </a:t>
-            </a:r>
-            <a:r>
-              <a:rPr lang="es-MX" sz="4200" b="1" dirty="0" err="1">
-                <a:latin typeface="Courier New" panose="02070309020205020404" pitchFamily="49" charset="0"/>
-                <a:cs typeface="Courier New" panose="02070309020205020404" pitchFamily="49" charset="0"/>
-              </a:rPr>
-              <a:t>while</a:t>
-            </a:r>
-            <a:r>
-              <a:rPr lang="es-MX" sz="4200" dirty="0">
-                <a:latin typeface="Courier New" panose="02070309020205020404" pitchFamily="49" charset="0"/>
-                <a:cs typeface="Courier New" panose="02070309020205020404" pitchFamily="49" charset="0"/>
-              </a:rPr>
-              <a:t> ($contador &lt;= 10</a:t>
-            </a:r>
-            <a:r>
-              <a:rPr lang="es-MX" sz="4200" dirty="0" smtClean="0">
-                <a:latin typeface="Courier New" panose="02070309020205020404" pitchFamily="49" charset="0"/>
-                <a:cs typeface="Courier New" panose="02070309020205020404" pitchFamily="49" charset="0"/>
-              </a:rPr>
-              <a:t>);</a:t>
-            </a:r>
-          </a:p>
-          <a:p>
-            <a:pPr marL="400050" lvl="1" indent="0">
-              <a:spcBef>
-                <a:spcPts val="0"/>
-              </a:spcBef>
-              <a:buNone/>
-            </a:pPr>
-            <a:r>
-              <a:rPr lang="es-MX" sz="4200" dirty="0" smtClean="0">
-                <a:latin typeface="Courier New" panose="02070309020205020404" pitchFamily="49" charset="0"/>
-                <a:cs typeface="Courier New" panose="02070309020205020404" pitchFamily="49" charset="0"/>
-              </a:rPr>
-              <a:t>echo “Hemos terminado”;</a:t>
-            </a:r>
-            <a:endParaRPr lang="es-MX" sz="4200" dirty="0">
-              <a:latin typeface="Courier New" panose="02070309020205020404" pitchFamily="49" charset="0"/>
-              <a:cs typeface="Courier New" panose="02070309020205020404" pitchFamily="49" charset="0"/>
-            </a:endParaRPr>
-          </a:p>
-          <a:p>
-            <a:pPr marL="0" indent="0">
-              <a:spcBef>
-                <a:spcPts val="0"/>
-              </a:spcBef>
-              <a:buNone/>
-            </a:pPr>
-            <a:r>
-              <a:rPr lang="es-MX" sz="4400" dirty="0" smtClean="0">
-                <a:latin typeface="Courier New" panose="02070309020205020404" pitchFamily="49" charset="0"/>
-                <a:cs typeface="Courier New" panose="02070309020205020404" pitchFamily="49" charset="0"/>
-              </a:rPr>
-              <a:t>?&gt;</a:t>
-            </a:r>
-          </a:p>
-          <a:p>
-            <a:pPr marL="0" indent="0">
-              <a:spcBef>
-                <a:spcPts val="0"/>
-              </a:spcBef>
-              <a:buNone/>
-            </a:pPr>
-            <a:endParaRPr lang="es-MX" sz="4400" dirty="0">
-              <a:latin typeface="Courier New" panose="02070309020205020404" pitchFamily="49" charset="0"/>
-              <a:cs typeface="Courier New" panose="02070309020205020404" pitchFamily="49" charset="0"/>
-            </a:endParaRPr>
-          </a:p>
-          <a:p>
-            <a:pPr marL="0" indent="0">
-              <a:buNone/>
-            </a:pPr>
-            <a:r>
-              <a:rPr lang="es-MX" sz="4400" dirty="0" smtClean="0"/>
-              <a:t>La principal diferencia con los ciclos </a:t>
-            </a:r>
-            <a:r>
-              <a:rPr lang="es-MX" sz="4400" b="1" dirty="0" err="1" smtClean="0"/>
-              <a:t>while</a:t>
-            </a:r>
-            <a:r>
-              <a:rPr lang="es-MX" sz="4400" dirty="0" smtClean="0"/>
-              <a:t> y </a:t>
-            </a:r>
-            <a:r>
-              <a:rPr lang="es-MX" sz="4400" b="1" dirty="0" smtClean="0"/>
-              <a:t>do-</a:t>
-            </a:r>
-            <a:r>
-              <a:rPr lang="es-MX" sz="4400" b="1" dirty="0" err="1" smtClean="0"/>
-              <a:t>while</a:t>
-            </a:r>
-            <a:r>
-              <a:rPr lang="es-MX" sz="4400" dirty="0" smtClean="0"/>
-              <a:t>, en primer caso </a:t>
-            </a:r>
-            <a:r>
-              <a:rPr lang="es-MX" sz="4400" b="1" dirty="0" err="1"/>
-              <a:t>while</a:t>
-            </a:r>
-            <a:r>
-              <a:rPr lang="es-MX" sz="4400" dirty="0"/>
-              <a:t>, si la expresión condicional es </a:t>
-            </a:r>
-            <a:r>
-              <a:rPr lang="es-MX" sz="4400" dirty="0" smtClean="0"/>
-              <a:t>falsa en </a:t>
-            </a:r>
-            <a:r>
-              <a:rPr lang="es-MX" sz="4400" dirty="0"/>
-              <a:t>la primera pasada, el </a:t>
-            </a:r>
-            <a:r>
-              <a:rPr lang="es-MX" sz="4400" dirty="0" smtClean="0"/>
-              <a:t>ciclo nunca </a:t>
-            </a:r>
-            <a:r>
-              <a:rPr lang="es-MX" sz="4400" dirty="0"/>
-              <a:t>se ejecutará. En cambio, el </a:t>
-            </a:r>
-            <a:r>
-              <a:rPr lang="es-MX" sz="4400" dirty="0" smtClean="0"/>
-              <a:t>ciclo </a:t>
-            </a:r>
-            <a:r>
-              <a:rPr lang="es-MX" sz="4400" b="1" dirty="0" smtClean="0"/>
-              <a:t>do-</a:t>
-            </a:r>
-            <a:r>
-              <a:rPr lang="es-MX" sz="4400" b="1" dirty="0" err="1" smtClean="0"/>
-              <a:t>while</a:t>
-            </a:r>
-            <a:r>
-              <a:rPr lang="es-MX" sz="4400" dirty="0" smtClean="0"/>
-              <a:t> </a:t>
-            </a:r>
-            <a:r>
-              <a:rPr lang="es-MX" sz="4400" dirty="0"/>
-              <a:t>siempre </a:t>
-            </a:r>
-            <a:r>
-              <a:rPr lang="es-MX" sz="4400" dirty="0" smtClean="0"/>
-              <a:t>se ejecutará </a:t>
-            </a:r>
-            <a:r>
-              <a:rPr lang="es-MX" sz="4400" dirty="0"/>
-              <a:t>por lo menos una vez, aunque la expresión condicional sea falsa, porque la </a:t>
-            </a:r>
-            <a:r>
-              <a:rPr lang="es-MX" sz="4400" dirty="0" smtClean="0"/>
-              <a:t>condición se </a:t>
-            </a:r>
-            <a:r>
-              <a:rPr lang="es-MX" sz="4400" dirty="0"/>
-              <a:t>evalúa al final de la repetición del </a:t>
-            </a:r>
-            <a:r>
-              <a:rPr lang="es-MX" sz="4400" dirty="0" smtClean="0"/>
-              <a:t>ciclo y </a:t>
-            </a:r>
-            <a:r>
-              <a:rPr lang="es-MX" sz="4400" dirty="0"/>
-              <a:t>no al principio.</a:t>
-            </a:r>
-          </a:p>
-        </p:txBody>
-      </p:sp>
-    </p:spTree>
-    <p:extLst>
-      <p:ext uri="{BB962C8B-B14F-4D97-AF65-F5344CB8AC3E}">
-        <p14:creationId xmlns:p14="http://schemas.microsoft.com/office/powerpoint/2010/main" val="812291226"/>
       </p:ext>
     </p:extLst>
   </p:cSld>
@@ -7968,407 +7514,6 @@
     <p:bldLst>
       <p:bldP spid="5" grpId="0"/>
     </p:bldLst>
-  </p:timing>
-</p:sld>
-</file>
-
-<file path=ppt/slides/slide9.xml><?xml version="1.0" encoding="utf-8"?>
-<p:sld xmlns:a="http://schemas.openxmlformats.org/drawingml/2006/main" xmlns:r="http://schemas.openxmlformats.org/officeDocument/2006/relationships" xmlns:p="http://schemas.openxmlformats.org/presentationml/2006/main">
-  <p:cSld>
-    <p:spTree>
-      <p:nvGrpSpPr>
-        <p:cNvPr id="1" name=""/>
-        <p:cNvGrpSpPr/>
-        <p:nvPr/>
-      </p:nvGrpSpPr>
-      <p:grpSpPr>
-        <a:xfrm>
-          <a:off x="0" y="0"/>
-          <a:ext cx="0" cy="0"/>
-          <a:chOff x="0" y="0"/>
-          <a:chExt cx="0" cy="0"/>
-        </a:xfrm>
-      </p:grpSpPr>
-      <p:sp>
-        <p:nvSpPr>
-          <p:cNvPr id="2" name="Título 1"/>
-          <p:cNvSpPr>
-            <a:spLocks noGrp="1"/>
-          </p:cNvSpPr>
-          <p:nvPr>
-            <p:ph type="title"/>
-          </p:nvPr>
-        </p:nvSpPr>
-        <p:spPr>
-          <a:xfrm>
-            <a:off x="862599" y="525637"/>
-            <a:ext cx="8911687" cy="1280890"/>
-          </a:xfrm>
-        </p:spPr>
-        <p:txBody>
-          <a:bodyPr>
-            <a:noAutofit/>
-          </a:bodyPr>
-          <a:lstStyle/>
-          <a:p>
-            <a:r>
-              <a:rPr lang="es-MX" sz="4400" dirty="0" smtClean="0"/>
-              <a:t>Ciclo </a:t>
-            </a:r>
-            <a:r>
-              <a:rPr lang="es-MX" sz="4400" dirty="0" err="1" smtClean="0"/>
-              <a:t>while</a:t>
-            </a:r>
-            <a:endParaRPr lang="es-MX" sz="4400" dirty="0"/>
-          </a:p>
-        </p:txBody>
-      </p:sp>
-      <p:sp>
-        <p:nvSpPr>
-          <p:cNvPr id="3" name="Marcador de contenido 2"/>
-          <p:cNvSpPr>
-            <a:spLocks noGrp="1"/>
-          </p:cNvSpPr>
-          <p:nvPr>
-            <p:ph idx="1"/>
-          </p:nvPr>
-        </p:nvSpPr>
-        <p:spPr>
-          <a:xfrm>
-            <a:off x="862599" y="1489026"/>
-            <a:ext cx="9997659" cy="4481731"/>
-          </a:xfrm>
-        </p:spPr>
-        <p:txBody>
-          <a:bodyPr>
-            <a:normAutofit fontScale="47500" lnSpcReduction="20000"/>
-          </a:bodyPr>
-          <a:lstStyle/>
-          <a:p>
-            <a:pPr marL="0" indent="0">
-              <a:spcBef>
-                <a:spcPts val="0"/>
-              </a:spcBef>
-              <a:buNone/>
-            </a:pPr>
-            <a:r>
-              <a:rPr lang="es-MX" sz="4400" dirty="0" smtClean="0"/>
-              <a:t>El ciclo </a:t>
-            </a:r>
-            <a:r>
-              <a:rPr lang="es-MX" sz="4400" dirty="0" err="1" smtClean="0"/>
-              <a:t>while</a:t>
-            </a:r>
-            <a:r>
-              <a:rPr lang="es-MX" sz="4400" dirty="0"/>
-              <a:t> </a:t>
-            </a:r>
-            <a:r>
-              <a:rPr lang="es-MX" sz="4400" dirty="0" smtClean="0"/>
-              <a:t> </a:t>
-            </a:r>
-            <a:r>
-              <a:rPr lang="es-MX" sz="4400" dirty="0"/>
-              <a:t>se repite continuamente mientras </a:t>
-            </a:r>
-            <a:r>
-              <a:rPr lang="es-MX" sz="4400" dirty="0" smtClean="0"/>
-              <a:t>una condición </a:t>
-            </a:r>
-            <a:r>
-              <a:rPr lang="es-MX" sz="4400" dirty="0"/>
-              <a:t>específica sea verdadera. A continuación </a:t>
-            </a:r>
-            <a:r>
-              <a:rPr lang="es-MX" sz="4400" dirty="0" smtClean="0"/>
-              <a:t>un </a:t>
-            </a:r>
-            <a:r>
-              <a:rPr lang="es-MX" sz="4400" dirty="0"/>
-              <a:t>ejemplo, que utiliza </a:t>
-            </a:r>
-            <a:r>
-              <a:rPr lang="es-MX" sz="4400" dirty="0" smtClean="0"/>
-              <a:t>un ciclo </a:t>
-            </a:r>
-            <a:r>
-              <a:rPr lang="es-MX" sz="4400" dirty="0" err="1" smtClean="0"/>
-              <a:t>while</a:t>
-            </a:r>
-            <a:r>
-              <a:rPr lang="es-MX" sz="4400" dirty="0" smtClean="0"/>
-              <a:t> para </a:t>
-            </a:r>
-            <a:r>
-              <a:rPr lang="es-MX" sz="4400" dirty="0"/>
-              <a:t>escribir </a:t>
-            </a:r>
-            <a:r>
-              <a:rPr lang="es-MX" sz="4400" dirty="0" smtClean="0"/>
-              <a:t>los número del 1 al 10.</a:t>
-            </a:r>
-          </a:p>
-          <a:p>
-            <a:pPr marL="0" indent="0">
-              <a:spcBef>
-                <a:spcPts val="0"/>
-              </a:spcBef>
-              <a:buNone/>
-            </a:pPr>
-            <a:endParaRPr lang="es-MX" sz="4400" dirty="0"/>
-          </a:p>
-          <a:p>
-            <a:pPr marL="0" indent="0">
-              <a:spcBef>
-                <a:spcPts val="0"/>
-              </a:spcBef>
-              <a:buNone/>
-            </a:pPr>
-            <a:r>
-              <a:rPr lang="es-MX" sz="4400" dirty="0">
-                <a:latin typeface="Courier New" panose="02070309020205020404" pitchFamily="49" charset="0"/>
-                <a:cs typeface="Courier New" panose="02070309020205020404" pitchFamily="49" charset="0"/>
-              </a:rPr>
-              <a:t>&lt;?</a:t>
-            </a:r>
-            <a:r>
-              <a:rPr lang="es-MX" sz="4400" dirty="0" err="1">
-                <a:latin typeface="Courier New" panose="02070309020205020404" pitchFamily="49" charset="0"/>
-                <a:cs typeface="Courier New" panose="02070309020205020404" pitchFamily="49" charset="0"/>
-              </a:rPr>
-              <a:t>php</a:t>
-            </a:r>
-            <a:endParaRPr lang="es-MX" sz="4400" dirty="0">
-              <a:latin typeface="Courier New" panose="02070309020205020404" pitchFamily="49" charset="0"/>
-              <a:cs typeface="Courier New" panose="02070309020205020404" pitchFamily="49" charset="0"/>
-            </a:endParaRPr>
-          </a:p>
-          <a:p>
-            <a:pPr marL="400050" lvl="1" indent="0">
-              <a:spcBef>
-                <a:spcPts val="0"/>
-              </a:spcBef>
-              <a:buNone/>
-            </a:pPr>
-            <a:r>
-              <a:rPr lang="es-MX" sz="4200" dirty="0" smtClean="0">
-                <a:latin typeface="Courier New" panose="02070309020205020404" pitchFamily="49" charset="0"/>
-                <a:cs typeface="Courier New" panose="02070309020205020404" pitchFamily="49" charset="0"/>
-              </a:rPr>
-              <a:t>// escribe los número del 1 al 10</a:t>
-            </a:r>
-            <a:endParaRPr lang="es-MX" sz="4200" dirty="0">
-              <a:latin typeface="Courier New" panose="02070309020205020404" pitchFamily="49" charset="0"/>
-              <a:cs typeface="Courier New" panose="02070309020205020404" pitchFamily="49" charset="0"/>
-            </a:endParaRPr>
-          </a:p>
-          <a:p>
-            <a:pPr marL="400050" lvl="1" indent="0">
-              <a:spcBef>
-                <a:spcPts val="0"/>
-              </a:spcBef>
-              <a:buNone/>
-            </a:pPr>
-            <a:r>
-              <a:rPr lang="es-MX" sz="4200" dirty="0">
-                <a:latin typeface="Courier New" panose="02070309020205020404" pitchFamily="49" charset="0"/>
-                <a:cs typeface="Courier New" panose="02070309020205020404" pitchFamily="49" charset="0"/>
-              </a:rPr>
-              <a:t>$contador = 1;</a:t>
-            </a:r>
-          </a:p>
-          <a:p>
-            <a:pPr marL="400050" lvl="1" indent="0">
-              <a:spcBef>
-                <a:spcPts val="0"/>
-              </a:spcBef>
-              <a:buNone/>
-            </a:pPr>
-            <a:r>
-              <a:rPr lang="es-MX" sz="4200" b="1" dirty="0" err="1">
-                <a:latin typeface="Courier New" panose="02070309020205020404" pitchFamily="49" charset="0"/>
-                <a:cs typeface="Courier New" panose="02070309020205020404" pitchFamily="49" charset="0"/>
-              </a:rPr>
-              <a:t>while</a:t>
-            </a:r>
-            <a:r>
-              <a:rPr lang="es-MX" sz="4200" dirty="0">
-                <a:latin typeface="Courier New" panose="02070309020205020404" pitchFamily="49" charset="0"/>
-                <a:cs typeface="Courier New" panose="02070309020205020404" pitchFamily="49" charset="0"/>
-              </a:rPr>
-              <a:t> ($contador </a:t>
-            </a:r>
-            <a:r>
-              <a:rPr lang="es-MX" sz="4200" dirty="0" smtClean="0">
-                <a:latin typeface="Courier New" panose="02070309020205020404" pitchFamily="49" charset="0"/>
-                <a:cs typeface="Courier New" panose="02070309020205020404" pitchFamily="49" charset="0"/>
-              </a:rPr>
-              <a:t>&lt;= </a:t>
-            </a:r>
-            <a:r>
-              <a:rPr lang="es-MX" sz="4200" dirty="0">
-                <a:latin typeface="Courier New" panose="02070309020205020404" pitchFamily="49" charset="0"/>
-                <a:cs typeface="Courier New" panose="02070309020205020404" pitchFamily="49" charset="0"/>
-              </a:rPr>
-              <a:t>10) {</a:t>
-            </a:r>
-          </a:p>
-          <a:p>
-            <a:pPr marL="800100" lvl="2" indent="0">
-              <a:spcBef>
-                <a:spcPts val="0"/>
-              </a:spcBef>
-              <a:buNone/>
-            </a:pPr>
-            <a:r>
-              <a:rPr lang="es-MX" sz="4000" dirty="0">
-                <a:latin typeface="Courier New" panose="02070309020205020404" pitchFamily="49" charset="0"/>
-                <a:cs typeface="Courier New" panose="02070309020205020404" pitchFamily="49" charset="0"/>
-              </a:rPr>
-              <a:t>e</a:t>
-            </a:r>
-            <a:r>
-              <a:rPr lang="es-MX" sz="4000" dirty="0" smtClean="0">
-                <a:latin typeface="Courier New" panose="02070309020205020404" pitchFamily="49" charset="0"/>
-                <a:cs typeface="Courier New" panose="02070309020205020404" pitchFamily="49" charset="0"/>
-              </a:rPr>
-              <a:t>cho '$contador';</a:t>
-            </a:r>
-            <a:endParaRPr lang="es-MX" sz="4000" dirty="0">
-              <a:latin typeface="Courier New" panose="02070309020205020404" pitchFamily="49" charset="0"/>
-              <a:cs typeface="Courier New" panose="02070309020205020404" pitchFamily="49" charset="0"/>
-            </a:endParaRPr>
-          </a:p>
-          <a:p>
-            <a:pPr marL="800100" lvl="2" indent="0">
-              <a:spcBef>
-                <a:spcPts val="0"/>
-              </a:spcBef>
-              <a:buNone/>
-            </a:pPr>
-            <a:r>
-              <a:rPr lang="es-MX" sz="4000" dirty="0">
-                <a:latin typeface="Courier New" panose="02070309020205020404" pitchFamily="49" charset="0"/>
-                <a:cs typeface="Courier New" panose="02070309020205020404" pitchFamily="49" charset="0"/>
-              </a:rPr>
-              <a:t>$contador++;</a:t>
-            </a:r>
-          </a:p>
-          <a:p>
-            <a:pPr marL="400050" lvl="1" indent="0">
-              <a:spcBef>
-                <a:spcPts val="0"/>
-              </a:spcBef>
-              <a:buNone/>
-            </a:pPr>
-            <a:r>
-              <a:rPr lang="es-MX" sz="4200" dirty="0" smtClean="0">
-                <a:latin typeface="Courier New" panose="02070309020205020404" pitchFamily="49" charset="0"/>
-                <a:cs typeface="Courier New" panose="02070309020205020404" pitchFamily="49" charset="0"/>
-              </a:rPr>
-              <a:t>}</a:t>
-            </a:r>
-          </a:p>
-          <a:p>
-            <a:pPr marL="400050" lvl="1" indent="0">
-              <a:spcBef>
-                <a:spcPts val="0"/>
-              </a:spcBef>
-              <a:buNone/>
-            </a:pPr>
-            <a:r>
-              <a:rPr lang="es-MX" sz="4200" dirty="0" smtClean="0">
-                <a:latin typeface="Courier New" panose="02070309020205020404" pitchFamily="49" charset="0"/>
-                <a:cs typeface="Courier New" panose="02070309020205020404" pitchFamily="49" charset="0"/>
-              </a:rPr>
-              <a:t>echo “Hemos terminado”;</a:t>
-            </a:r>
-            <a:endParaRPr lang="es-MX" sz="4200" dirty="0">
-              <a:latin typeface="Courier New" panose="02070309020205020404" pitchFamily="49" charset="0"/>
-              <a:cs typeface="Courier New" panose="02070309020205020404" pitchFamily="49" charset="0"/>
-            </a:endParaRPr>
-          </a:p>
-          <a:p>
-            <a:pPr marL="0" indent="0">
-              <a:spcBef>
-                <a:spcPts val="0"/>
-              </a:spcBef>
-              <a:buNone/>
-            </a:pPr>
-            <a:r>
-              <a:rPr lang="es-MX" sz="4400" dirty="0" smtClean="0">
-                <a:latin typeface="Courier New" panose="02070309020205020404" pitchFamily="49" charset="0"/>
-                <a:cs typeface="Courier New" panose="02070309020205020404" pitchFamily="49" charset="0"/>
-              </a:rPr>
-              <a:t>?&gt;</a:t>
-            </a:r>
-          </a:p>
-          <a:p>
-            <a:pPr marL="0" indent="0">
-              <a:spcBef>
-                <a:spcPts val="0"/>
-              </a:spcBef>
-              <a:buNone/>
-            </a:pPr>
-            <a:endParaRPr lang="es-MX" sz="4400" dirty="0">
-              <a:latin typeface="Courier New" panose="02070309020205020404" pitchFamily="49" charset="0"/>
-              <a:cs typeface="Courier New" panose="02070309020205020404" pitchFamily="49" charset="0"/>
-            </a:endParaRPr>
-          </a:p>
-          <a:p>
-            <a:pPr marL="0" indent="0">
-              <a:spcBef>
-                <a:spcPts val="0"/>
-              </a:spcBef>
-              <a:buNone/>
-            </a:pPr>
-            <a:r>
-              <a:rPr lang="es-MX" sz="4400" dirty="0"/>
-              <a:t>Observa la condición encerrada entre paréntesis: mientras sea verdadera, se ejecutará </a:t>
-            </a:r>
-            <a:r>
-              <a:rPr lang="es-MX" sz="4400" dirty="0" smtClean="0"/>
-              <a:t>el código </a:t>
-            </a:r>
-            <a:r>
-              <a:rPr lang="es-MX" sz="4400" dirty="0"/>
-              <a:t>entre las llaves. En cuanto la condición sea falsa, el </a:t>
-            </a:r>
-            <a:r>
-              <a:rPr lang="es-MX" sz="4400" dirty="0" smtClean="0"/>
-              <a:t>ciclo se </a:t>
-            </a:r>
-            <a:r>
-              <a:rPr lang="es-MX" sz="4400" dirty="0"/>
-              <a:t>detiene y las líneas que </a:t>
-            </a:r>
-            <a:r>
-              <a:rPr lang="es-MX" sz="4400" dirty="0" smtClean="0"/>
-              <a:t>le siguen </a:t>
-            </a:r>
-            <a:r>
-              <a:rPr lang="es-MX" sz="4400" dirty="0"/>
-              <a:t>se ejecutan de la manera usual.</a:t>
-            </a:r>
-          </a:p>
-        </p:txBody>
-      </p:sp>
-    </p:spTree>
-    <p:extLst>
-      <p:ext uri="{BB962C8B-B14F-4D97-AF65-F5344CB8AC3E}">
-        <p14:creationId xmlns:p14="http://schemas.microsoft.com/office/powerpoint/2010/main" val="3521697758"/>
-      </p:ext>
-    </p:extLst>
-  </p:cSld>
-  <p:clrMapOvr>
-    <a:masterClrMapping/>
-  </p:clrMapOvr>
-  <p:timing>
-    <p:tnLst>
-      <p:par>
-        <p:cTn id="1" dur="indefinite" restart="never" nodeType="tmRoot"/>
-      </p:par>
-    </p:tnLst>
   </p:timing>
 </p:sld>
 </file>

</xml_diff>

<commit_message>
Tema regularizacion unidad 1 Prog Estruc
</commit_message>
<xml_diff>
--- a/Técnicas de Programación SESIONES UNIDAD 2.pptx
+++ b/Técnicas de Programación SESIONES UNIDAD 2.pptx
@@ -8,21 +8,19 @@
     <p:sldId id="256" r:id="rId2"/>
     <p:sldId id="258" r:id="rId3"/>
     <p:sldId id="259" r:id="rId4"/>
-    <p:sldId id="261" r:id="rId5"/>
-    <p:sldId id="262" r:id="rId6"/>
-    <p:sldId id="263" r:id="rId7"/>
-    <p:sldId id="260" r:id="rId8"/>
-    <p:sldId id="264" r:id="rId9"/>
-    <p:sldId id="265" r:id="rId10"/>
-    <p:sldId id="266" r:id="rId11"/>
-    <p:sldId id="267" r:id="rId12"/>
-    <p:sldId id="268" r:id="rId13"/>
-    <p:sldId id="269" r:id="rId14"/>
-    <p:sldId id="271" r:id="rId15"/>
-    <p:sldId id="270" r:id="rId16"/>
-    <p:sldId id="272" r:id="rId17"/>
-    <p:sldId id="274" r:id="rId18"/>
-    <p:sldId id="273" r:id="rId19"/>
+    <p:sldId id="262" r:id="rId5"/>
+    <p:sldId id="263" r:id="rId6"/>
+    <p:sldId id="260" r:id="rId7"/>
+    <p:sldId id="264" r:id="rId8"/>
+    <p:sldId id="265" r:id="rId9"/>
+    <p:sldId id="266" r:id="rId10"/>
+    <p:sldId id="267" r:id="rId11"/>
+    <p:sldId id="268" r:id="rId12"/>
+    <p:sldId id="269" r:id="rId13"/>
+    <p:sldId id="271" r:id="rId14"/>
+    <p:sldId id="270" r:id="rId15"/>
+    <p:sldId id="272" r:id="rId16"/>
+    <p:sldId id="273" r:id="rId17"/>
   </p:sldIdLst>
   <p:sldSz cx="12192000" cy="6858000"/>
   <p:notesSz cx="6858000" cy="9144000"/>
@@ -340,7 +338,7 @@
             <a:fld id="{B61BEF0D-F0BB-DE4B-95CE-6DB70DBA9567}" type="datetimeFigureOut">
               <a:rPr lang="en-US" dirty="0"/>
               <a:pPr/>
-              <a:t>7/9/2013</a:t>
+              <a:t>7/17/2013</a:t>
             </a:fld>
             <a:endParaRPr lang="en-US" dirty="0"/>
           </a:p>
@@ -593,7 +591,7 @@
             <a:fld id="{B61BEF0D-F0BB-DE4B-95CE-6DB70DBA9567}" type="datetimeFigureOut">
               <a:rPr lang="en-US" dirty="0"/>
               <a:pPr/>
-              <a:t>7/9/2013</a:t>
+              <a:t>7/17/2013</a:t>
             </a:fld>
             <a:endParaRPr lang="en-US" dirty="0"/>
           </a:p>
@@ -991,7 +989,7 @@
             <a:fld id="{B61BEF0D-F0BB-DE4B-95CE-6DB70DBA9567}" type="datetimeFigureOut">
               <a:rPr lang="en-US" dirty="0"/>
               <a:pPr/>
-              <a:t>7/9/2013</a:t>
+              <a:t>7/17/2013</a:t>
             </a:fld>
             <a:endParaRPr lang="en-US" dirty="0"/>
           </a:p>
@@ -1324,7 +1322,7 @@
             <a:fld id="{B61BEF0D-F0BB-DE4B-95CE-6DB70DBA9567}" type="datetimeFigureOut">
               <a:rPr lang="en-US" dirty="0"/>
               <a:pPr/>
-              <a:t>7/9/2013</a:t>
+              <a:t>7/17/2013</a:t>
             </a:fld>
             <a:endParaRPr lang="en-US" dirty="0"/>
           </a:p>
@@ -1641,7 +1639,7 @@
             <a:fld id="{B61BEF0D-F0BB-DE4B-95CE-6DB70DBA9567}" type="datetimeFigureOut">
               <a:rPr lang="en-US" dirty="0"/>
               <a:pPr/>
-              <a:t>7/9/2013</a:t>
+              <a:t>7/17/2013</a:t>
             </a:fld>
             <a:endParaRPr lang="en-US" dirty="0"/>
           </a:p>
@@ -2034,7 +2032,7 @@
             <a:fld id="{B61BEF0D-F0BB-DE4B-95CE-6DB70DBA9567}" type="datetimeFigureOut">
               <a:rPr lang="en-US" dirty="0"/>
               <a:pPr/>
-              <a:t>7/9/2013</a:t>
+              <a:t>7/17/2013</a:t>
             </a:fld>
             <a:endParaRPr lang="en-US" dirty="0"/>
           </a:p>
@@ -2288,7 +2286,7 @@
             <a:fld id="{B61BEF0D-F0BB-DE4B-95CE-6DB70DBA9567}" type="datetimeFigureOut">
               <a:rPr lang="en-US" dirty="0"/>
               <a:pPr/>
-              <a:t>7/9/2013</a:t>
+              <a:t>7/17/2013</a:t>
             </a:fld>
             <a:endParaRPr lang="en-US" dirty="0"/>
           </a:p>
@@ -2547,7 +2545,7 @@
             <a:fld id="{B61BEF0D-F0BB-DE4B-95CE-6DB70DBA9567}" type="datetimeFigureOut">
               <a:rPr lang="en-US" dirty="0"/>
               <a:pPr/>
-              <a:t>7/9/2013</a:t>
+              <a:t>7/17/2013</a:t>
             </a:fld>
             <a:endParaRPr lang="en-US" dirty="0"/>
           </a:p>
@@ -2828,7 +2826,7 @@
             <a:fld id="{B61BEF0D-F0BB-DE4B-95CE-6DB70DBA9567}" type="datetimeFigureOut">
               <a:rPr lang="en-US" dirty="0"/>
               <a:pPr/>
-              <a:t>7/9/2013</a:t>
+              <a:t>7/17/2013</a:t>
             </a:fld>
             <a:endParaRPr lang="en-US" dirty="0"/>
           </a:p>
@@ -3072,7 +3070,7 @@
             <a:fld id="{B61BEF0D-F0BB-DE4B-95CE-6DB70DBA9567}" type="datetimeFigureOut">
               <a:rPr lang="en-US" dirty="0"/>
               <a:pPr/>
-              <a:t>7/9/2013</a:t>
+              <a:t>7/17/2013</a:t>
             </a:fld>
             <a:endParaRPr lang="en-US" dirty="0"/>
           </a:p>
@@ -3310,7 +3308,7 @@
             <a:fld id="{B61BEF0D-F0BB-DE4B-95CE-6DB70DBA9567}" type="datetimeFigureOut">
               <a:rPr lang="en-US" dirty="0"/>
               <a:pPr/>
-              <a:t>7/9/2013</a:t>
+              <a:t>7/17/2013</a:t>
             </a:fld>
             <a:endParaRPr lang="en-US" dirty="0"/>
           </a:p>
@@ -3682,7 +3680,7 @@
             <a:fld id="{B61BEF0D-F0BB-DE4B-95CE-6DB70DBA9567}" type="datetimeFigureOut">
               <a:rPr lang="en-US" dirty="0"/>
               <a:pPr/>
-              <a:t>7/9/2013</a:t>
+              <a:t>7/17/2013</a:t>
             </a:fld>
             <a:endParaRPr lang="en-US" dirty="0"/>
           </a:p>
@@ -3802,7 +3800,7 @@
             <a:fld id="{B61BEF0D-F0BB-DE4B-95CE-6DB70DBA9567}" type="datetimeFigureOut">
               <a:rPr lang="en-US" dirty="0"/>
               <a:pPr/>
-              <a:t>7/9/2013</a:t>
+              <a:t>7/17/2013</a:t>
             </a:fld>
             <a:endParaRPr lang="en-US" dirty="0"/>
           </a:p>
@@ -3894,7 +3892,7 @@
             <a:fld id="{B61BEF0D-F0BB-DE4B-95CE-6DB70DBA9567}" type="datetimeFigureOut">
               <a:rPr lang="en-US" dirty="0"/>
               <a:pPr/>
-              <a:t>7/9/2013</a:t>
+              <a:t>7/17/2013</a:t>
             </a:fld>
             <a:endParaRPr lang="en-US" dirty="0"/>
           </a:p>
@@ -4142,7 +4140,7 @@
             <a:fld id="{B61BEF0D-F0BB-DE4B-95CE-6DB70DBA9567}" type="datetimeFigureOut">
               <a:rPr lang="en-US" dirty="0"/>
               <a:pPr/>
-              <a:t>7/9/2013</a:t>
+              <a:t>7/17/2013</a:t>
             </a:fld>
             <a:endParaRPr lang="en-US" dirty="0"/>
           </a:p>
@@ -4402,7 +4400,7 @@
             <a:fld id="{B61BEF0D-F0BB-DE4B-95CE-6DB70DBA9567}" type="datetimeFigureOut">
               <a:rPr lang="en-US" dirty="0"/>
               <a:pPr/>
-              <a:t>7/9/2013</a:t>
+              <a:t>7/17/2013</a:t>
             </a:fld>
             <a:endParaRPr lang="en-US" dirty="0"/>
           </a:p>
@@ -4753,7 +4751,7 @@
             <a:fld id="{B61BEF0D-F0BB-DE4B-95CE-6DB70DBA9567}" type="datetimeFigureOut">
               <a:rPr lang="en-US" dirty="0"/>
               <a:pPr/>
-              <a:t>7/9/2013</a:t>
+              <a:t>7/17/2013</a:t>
             </a:fld>
             <a:endParaRPr lang="en-US" dirty="0"/>
           </a:p>
@@ -5384,462 +5382,6 @@
         </p:nvSpPr>
         <p:spPr>
           <a:xfrm>
-            <a:off x="862599" y="525637"/>
-            <a:ext cx="8911687" cy="1280890"/>
-          </a:xfrm>
-        </p:spPr>
-        <p:txBody>
-          <a:bodyPr>
-            <a:noAutofit/>
-          </a:bodyPr>
-          <a:lstStyle/>
-          <a:p>
-            <a:r>
-              <a:rPr lang="es-MX" sz="4400" dirty="0" smtClean="0"/>
-              <a:t>Ciclo do-</a:t>
-            </a:r>
-            <a:r>
-              <a:rPr lang="es-MX" sz="4400" dirty="0" err="1" smtClean="0"/>
-              <a:t>while</a:t>
-            </a:r>
-            <a:endParaRPr lang="es-MX" sz="4400" dirty="0"/>
-          </a:p>
-        </p:txBody>
-      </p:sp>
-      <p:sp>
-        <p:nvSpPr>
-          <p:cNvPr id="3" name="Marcador de contenido 2"/>
-          <p:cNvSpPr>
-            <a:spLocks noGrp="1"/>
-          </p:cNvSpPr>
-          <p:nvPr>
-            <p:ph idx="1"/>
-          </p:nvPr>
-        </p:nvSpPr>
-        <p:spPr>
-          <a:xfrm>
-            <a:off x="862599" y="1489026"/>
-            <a:ext cx="9997659" cy="4835574"/>
-          </a:xfrm>
-        </p:spPr>
-        <p:txBody>
-          <a:bodyPr>
-            <a:normAutofit fontScale="47500" lnSpcReduction="20000"/>
-          </a:bodyPr>
-          <a:lstStyle/>
-          <a:p>
-            <a:pPr marL="0" indent="0">
-              <a:buNone/>
-            </a:pPr>
-            <a:r>
-              <a:rPr lang="es-MX" sz="4400" dirty="0" smtClean="0"/>
-              <a:t>El ciclo do-</a:t>
-            </a:r>
-            <a:r>
-              <a:rPr lang="es-MX" sz="4400" dirty="0" err="1" smtClean="0"/>
-              <a:t>while</a:t>
-            </a:r>
-            <a:r>
-              <a:rPr lang="es-MX" sz="4400" dirty="0"/>
-              <a:t>, que evalúa la condición al final </a:t>
-            </a:r>
-            <a:r>
-              <a:rPr lang="es-MX" sz="4400" dirty="0" smtClean="0"/>
-              <a:t>de cada </a:t>
-            </a:r>
-            <a:r>
-              <a:rPr lang="es-MX" sz="4400" dirty="0"/>
-              <a:t>repetición. </a:t>
-            </a:r>
-            <a:r>
-              <a:rPr lang="es-MX" sz="4400" dirty="0" smtClean="0"/>
-              <a:t>Ejemplo con los números del 1 al 10</a:t>
-            </a:r>
-            <a:endParaRPr lang="es-MX" sz="4400" dirty="0"/>
-          </a:p>
-          <a:p>
-            <a:pPr marL="0" indent="0">
-              <a:spcBef>
-                <a:spcPts val="0"/>
-              </a:spcBef>
-              <a:buNone/>
-            </a:pPr>
-            <a:r>
-              <a:rPr lang="es-MX" sz="4400" dirty="0">
-                <a:latin typeface="Courier New" panose="02070309020205020404" pitchFamily="49" charset="0"/>
-                <a:cs typeface="Courier New" panose="02070309020205020404" pitchFamily="49" charset="0"/>
-              </a:rPr>
-              <a:t>&lt;?</a:t>
-            </a:r>
-            <a:r>
-              <a:rPr lang="es-MX" sz="4400" dirty="0" err="1">
-                <a:latin typeface="Courier New" panose="02070309020205020404" pitchFamily="49" charset="0"/>
-                <a:cs typeface="Courier New" panose="02070309020205020404" pitchFamily="49" charset="0"/>
-              </a:rPr>
-              <a:t>php</a:t>
-            </a:r>
-            <a:endParaRPr lang="es-MX" sz="4400" dirty="0">
-              <a:latin typeface="Courier New" panose="02070309020205020404" pitchFamily="49" charset="0"/>
-              <a:cs typeface="Courier New" panose="02070309020205020404" pitchFamily="49" charset="0"/>
-            </a:endParaRPr>
-          </a:p>
-          <a:p>
-            <a:pPr marL="400050" lvl="1" indent="0">
-              <a:spcBef>
-                <a:spcPts val="0"/>
-              </a:spcBef>
-              <a:buNone/>
-            </a:pPr>
-            <a:r>
-              <a:rPr lang="es-MX" sz="4200" dirty="0" smtClean="0">
-                <a:latin typeface="Courier New" panose="02070309020205020404" pitchFamily="49" charset="0"/>
-                <a:cs typeface="Courier New" panose="02070309020205020404" pitchFamily="49" charset="0"/>
-              </a:rPr>
-              <a:t>// escribe los número del 1 al 10</a:t>
-            </a:r>
-            <a:endParaRPr lang="es-MX" sz="4200" dirty="0">
-              <a:latin typeface="Courier New" panose="02070309020205020404" pitchFamily="49" charset="0"/>
-              <a:cs typeface="Courier New" panose="02070309020205020404" pitchFamily="49" charset="0"/>
-            </a:endParaRPr>
-          </a:p>
-          <a:p>
-            <a:pPr marL="400050" lvl="1" indent="0">
-              <a:spcBef>
-                <a:spcPts val="0"/>
-              </a:spcBef>
-              <a:buNone/>
-            </a:pPr>
-            <a:r>
-              <a:rPr lang="es-MX" sz="4200" dirty="0">
-                <a:latin typeface="Courier New" panose="02070309020205020404" pitchFamily="49" charset="0"/>
-                <a:cs typeface="Courier New" panose="02070309020205020404" pitchFamily="49" charset="0"/>
-              </a:rPr>
-              <a:t>$contador = 1</a:t>
-            </a:r>
-            <a:r>
-              <a:rPr lang="es-MX" sz="4200" dirty="0" smtClean="0">
-                <a:latin typeface="Courier New" panose="02070309020205020404" pitchFamily="49" charset="0"/>
-                <a:cs typeface="Courier New" panose="02070309020205020404" pitchFamily="49" charset="0"/>
-              </a:rPr>
-              <a:t>;</a:t>
-            </a:r>
-          </a:p>
-          <a:p>
-            <a:pPr marL="400050" lvl="1" indent="0">
-              <a:spcBef>
-                <a:spcPts val="0"/>
-              </a:spcBef>
-              <a:buNone/>
-            </a:pPr>
-            <a:r>
-              <a:rPr lang="es-MX" sz="4200" b="1" dirty="0" smtClean="0">
-                <a:latin typeface="Courier New" panose="02070309020205020404" pitchFamily="49" charset="0"/>
-                <a:cs typeface="Courier New" panose="02070309020205020404" pitchFamily="49" charset="0"/>
-              </a:rPr>
-              <a:t>do</a:t>
-            </a:r>
-            <a:endParaRPr lang="es-MX" sz="4200" b="1" dirty="0">
-              <a:latin typeface="Courier New" panose="02070309020205020404" pitchFamily="49" charset="0"/>
-              <a:cs typeface="Courier New" panose="02070309020205020404" pitchFamily="49" charset="0"/>
-            </a:endParaRPr>
-          </a:p>
-          <a:p>
-            <a:pPr marL="400050" lvl="1" indent="0">
-              <a:spcBef>
-                <a:spcPts val="0"/>
-              </a:spcBef>
-              <a:buNone/>
-            </a:pPr>
-            <a:r>
-              <a:rPr lang="es-MX" sz="4200" dirty="0" smtClean="0">
-                <a:latin typeface="Courier New" panose="02070309020205020404" pitchFamily="49" charset="0"/>
-                <a:cs typeface="Courier New" panose="02070309020205020404" pitchFamily="49" charset="0"/>
-              </a:rPr>
-              <a:t>{</a:t>
-            </a:r>
-            <a:endParaRPr lang="es-MX" sz="4200" dirty="0">
-              <a:latin typeface="Courier New" panose="02070309020205020404" pitchFamily="49" charset="0"/>
-              <a:cs typeface="Courier New" panose="02070309020205020404" pitchFamily="49" charset="0"/>
-            </a:endParaRPr>
-          </a:p>
-          <a:p>
-            <a:pPr marL="800100" lvl="2" indent="0">
-              <a:spcBef>
-                <a:spcPts val="0"/>
-              </a:spcBef>
-              <a:buNone/>
-            </a:pPr>
-            <a:r>
-              <a:rPr lang="es-MX" sz="4000" dirty="0">
-                <a:latin typeface="Courier New" panose="02070309020205020404" pitchFamily="49" charset="0"/>
-                <a:cs typeface="Courier New" panose="02070309020205020404" pitchFamily="49" charset="0"/>
-              </a:rPr>
-              <a:t>e</a:t>
-            </a:r>
-            <a:r>
-              <a:rPr lang="es-MX" sz="4000" dirty="0" smtClean="0">
-                <a:latin typeface="Courier New" panose="02070309020205020404" pitchFamily="49" charset="0"/>
-                <a:cs typeface="Courier New" panose="02070309020205020404" pitchFamily="49" charset="0"/>
-              </a:rPr>
-              <a:t>cho '$contador';</a:t>
-            </a:r>
-            <a:endParaRPr lang="es-MX" sz="4000" dirty="0">
-              <a:latin typeface="Courier New" panose="02070309020205020404" pitchFamily="49" charset="0"/>
-              <a:cs typeface="Courier New" panose="02070309020205020404" pitchFamily="49" charset="0"/>
-            </a:endParaRPr>
-          </a:p>
-          <a:p>
-            <a:pPr marL="800100" lvl="2" indent="0">
-              <a:spcBef>
-                <a:spcPts val="0"/>
-              </a:spcBef>
-              <a:buNone/>
-            </a:pPr>
-            <a:r>
-              <a:rPr lang="es-MX" sz="4000" dirty="0">
-                <a:latin typeface="Courier New" panose="02070309020205020404" pitchFamily="49" charset="0"/>
-                <a:cs typeface="Courier New" panose="02070309020205020404" pitchFamily="49" charset="0"/>
-              </a:rPr>
-              <a:t>$contador++;</a:t>
-            </a:r>
-          </a:p>
-          <a:p>
-            <a:pPr marL="400050" lvl="1" indent="0">
-              <a:spcBef>
-                <a:spcPts val="0"/>
-              </a:spcBef>
-              <a:buNone/>
-            </a:pPr>
-            <a:r>
-              <a:rPr lang="es-MX" sz="4200" dirty="0" smtClean="0">
-                <a:latin typeface="Courier New" panose="02070309020205020404" pitchFamily="49" charset="0"/>
-                <a:cs typeface="Courier New" panose="02070309020205020404" pitchFamily="49" charset="0"/>
-              </a:rPr>
-              <a:t>}</a:t>
-            </a:r>
-            <a:r>
-              <a:rPr lang="es-MX" sz="4200" dirty="0">
-                <a:latin typeface="Courier New" panose="02070309020205020404" pitchFamily="49" charset="0"/>
-                <a:cs typeface="Courier New" panose="02070309020205020404" pitchFamily="49" charset="0"/>
-              </a:rPr>
-              <a:t> </a:t>
-            </a:r>
-            <a:r>
-              <a:rPr lang="es-MX" sz="4200" b="1" dirty="0" err="1">
-                <a:latin typeface="Courier New" panose="02070309020205020404" pitchFamily="49" charset="0"/>
-                <a:cs typeface="Courier New" panose="02070309020205020404" pitchFamily="49" charset="0"/>
-              </a:rPr>
-              <a:t>while</a:t>
-            </a:r>
-            <a:r>
-              <a:rPr lang="es-MX" sz="4200" dirty="0">
-                <a:latin typeface="Courier New" panose="02070309020205020404" pitchFamily="49" charset="0"/>
-                <a:cs typeface="Courier New" panose="02070309020205020404" pitchFamily="49" charset="0"/>
-              </a:rPr>
-              <a:t> ($contador &lt;= 10</a:t>
-            </a:r>
-            <a:r>
-              <a:rPr lang="es-MX" sz="4200" dirty="0" smtClean="0">
-                <a:latin typeface="Courier New" panose="02070309020205020404" pitchFamily="49" charset="0"/>
-                <a:cs typeface="Courier New" panose="02070309020205020404" pitchFamily="49" charset="0"/>
-              </a:rPr>
-              <a:t>);</a:t>
-            </a:r>
-          </a:p>
-          <a:p>
-            <a:pPr marL="400050" lvl="1" indent="0">
-              <a:spcBef>
-                <a:spcPts val="0"/>
-              </a:spcBef>
-              <a:buNone/>
-            </a:pPr>
-            <a:r>
-              <a:rPr lang="es-MX" sz="4200" dirty="0" smtClean="0">
-                <a:latin typeface="Courier New" panose="02070309020205020404" pitchFamily="49" charset="0"/>
-                <a:cs typeface="Courier New" panose="02070309020205020404" pitchFamily="49" charset="0"/>
-              </a:rPr>
-              <a:t>echo “Hemos terminado”;</a:t>
-            </a:r>
-            <a:endParaRPr lang="es-MX" sz="4200" dirty="0">
-              <a:latin typeface="Courier New" panose="02070309020205020404" pitchFamily="49" charset="0"/>
-              <a:cs typeface="Courier New" panose="02070309020205020404" pitchFamily="49" charset="0"/>
-            </a:endParaRPr>
-          </a:p>
-          <a:p>
-            <a:pPr marL="0" indent="0">
-              <a:spcBef>
-                <a:spcPts val="0"/>
-              </a:spcBef>
-              <a:buNone/>
-            </a:pPr>
-            <a:r>
-              <a:rPr lang="es-MX" sz="4400" dirty="0" smtClean="0">
-                <a:latin typeface="Courier New" panose="02070309020205020404" pitchFamily="49" charset="0"/>
-                <a:cs typeface="Courier New" panose="02070309020205020404" pitchFamily="49" charset="0"/>
-              </a:rPr>
-              <a:t>?&gt;</a:t>
-            </a:r>
-          </a:p>
-          <a:p>
-            <a:pPr marL="0" indent="0">
-              <a:spcBef>
-                <a:spcPts val="0"/>
-              </a:spcBef>
-              <a:buNone/>
-            </a:pPr>
-            <a:endParaRPr lang="es-MX" sz="4400" dirty="0">
-              <a:latin typeface="Courier New" panose="02070309020205020404" pitchFamily="49" charset="0"/>
-              <a:cs typeface="Courier New" panose="02070309020205020404" pitchFamily="49" charset="0"/>
-            </a:endParaRPr>
-          </a:p>
-          <a:p>
-            <a:pPr marL="0" indent="0">
-              <a:buNone/>
-            </a:pPr>
-            <a:r>
-              <a:rPr lang="es-MX" sz="4400" dirty="0" smtClean="0"/>
-              <a:t>La principal diferencia con los ciclos </a:t>
-            </a:r>
-            <a:r>
-              <a:rPr lang="es-MX" sz="4400" b="1" dirty="0" err="1" smtClean="0"/>
-              <a:t>while</a:t>
-            </a:r>
-            <a:r>
-              <a:rPr lang="es-MX" sz="4400" dirty="0" smtClean="0"/>
-              <a:t> y </a:t>
-            </a:r>
-            <a:r>
-              <a:rPr lang="es-MX" sz="4400" b="1" dirty="0" smtClean="0"/>
-              <a:t>do-</a:t>
-            </a:r>
-            <a:r>
-              <a:rPr lang="es-MX" sz="4400" b="1" dirty="0" err="1" smtClean="0"/>
-              <a:t>while</a:t>
-            </a:r>
-            <a:r>
-              <a:rPr lang="es-MX" sz="4400" dirty="0" smtClean="0"/>
-              <a:t>, en primer caso </a:t>
-            </a:r>
-            <a:r>
-              <a:rPr lang="es-MX" sz="4400" b="1" dirty="0" err="1"/>
-              <a:t>while</a:t>
-            </a:r>
-            <a:r>
-              <a:rPr lang="es-MX" sz="4400" dirty="0"/>
-              <a:t>, si la expresión condicional es </a:t>
-            </a:r>
-            <a:r>
-              <a:rPr lang="es-MX" sz="4400" dirty="0" smtClean="0"/>
-              <a:t>falsa en </a:t>
-            </a:r>
-            <a:r>
-              <a:rPr lang="es-MX" sz="4400" dirty="0"/>
-              <a:t>la primera pasada, el </a:t>
-            </a:r>
-            <a:r>
-              <a:rPr lang="es-MX" sz="4400" dirty="0" smtClean="0"/>
-              <a:t>ciclo nunca </a:t>
-            </a:r>
-            <a:r>
-              <a:rPr lang="es-MX" sz="4400" dirty="0"/>
-              <a:t>se ejecutará. En cambio, el </a:t>
-            </a:r>
-            <a:r>
-              <a:rPr lang="es-MX" sz="4400" dirty="0" smtClean="0"/>
-              <a:t>ciclo </a:t>
-            </a:r>
-            <a:r>
-              <a:rPr lang="es-MX" sz="4400" b="1" dirty="0" smtClean="0"/>
-              <a:t>do-</a:t>
-            </a:r>
-            <a:r>
-              <a:rPr lang="es-MX" sz="4400" b="1" dirty="0" err="1" smtClean="0"/>
-              <a:t>while</a:t>
-            </a:r>
-            <a:r>
-              <a:rPr lang="es-MX" sz="4400" dirty="0" smtClean="0"/>
-              <a:t> </a:t>
-            </a:r>
-            <a:r>
-              <a:rPr lang="es-MX" sz="4400" dirty="0"/>
-              <a:t>siempre </a:t>
-            </a:r>
-            <a:r>
-              <a:rPr lang="es-MX" sz="4400" dirty="0" smtClean="0"/>
-              <a:t>se ejecutará </a:t>
-            </a:r>
-            <a:r>
-              <a:rPr lang="es-MX" sz="4400" dirty="0"/>
-              <a:t>por lo menos una vez, aunque la expresión condicional sea falsa, porque la </a:t>
-            </a:r>
-            <a:r>
-              <a:rPr lang="es-MX" sz="4400" dirty="0" smtClean="0"/>
-              <a:t>condición se </a:t>
-            </a:r>
-            <a:r>
-              <a:rPr lang="es-MX" sz="4400" dirty="0"/>
-              <a:t>evalúa al final de la repetición del </a:t>
-            </a:r>
-            <a:r>
-              <a:rPr lang="es-MX" sz="4400" dirty="0" smtClean="0"/>
-              <a:t>ciclo y </a:t>
-            </a:r>
-            <a:r>
-              <a:rPr lang="es-MX" sz="4400" dirty="0"/>
-              <a:t>no al principio.</a:t>
-            </a:r>
-          </a:p>
-        </p:txBody>
-      </p:sp>
-    </p:spTree>
-    <p:extLst>
-      <p:ext uri="{BB962C8B-B14F-4D97-AF65-F5344CB8AC3E}">
-        <p14:creationId xmlns:p14="http://schemas.microsoft.com/office/powerpoint/2010/main" val="812291226"/>
-      </p:ext>
-    </p:extLst>
-  </p:cSld>
-  <p:clrMapOvr>
-    <a:masterClrMapping/>
-  </p:clrMapOvr>
-  <p:timing>
-    <p:tnLst>
-      <p:par>
-        <p:cTn id="1" dur="indefinite" restart="never" nodeType="tmRoot"/>
-      </p:par>
-    </p:tnLst>
-  </p:timing>
-</p:sld>
-</file>
-
-<file path=ppt/slides/slide11.xml><?xml version="1.0" encoding="utf-8"?>
-<p:sld xmlns:a="http://schemas.openxmlformats.org/drawingml/2006/main" xmlns:r="http://schemas.openxmlformats.org/officeDocument/2006/relationships" xmlns:p="http://schemas.openxmlformats.org/presentationml/2006/main">
-  <p:cSld>
-    <p:spTree>
-      <p:nvGrpSpPr>
-        <p:cNvPr id="1" name=""/>
-        <p:cNvGrpSpPr/>
-        <p:nvPr/>
-      </p:nvGrpSpPr>
-      <p:grpSpPr>
-        <a:xfrm>
-          <a:off x="0" y="0"/>
-          <a:ext cx="0" cy="0"/>
-          <a:chOff x="0" y="0"/>
-          <a:chExt cx="0" cy="0"/>
-        </a:xfrm>
-      </p:grpSpPr>
-      <p:sp>
-        <p:nvSpPr>
-          <p:cNvPr id="2" name="Título 1"/>
-          <p:cNvSpPr>
-            <a:spLocks noGrp="1"/>
-          </p:cNvSpPr>
-          <p:nvPr>
-            <p:ph type="title"/>
-          </p:nvPr>
-        </p:nvSpPr>
-        <p:spPr>
-          <a:xfrm>
             <a:off x="558063" y="173349"/>
             <a:ext cx="8911687" cy="1280890"/>
           </a:xfrm>
@@ -7716,7 +7258,7 @@
 </p:sld>
 </file>
 
-<file path=ppt/slides/slide12.xml><?xml version="1.0" encoding="utf-8"?>
+<file path=ppt/slides/slide11.xml><?xml version="1.0" encoding="utf-8"?>
 <p:sld xmlns:a="http://schemas.openxmlformats.org/drawingml/2006/main" xmlns:r="http://schemas.openxmlformats.org/officeDocument/2006/relationships" xmlns:p="http://schemas.openxmlformats.org/presentationml/2006/main">
   <p:cSld>
     <p:spTree>
@@ -10815,7 +10357,7 @@
 </p:sld>
 </file>
 
-<file path=ppt/slides/slide13.xml><?xml version="1.0" encoding="utf-8"?>
+<file path=ppt/slides/slide12.xml><?xml version="1.0" encoding="utf-8"?>
 <p:sld xmlns:a="http://schemas.openxmlformats.org/drawingml/2006/main" xmlns:r="http://schemas.openxmlformats.org/officeDocument/2006/relationships" xmlns:p="http://schemas.openxmlformats.org/presentationml/2006/main">
   <p:cSld>
     <p:spTree>
@@ -10897,15 +10439,7 @@
             </a:r>
             <a:r>
               <a:rPr lang="es-MX" sz="2400" dirty="0" smtClean="0"/>
-              <a:t>, solo se </a:t>
-            </a:r>
-            <a:r>
-              <a:rPr lang="es-MX" sz="2400" dirty="0" err="1" smtClean="0"/>
-              <a:t>expecifica</a:t>
-            </a:r>
-            <a:r>
-              <a:rPr lang="es-MX" sz="2400" dirty="0" smtClean="0"/>
-              <a:t> su índice.</a:t>
+              <a:t>, solo se especifica su índice.</a:t>
             </a:r>
           </a:p>
           <a:p>
@@ -11159,6 +10693,531 @@
     <p:extLst>
       <p:ext uri="{BB962C8B-B14F-4D97-AF65-F5344CB8AC3E}">
         <p14:creationId xmlns:p14="http://schemas.microsoft.com/office/powerpoint/2010/main" val="533796749"/>
+      </p:ext>
+    </p:extLst>
+  </p:cSld>
+  <p:clrMapOvr>
+    <a:masterClrMapping/>
+  </p:clrMapOvr>
+  <p:timing>
+    <p:tnLst>
+      <p:par>
+        <p:cTn id="1" dur="indefinite" restart="never" nodeType="tmRoot"/>
+      </p:par>
+    </p:tnLst>
+  </p:timing>
+</p:sld>
+</file>
+
+<file path=ppt/slides/slide13.xml><?xml version="1.0" encoding="utf-8"?>
+<p:sld xmlns:a="http://schemas.openxmlformats.org/drawingml/2006/main" xmlns:r="http://schemas.openxmlformats.org/officeDocument/2006/relationships" xmlns:p="http://schemas.openxmlformats.org/presentationml/2006/main">
+  <p:cSld>
+    <p:spTree>
+      <p:nvGrpSpPr>
+        <p:cNvPr id="1" name=""/>
+        <p:cNvGrpSpPr/>
+        <p:nvPr/>
+      </p:nvGrpSpPr>
+      <p:grpSpPr>
+        <a:xfrm>
+          <a:off x="0" y="0"/>
+          <a:ext cx="0" cy="0"/>
+          <a:chOff x="0" y="0"/>
+          <a:chExt cx="0" cy="0"/>
+        </a:xfrm>
+      </p:grpSpPr>
+      <p:sp>
+        <p:nvSpPr>
+          <p:cNvPr id="3" name="Marcador de contenido 2"/>
+          <p:cNvSpPr>
+            <a:spLocks noGrp="1"/>
+          </p:cNvSpPr>
+          <p:nvPr>
+            <p:ph idx="1"/>
+          </p:nvPr>
+        </p:nvSpPr>
+        <p:spPr>
+          <a:xfrm>
+            <a:off x="586828" y="995541"/>
+            <a:ext cx="11372943" cy="4835574"/>
+          </a:xfrm>
+        </p:spPr>
+        <p:txBody>
+          <a:bodyPr>
+            <a:normAutofit/>
+          </a:bodyPr>
+          <a:lstStyle/>
+          <a:p>
+            <a:pPr marL="0" indent="0">
+              <a:buNone/>
+            </a:pPr>
+            <a:r>
+              <a:rPr lang="es-MX" sz="2400" dirty="0" smtClean="0"/>
+              <a:t>Realizar un programa en PHP, que pregunte </a:t>
+            </a:r>
+          </a:p>
+          <a:p>
+            <a:pPr marL="0" indent="0">
+              <a:buNone/>
+            </a:pPr>
+            <a:endParaRPr lang="es-MX" sz="2400" dirty="0"/>
+          </a:p>
+          <a:p>
+            <a:pPr marL="0" indent="0">
+              <a:buNone/>
+            </a:pPr>
+            <a:r>
+              <a:rPr lang="es-MX" sz="2400" dirty="0" smtClean="0"/>
+              <a:t>1. cuantos elementos tendrá el vector.</a:t>
+            </a:r>
+          </a:p>
+          <a:p>
+            <a:pPr marL="0" indent="0">
+              <a:buNone/>
+            </a:pPr>
+            <a:r>
+              <a:rPr lang="es-MX" sz="2400" dirty="0" smtClean="0"/>
+              <a:t>2. Generar un vector del 1 al n (según la respuesta) y asignarle el valor</a:t>
+            </a:r>
+          </a:p>
+          <a:p>
+            <a:pPr marL="0" indent="0">
+              <a:buNone/>
+            </a:pPr>
+            <a:r>
+              <a:rPr lang="es-MX" sz="2400" dirty="0" smtClean="0"/>
+              <a:t>De cada elemento con  un valor consecutivo del 1 al n</a:t>
+            </a:r>
+          </a:p>
+          <a:p>
+            <a:pPr marL="0" indent="0">
+              <a:buNone/>
+            </a:pPr>
+            <a:r>
+              <a:rPr lang="es-MX" sz="2400" dirty="0" smtClean="0"/>
+              <a:t>3. Cuando se termine de llenar, presentar en pantalla “Vector Listo”.</a:t>
+            </a:r>
+          </a:p>
+          <a:p>
+            <a:pPr marL="0" indent="0">
+              <a:buNone/>
+            </a:pPr>
+            <a:r>
+              <a:rPr lang="es-MX" sz="2400" dirty="0" smtClean="0"/>
+              <a:t>4. Imprimir cada uno de los elementos del vector.</a:t>
+            </a:r>
+          </a:p>
+          <a:p>
+            <a:pPr marL="0" indent="0">
+              <a:buNone/>
+            </a:pPr>
+            <a:endParaRPr lang="es-MX" sz="2400" dirty="0"/>
+          </a:p>
+          <a:p>
+            <a:pPr marL="0" indent="0">
+              <a:buNone/>
+            </a:pPr>
+            <a:r>
+              <a:rPr lang="es-MX" sz="2400" dirty="0" smtClean="0"/>
+              <a:t>LISSSTOOOOOO.</a:t>
+            </a:r>
+          </a:p>
+          <a:p>
+            <a:pPr marL="0" indent="0">
+              <a:buNone/>
+            </a:pPr>
+            <a:endParaRPr lang="es-MX" sz="2400" dirty="0" smtClean="0"/>
+          </a:p>
+          <a:p>
+            <a:pPr marL="0" indent="0">
+              <a:buNone/>
+            </a:pPr>
+            <a:endParaRPr lang="es-MX" sz="2400" dirty="0" smtClean="0"/>
+          </a:p>
+          <a:p>
+            <a:pPr marL="457200" indent="-457200">
+              <a:buAutoNum type="alphaLcParenR"/>
+            </a:pPr>
+            <a:endParaRPr lang="es-MX" sz="2400" dirty="0" smtClean="0"/>
+          </a:p>
+          <a:p>
+            <a:pPr marL="0" indent="0">
+              <a:buNone/>
+            </a:pPr>
+            <a:endParaRPr lang="es-MX" sz="2400" dirty="0" smtClean="0"/>
+          </a:p>
+          <a:p>
+            <a:pPr marL="0" indent="0">
+              <a:buNone/>
+            </a:pPr>
+            <a:endParaRPr lang="es-MX" sz="4400" dirty="0"/>
+          </a:p>
+        </p:txBody>
+      </p:sp>
+      <p:sp>
+        <p:nvSpPr>
+          <p:cNvPr id="4" name="Título 1"/>
+          <p:cNvSpPr txBox="1">
+            <a:spLocks/>
+          </p:cNvSpPr>
+          <p:nvPr/>
+        </p:nvSpPr>
+        <p:spPr>
+          <a:xfrm>
+            <a:off x="739228" y="257122"/>
+            <a:ext cx="8911687" cy="1280890"/>
+          </a:xfrm>
+          <a:prstGeom prst="rect">
+            <a:avLst/>
+          </a:prstGeom>
+        </p:spPr>
+        <p:txBody>
+          <a:bodyPr vert="horz" lIns="91440" tIns="45720" rIns="91440" bIns="45720" rtlCol="0" anchor="t">
+            <a:noAutofit/>
+          </a:bodyPr>
+          <a:lstStyle>
+            <a:lvl1pPr algn="l" defTabSz="457200" rtl="0" eaLnBrk="1" latinLnBrk="0" hangingPunct="1">
+              <a:spcBef>
+                <a:spcPct val="0"/>
+              </a:spcBef>
+              <a:buNone/>
+              <a:defRPr sz="3600" kern="1200">
+                <a:solidFill>
+                  <a:schemeClr val="tx1">
+                    <a:lumMod val="85000"/>
+                    <a:lumOff val="15000"/>
+                  </a:schemeClr>
+                </a:solidFill>
+                <a:latin typeface="+mj-lt"/>
+                <a:ea typeface="+mj-ea"/>
+                <a:cs typeface="+mj-cs"/>
+              </a:defRPr>
+            </a:lvl1pPr>
+            <a:lvl2pPr eaLnBrk="1" hangingPunct="1">
+              <a:defRPr>
+                <a:solidFill>
+                  <a:schemeClr val="tx2"/>
+                </a:solidFill>
+              </a:defRPr>
+            </a:lvl2pPr>
+            <a:lvl3pPr eaLnBrk="1" hangingPunct="1">
+              <a:defRPr>
+                <a:solidFill>
+                  <a:schemeClr val="tx2"/>
+                </a:solidFill>
+              </a:defRPr>
+            </a:lvl3pPr>
+            <a:lvl4pPr eaLnBrk="1" hangingPunct="1">
+              <a:defRPr>
+                <a:solidFill>
+                  <a:schemeClr val="tx2"/>
+                </a:solidFill>
+              </a:defRPr>
+            </a:lvl4pPr>
+            <a:lvl5pPr eaLnBrk="1" hangingPunct="1">
+              <a:defRPr>
+                <a:solidFill>
+                  <a:schemeClr val="tx2"/>
+                </a:solidFill>
+              </a:defRPr>
+            </a:lvl5pPr>
+            <a:lvl6pPr eaLnBrk="1" hangingPunct="1">
+              <a:defRPr>
+                <a:solidFill>
+                  <a:schemeClr val="tx2"/>
+                </a:solidFill>
+              </a:defRPr>
+            </a:lvl6pPr>
+            <a:lvl7pPr eaLnBrk="1" hangingPunct="1">
+              <a:defRPr>
+                <a:solidFill>
+                  <a:schemeClr val="tx2"/>
+                </a:solidFill>
+              </a:defRPr>
+            </a:lvl7pPr>
+            <a:lvl8pPr eaLnBrk="1" hangingPunct="1">
+              <a:defRPr>
+                <a:solidFill>
+                  <a:schemeClr val="tx2"/>
+                </a:solidFill>
+              </a:defRPr>
+            </a:lvl8pPr>
+            <a:lvl9pPr eaLnBrk="1" hangingPunct="1">
+              <a:defRPr>
+                <a:solidFill>
+                  <a:schemeClr val="tx2"/>
+                </a:solidFill>
+              </a:defRPr>
+            </a:lvl9pPr>
+          </a:lstStyle>
+          <a:p>
+            <a:r>
+              <a:rPr lang="es-MX" sz="4400" dirty="0" smtClean="0"/>
+              <a:t>Ejercicio1</a:t>
+            </a:r>
+            <a:endParaRPr lang="es-MX" sz="4400" dirty="0"/>
+          </a:p>
+        </p:txBody>
+      </p:sp>
+      <p:sp>
+        <p:nvSpPr>
+          <p:cNvPr id="5" name="Marcador de contenido 2"/>
+          <p:cNvSpPr txBox="1">
+            <a:spLocks/>
+          </p:cNvSpPr>
+          <p:nvPr/>
+        </p:nvSpPr>
+        <p:spPr>
+          <a:xfrm>
+            <a:off x="739228" y="1147941"/>
+            <a:ext cx="11039115" cy="4835574"/>
+          </a:xfrm>
+          <a:prstGeom prst="rect">
+            <a:avLst/>
+          </a:prstGeom>
+        </p:spPr>
+        <p:txBody>
+          <a:bodyPr vert="horz" lIns="91440" tIns="45720" rIns="91440" bIns="45720" rtlCol="0">
+            <a:normAutofit/>
+          </a:bodyPr>
+          <a:lstStyle>
+            <a:lvl1pPr marL="342900" indent="-342900" algn="l" defTabSz="457200" rtl="0" eaLnBrk="1" latinLnBrk="0" hangingPunct="1">
+              <a:spcBef>
+                <a:spcPts val="1000"/>
+              </a:spcBef>
+              <a:spcAft>
+                <a:spcPts val="0"/>
+              </a:spcAft>
+              <a:buClr>
+                <a:schemeClr val="accent1"/>
+              </a:buClr>
+              <a:buFont typeface="Wingdings 3" charset="2"/>
+              <a:buChar char=""/>
+              <a:defRPr sz="1800" kern="1200">
+                <a:solidFill>
+                  <a:schemeClr val="tx1">
+                    <a:lumMod val="75000"/>
+                    <a:lumOff val="25000"/>
+                  </a:schemeClr>
+                </a:solidFill>
+                <a:latin typeface="+mn-lt"/>
+                <a:ea typeface="+mn-ea"/>
+                <a:cs typeface="+mn-cs"/>
+              </a:defRPr>
+            </a:lvl1pPr>
+            <a:lvl2pPr marL="742950" indent="-285750" algn="l" defTabSz="457200" rtl="0" eaLnBrk="1" latinLnBrk="0" hangingPunct="1">
+              <a:spcBef>
+                <a:spcPts val="1000"/>
+              </a:spcBef>
+              <a:spcAft>
+                <a:spcPts val="0"/>
+              </a:spcAft>
+              <a:buClr>
+                <a:schemeClr val="accent1"/>
+              </a:buClr>
+              <a:buFont typeface="Wingdings 3" charset="2"/>
+              <a:buChar char=""/>
+              <a:defRPr sz="1600" kern="1200">
+                <a:solidFill>
+                  <a:schemeClr val="tx1">
+                    <a:lumMod val="75000"/>
+                    <a:lumOff val="25000"/>
+                  </a:schemeClr>
+                </a:solidFill>
+                <a:latin typeface="+mn-lt"/>
+                <a:ea typeface="+mn-ea"/>
+                <a:cs typeface="+mn-cs"/>
+              </a:defRPr>
+            </a:lvl2pPr>
+            <a:lvl3pPr marL="1143000" indent="-228600" algn="l" defTabSz="457200" rtl="0" eaLnBrk="1" latinLnBrk="0" hangingPunct="1">
+              <a:spcBef>
+                <a:spcPts val="1000"/>
+              </a:spcBef>
+              <a:spcAft>
+                <a:spcPts val="0"/>
+              </a:spcAft>
+              <a:buClr>
+                <a:schemeClr val="accent1"/>
+              </a:buClr>
+              <a:buFont typeface="Wingdings 3" charset="2"/>
+              <a:buChar char=""/>
+              <a:defRPr sz="1400" kern="1200">
+                <a:solidFill>
+                  <a:schemeClr val="tx1">
+                    <a:lumMod val="75000"/>
+                    <a:lumOff val="25000"/>
+                  </a:schemeClr>
+                </a:solidFill>
+                <a:latin typeface="+mn-lt"/>
+                <a:ea typeface="+mn-ea"/>
+                <a:cs typeface="+mn-cs"/>
+              </a:defRPr>
+            </a:lvl3pPr>
+            <a:lvl4pPr marL="1600200" indent="-228600" algn="l" defTabSz="457200" rtl="0" eaLnBrk="1" latinLnBrk="0" hangingPunct="1">
+              <a:spcBef>
+                <a:spcPts val="1000"/>
+              </a:spcBef>
+              <a:spcAft>
+                <a:spcPts val="0"/>
+              </a:spcAft>
+              <a:buClr>
+                <a:schemeClr val="accent1"/>
+              </a:buClr>
+              <a:buFont typeface="Wingdings 3" charset="2"/>
+              <a:buChar char=""/>
+              <a:defRPr sz="1200" kern="1200">
+                <a:solidFill>
+                  <a:schemeClr val="tx1">
+                    <a:lumMod val="75000"/>
+                    <a:lumOff val="25000"/>
+                  </a:schemeClr>
+                </a:solidFill>
+                <a:latin typeface="+mn-lt"/>
+                <a:ea typeface="+mn-ea"/>
+                <a:cs typeface="+mn-cs"/>
+              </a:defRPr>
+            </a:lvl4pPr>
+            <a:lvl5pPr marL="2057400" indent="-228600" algn="l" defTabSz="457200" rtl="0" eaLnBrk="1" latinLnBrk="0" hangingPunct="1">
+              <a:spcBef>
+                <a:spcPts val="1000"/>
+              </a:spcBef>
+              <a:spcAft>
+                <a:spcPts val="0"/>
+              </a:spcAft>
+              <a:buClr>
+                <a:schemeClr val="accent1"/>
+              </a:buClr>
+              <a:buFont typeface="Wingdings 3" charset="2"/>
+              <a:buChar char=""/>
+              <a:defRPr sz="1200" kern="1200">
+                <a:solidFill>
+                  <a:schemeClr val="tx1">
+                    <a:lumMod val="75000"/>
+                    <a:lumOff val="25000"/>
+                  </a:schemeClr>
+                </a:solidFill>
+                <a:latin typeface="+mn-lt"/>
+                <a:ea typeface="+mn-ea"/>
+                <a:cs typeface="+mn-cs"/>
+              </a:defRPr>
+            </a:lvl5pPr>
+            <a:lvl6pPr marL="2514600" indent="-228600" algn="l" defTabSz="457200" rtl="0" eaLnBrk="1" latinLnBrk="0" hangingPunct="1">
+              <a:spcBef>
+                <a:spcPts val="1000"/>
+              </a:spcBef>
+              <a:spcAft>
+                <a:spcPts val="0"/>
+              </a:spcAft>
+              <a:buClr>
+                <a:schemeClr val="accent1"/>
+              </a:buClr>
+              <a:buFont typeface="Wingdings 3" charset="2"/>
+              <a:buChar char=""/>
+              <a:defRPr sz="1200" kern="1200">
+                <a:solidFill>
+                  <a:schemeClr val="tx1">
+                    <a:lumMod val="75000"/>
+                    <a:lumOff val="25000"/>
+                  </a:schemeClr>
+                </a:solidFill>
+                <a:latin typeface="+mn-lt"/>
+                <a:ea typeface="+mn-ea"/>
+                <a:cs typeface="+mn-cs"/>
+              </a:defRPr>
+            </a:lvl6pPr>
+            <a:lvl7pPr marL="2971800" indent="-228600" algn="l" defTabSz="457200" rtl="0" eaLnBrk="1" latinLnBrk="0" hangingPunct="1">
+              <a:spcBef>
+                <a:spcPts val="1000"/>
+              </a:spcBef>
+              <a:spcAft>
+                <a:spcPts val="0"/>
+              </a:spcAft>
+              <a:buClr>
+                <a:schemeClr val="accent1"/>
+              </a:buClr>
+              <a:buFont typeface="Wingdings 3" charset="2"/>
+              <a:buChar char=""/>
+              <a:defRPr sz="1200" kern="1200">
+                <a:solidFill>
+                  <a:schemeClr val="tx1">
+                    <a:lumMod val="75000"/>
+                    <a:lumOff val="25000"/>
+                  </a:schemeClr>
+                </a:solidFill>
+                <a:latin typeface="+mn-lt"/>
+                <a:ea typeface="+mn-ea"/>
+                <a:cs typeface="+mn-cs"/>
+              </a:defRPr>
+            </a:lvl7pPr>
+            <a:lvl8pPr marL="3429000" indent="-228600" algn="l" defTabSz="457200" rtl="0" eaLnBrk="1" latinLnBrk="0" hangingPunct="1">
+              <a:spcBef>
+                <a:spcPts val="1000"/>
+              </a:spcBef>
+              <a:spcAft>
+                <a:spcPts val="0"/>
+              </a:spcAft>
+              <a:buClr>
+                <a:schemeClr val="accent1"/>
+              </a:buClr>
+              <a:buFont typeface="Wingdings 3" charset="2"/>
+              <a:buChar char=""/>
+              <a:defRPr sz="1200" kern="1200">
+                <a:solidFill>
+                  <a:schemeClr val="tx1">
+                    <a:lumMod val="75000"/>
+                    <a:lumOff val="25000"/>
+                  </a:schemeClr>
+                </a:solidFill>
+                <a:latin typeface="+mn-lt"/>
+                <a:ea typeface="+mn-ea"/>
+                <a:cs typeface="+mn-cs"/>
+              </a:defRPr>
+            </a:lvl8pPr>
+            <a:lvl9pPr marL="3886200" indent="-228600" algn="l" defTabSz="457200" rtl="0" eaLnBrk="1" latinLnBrk="0" hangingPunct="1">
+              <a:spcBef>
+                <a:spcPts val="1000"/>
+              </a:spcBef>
+              <a:spcAft>
+                <a:spcPts val="0"/>
+              </a:spcAft>
+              <a:buClr>
+                <a:schemeClr val="accent1"/>
+              </a:buClr>
+              <a:buFont typeface="Wingdings 3" charset="2"/>
+              <a:buChar char=""/>
+              <a:defRPr sz="1200" kern="1200">
+                <a:solidFill>
+                  <a:schemeClr val="tx1">
+                    <a:lumMod val="75000"/>
+                    <a:lumOff val="25000"/>
+                  </a:schemeClr>
+                </a:solidFill>
+                <a:latin typeface="+mn-lt"/>
+                <a:ea typeface="+mn-ea"/>
+                <a:cs typeface="+mn-cs"/>
+              </a:defRPr>
+            </a:lvl9pPr>
+          </a:lstStyle>
+          <a:p>
+            <a:pPr marL="0" indent="0">
+              <a:buFont typeface="Wingdings 3" charset="2"/>
+              <a:buNone/>
+            </a:pPr>
+            <a:endParaRPr lang="es-MX" sz="2400" dirty="0" smtClean="0"/>
+          </a:p>
+          <a:p>
+            <a:pPr marL="0" indent="0">
+              <a:buFont typeface="Wingdings 3" charset="2"/>
+              <a:buNone/>
+            </a:pPr>
+            <a:endParaRPr lang="es-MX" sz="4400" dirty="0"/>
+          </a:p>
+        </p:txBody>
+      </p:sp>
+    </p:spTree>
+    <p:extLst>
+      <p:ext uri="{BB962C8B-B14F-4D97-AF65-F5344CB8AC3E}">
+        <p14:creationId xmlns:p14="http://schemas.microsoft.com/office/powerpoint/2010/main" val="989927439"/>
       </p:ext>
     </p:extLst>
   </p:cSld>
@@ -11219,7 +11278,52 @@
             </a:pPr>
             <a:r>
               <a:rPr lang="es-MX" sz="2400" dirty="0" smtClean="0"/>
-              <a:t>Realizar un programa en PHP, que pregunte </a:t>
+              <a:t>Modificar el programa anterior</a:t>
+            </a:r>
+          </a:p>
+          <a:p>
+            <a:pPr marL="0" indent="0">
+              <a:buNone/>
+            </a:pPr>
+            <a:r>
+              <a:rPr lang="es-MX" sz="2400" dirty="0" smtClean="0"/>
+              <a:t>Para que cada elemento almacene los número pares consecutivos, es decir…</a:t>
+            </a:r>
+          </a:p>
+          <a:p>
+            <a:pPr marL="0" indent="0">
+              <a:buNone/>
+            </a:pPr>
+            <a:r>
+              <a:rPr lang="es-MX" sz="2400" dirty="0" smtClean="0"/>
+              <a:t>$vector[1]=2;</a:t>
+            </a:r>
+          </a:p>
+          <a:p>
+            <a:pPr marL="0" indent="0">
+              <a:buNone/>
+            </a:pPr>
+            <a:r>
+              <a:rPr lang="es-MX" sz="2400" dirty="0"/>
+              <a:t>$</a:t>
+            </a:r>
+            <a:r>
+              <a:rPr lang="es-MX" sz="2400" dirty="0" smtClean="0"/>
+              <a:t>vector[2]=4;</a:t>
+            </a:r>
+            <a:endParaRPr lang="es-MX" sz="2400" dirty="0"/>
+          </a:p>
+          <a:p>
+            <a:pPr marL="0" indent="0">
+              <a:buNone/>
+            </a:pPr>
+            <a:r>
+              <a:rPr lang="es-MX" sz="2400" dirty="0"/>
+              <a:t>$</a:t>
+            </a:r>
+            <a:r>
+              <a:rPr lang="es-MX" sz="2400" dirty="0" smtClean="0"/>
+              <a:t>vector[3]=6;</a:t>
             </a:r>
           </a:p>
           <a:p>
@@ -11234,71 +11338,26 @@
             </a:pPr>
             <a:r>
               <a:rPr lang="es-MX" sz="2400" dirty="0" smtClean="0"/>
-              <a:t>1. cuantos elementos tendrá el vector.</a:t>
-            </a:r>
-          </a:p>
-          <a:p>
-            <a:pPr marL="0" indent="0">
-              <a:buNone/>
+              <a:t>Imprimir los valores del arreglo y obtener e imprimir :</a:t>
+            </a:r>
+          </a:p>
+          <a:p>
+            <a:pPr marL="457200" indent="-457200">
+              <a:buAutoNum type="alphaLcParenR"/>
             </a:pPr>
             <a:r>
               <a:rPr lang="es-MX" sz="2400" dirty="0" smtClean="0"/>
-              <a:t>2. Generar un vector del 1 al n (según la respuesta) y asignarle el valor</a:t>
-            </a:r>
-          </a:p>
-          <a:p>
-            <a:pPr marL="0" indent="0">
-              <a:buNone/>
+              <a:t>La suma total de los elementos</a:t>
+            </a:r>
+          </a:p>
+          <a:p>
+            <a:pPr marL="457200" indent="-457200">
+              <a:buAutoNum type="alphaLcParenR"/>
             </a:pPr>
             <a:r>
               <a:rPr lang="es-MX" sz="2400" dirty="0" smtClean="0"/>
-              <a:t>De cada elemento con  un valor consecutivo del 1 al n</a:t>
-            </a:r>
-          </a:p>
-          <a:p>
-            <a:pPr marL="0" indent="0">
-              <a:buNone/>
-            </a:pPr>
-            <a:r>
-              <a:rPr lang="es-MX" sz="2400" dirty="0" smtClean="0"/>
-              <a:t>3. Cuando se termine de llenar, presentar en pantalla “Vector Listo”.</a:t>
-            </a:r>
-          </a:p>
-          <a:p>
-            <a:pPr marL="0" indent="0">
-              <a:buNone/>
-            </a:pPr>
-            <a:r>
-              <a:rPr lang="es-MX" sz="2400" dirty="0" smtClean="0"/>
-              <a:t>4. Imprimir cada uno de los elementos del vector.</a:t>
-            </a:r>
-          </a:p>
-          <a:p>
-            <a:pPr marL="0" indent="0">
-              <a:buNone/>
-            </a:pPr>
-            <a:endParaRPr lang="es-MX" sz="2400" dirty="0"/>
-          </a:p>
-          <a:p>
-            <a:pPr marL="0" indent="0">
-              <a:buNone/>
-            </a:pPr>
-            <a:r>
-              <a:rPr lang="es-MX" sz="2400" dirty="0" smtClean="0"/>
-              <a:t>LISSSTOOOOOO.</a:t>
-            </a:r>
-          </a:p>
-          <a:p>
-            <a:pPr marL="0" indent="0">
-              <a:buNone/>
-            </a:pPr>
-            <a:endParaRPr lang="es-MX" sz="2400" dirty="0" smtClean="0"/>
-          </a:p>
-          <a:p>
-            <a:pPr marL="0" indent="0">
-              <a:buNone/>
-            </a:pPr>
-            <a:endParaRPr lang="es-MX" sz="2400" dirty="0" smtClean="0"/>
+              <a:t>El promedio de todos los elementos  (la suma total / total de elementos)</a:t>
+            </a:r>
           </a:p>
           <a:p>
             <a:pPr marL="457200" indent="-457200">
@@ -11419,7 +11478,7 @@
           <a:p>
             <a:r>
               <a:rPr lang="es-MX" sz="4400" dirty="0" smtClean="0"/>
-              <a:t>Ejercicio1</a:t>
+              <a:t>Ejercicio2</a:t>
             </a:r>
             <a:endParaRPr lang="es-MX" sz="4400" dirty="0"/>
           </a:p>
@@ -11683,7 +11742,7 @@
     </p:spTree>
     <p:extLst>
       <p:ext uri="{BB962C8B-B14F-4D97-AF65-F5344CB8AC3E}">
-        <p14:creationId xmlns:p14="http://schemas.microsoft.com/office/powerpoint/2010/main" val="989927439"/>
+        <p14:creationId xmlns:p14="http://schemas.microsoft.com/office/powerpoint/2010/main" val="4076109101"/>
       </p:ext>
     </p:extLst>
   </p:cSld>
@@ -11719,531 +11778,6 @@
       </p:grpSpPr>
       <p:sp>
         <p:nvSpPr>
-          <p:cNvPr id="3" name="Marcador de contenido 2"/>
-          <p:cNvSpPr>
-            <a:spLocks noGrp="1"/>
-          </p:cNvSpPr>
-          <p:nvPr>
-            <p:ph idx="1"/>
-          </p:nvPr>
-        </p:nvSpPr>
-        <p:spPr>
-          <a:xfrm>
-            <a:off x="586828" y="995541"/>
-            <a:ext cx="11372943" cy="4835574"/>
-          </a:xfrm>
-        </p:spPr>
-        <p:txBody>
-          <a:bodyPr>
-            <a:normAutofit/>
-          </a:bodyPr>
-          <a:lstStyle/>
-          <a:p>
-            <a:pPr marL="0" indent="0">
-              <a:buNone/>
-            </a:pPr>
-            <a:r>
-              <a:rPr lang="es-MX" sz="2400" dirty="0" smtClean="0"/>
-              <a:t>Modificar el programa anterior</a:t>
-            </a:r>
-          </a:p>
-          <a:p>
-            <a:pPr marL="0" indent="0">
-              <a:buNone/>
-            </a:pPr>
-            <a:r>
-              <a:rPr lang="es-MX" sz="2400" dirty="0" smtClean="0"/>
-              <a:t>Para que cada elemento almacene los número pares consecutivos, es decir…</a:t>
-            </a:r>
-          </a:p>
-          <a:p>
-            <a:pPr marL="0" indent="0">
-              <a:buNone/>
-            </a:pPr>
-            <a:r>
-              <a:rPr lang="es-MX" sz="2400" dirty="0" smtClean="0"/>
-              <a:t>$vector[1]=2;</a:t>
-            </a:r>
-          </a:p>
-          <a:p>
-            <a:pPr marL="0" indent="0">
-              <a:buNone/>
-            </a:pPr>
-            <a:r>
-              <a:rPr lang="es-MX" sz="2400" dirty="0"/>
-              <a:t>$</a:t>
-            </a:r>
-            <a:r>
-              <a:rPr lang="es-MX" sz="2400" dirty="0" smtClean="0"/>
-              <a:t>vector[2]=4;</a:t>
-            </a:r>
-            <a:endParaRPr lang="es-MX" sz="2400" dirty="0"/>
-          </a:p>
-          <a:p>
-            <a:pPr marL="0" indent="0">
-              <a:buNone/>
-            </a:pPr>
-            <a:r>
-              <a:rPr lang="es-MX" sz="2400" dirty="0"/>
-              <a:t>$</a:t>
-            </a:r>
-            <a:r>
-              <a:rPr lang="es-MX" sz="2400" dirty="0" smtClean="0"/>
-              <a:t>vector[3]=6;</a:t>
-            </a:r>
-          </a:p>
-          <a:p>
-            <a:pPr marL="0" indent="0">
-              <a:buNone/>
-            </a:pPr>
-            <a:endParaRPr lang="es-MX" sz="2400" dirty="0"/>
-          </a:p>
-          <a:p>
-            <a:pPr marL="0" indent="0">
-              <a:buNone/>
-            </a:pPr>
-            <a:r>
-              <a:rPr lang="es-MX" sz="2400" dirty="0" smtClean="0"/>
-              <a:t>Imprimir los valores del arreglo y obtener e imprimir :</a:t>
-            </a:r>
-          </a:p>
-          <a:p>
-            <a:pPr marL="457200" indent="-457200">
-              <a:buAutoNum type="alphaLcParenR"/>
-            </a:pPr>
-            <a:r>
-              <a:rPr lang="es-MX" sz="2400" dirty="0" smtClean="0"/>
-              <a:t>La suma total de los elementos</a:t>
-            </a:r>
-          </a:p>
-          <a:p>
-            <a:pPr marL="457200" indent="-457200">
-              <a:buAutoNum type="alphaLcParenR"/>
-            </a:pPr>
-            <a:r>
-              <a:rPr lang="es-MX" sz="2400" dirty="0" smtClean="0"/>
-              <a:t>El promedio de todos los elementos  (la suma total / total de elementos)</a:t>
-            </a:r>
-          </a:p>
-          <a:p>
-            <a:pPr marL="457200" indent="-457200">
-              <a:buAutoNum type="alphaLcParenR"/>
-            </a:pPr>
-            <a:endParaRPr lang="es-MX" sz="2400" dirty="0" smtClean="0"/>
-          </a:p>
-          <a:p>
-            <a:pPr marL="0" indent="0">
-              <a:buNone/>
-            </a:pPr>
-            <a:endParaRPr lang="es-MX" sz="2400" dirty="0" smtClean="0"/>
-          </a:p>
-          <a:p>
-            <a:pPr marL="0" indent="0">
-              <a:buNone/>
-            </a:pPr>
-            <a:endParaRPr lang="es-MX" sz="4400" dirty="0"/>
-          </a:p>
-        </p:txBody>
-      </p:sp>
-      <p:sp>
-        <p:nvSpPr>
-          <p:cNvPr id="4" name="Título 1"/>
-          <p:cNvSpPr txBox="1">
-            <a:spLocks/>
-          </p:cNvSpPr>
-          <p:nvPr/>
-        </p:nvSpPr>
-        <p:spPr>
-          <a:xfrm>
-            <a:off x="739228" y="257122"/>
-            <a:ext cx="8911687" cy="1280890"/>
-          </a:xfrm>
-          <a:prstGeom prst="rect">
-            <a:avLst/>
-          </a:prstGeom>
-        </p:spPr>
-        <p:txBody>
-          <a:bodyPr vert="horz" lIns="91440" tIns="45720" rIns="91440" bIns="45720" rtlCol="0" anchor="t">
-            <a:noAutofit/>
-          </a:bodyPr>
-          <a:lstStyle>
-            <a:lvl1pPr algn="l" defTabSz="457200" rtl="0" eaLnBrk="1" latinLnBrk="0" hangingPunct="1">
-              <a:spcBef>
-                <a:spcPct val="0"/>
-              </a:spcBef>
-              <a:buNone/>
-              <a:defRPr sz="3600" kern="1200">
-                <a:solidFill>
-                  <a:schemeClr val="tx1">
-                    <a:lumMod val="85000"/>
-                    <a:lumOff val="15000"/>
-                  </a:schemeClr>
-                </a:solidFill>
-                <a:latin typeface="+mj-lt"/>
-                <a:ea typeface="+mj-ea"/>
-                <a:cs typeface="+mj-cs"/>
-              </a:defRPr>
-            </a:lvl1pPr>
-            <a:lvl2pPr eaLnBrk="1" hangingPunct="1">
-              <a:defRPr>
-                <a:solidFill>
-                  <a:schemeClr val="tx2"/>
-                </a:solidFill>
-              </a:defRPr>
-            </a:lvl2pPr>
-            <a:lvl3pPr eaLnBrk="1" hangingPunct="1">
-              <a:defRPr>
-                <a:solidFill>
-                  <a:schemeClr val="tx2"/>
-                </a:solidFill>
-              </a:defRPr>
-            </a:lvl3pPr>
-            <a:lvl4pPr eaLnBrk="1" hangingPunct="1">
-              <a:defRPr>
-                <a:solidFill>
-                  <a:schemeClr val="tx2"/>
-                </a:solidFill>
-              </a:defRPr>
-            </a:lvl4pPr>
-            <a:lvl5pPr eaLnBrk="1" hangingPunct="1">
-              <a:defRPr>
-                <a:solidFill>
-                  <a:schemeClr val="tx2"/>
-                </a:solidFill>
-              </a:defRPr>
-            </a:lvl5pPr>
-            <a:lvl6pPr eaLnBrk="1" hangingPunct="1">
-              <a:defRPr>
-                <a:solidFill>
-                  <a:schemeClr val="tx2"/>
-                </a:solidFill>
-              </a:defRPr>
-            </a:lvl6pPr>
-            <a:lvl7pPr eaLnBrk="1" hangingPunct="1">
-              <a:defRPr>
-                <a:solidFill>
-                  <a:schemeClr val="tx2"/>
-                </a:solidFill>
-              </a:defRPr>
-            </a:lvl7pPr>
-            <a:lvl8pPr eaLnBrk="1" hangingPunct="1">
-              <a:defRPr>
-                <a:solidFill>
-                  <a:schemeClr val="tx2"/>
-                </a:solidFill>
-              </a:defRPr>
-            </a:lvl8pPr>
-            <a:lvl9pPr eaLnBrk="1" hangingPunct="1">
-              <a:defRPr>
-                <a:solidFill>
-                  <a:schemeClr val="tx2"/>
-                </a:solidFill>
-              </a:defRPr>
-            </a:lvl9pPr>
-          </a:lstStyle>
-          <a:p>
-            <a:r>
-              <a:rPr lang="es-MX" sz="4400" dirty="0" smtClean="0"/>
-              <a:t>Ejercicio2</a:t>
-            </a:r>
-            <a:endParaRPr lang="es-MX" sz="4400" dirty="0"/>
-          </a:p>
-        </p:txBody>
-      </p:sp>
-      <p:sp>
-        <p:nvSpPr>
-          <p:cNvPr id="5" name="Marcador de contenido 2"/>
-          <p:cNvSpPr txBox="1">
-            <a:spLocks/>
-          </p:cNvSpPr>
-          <p:nvPr/>
-        </p:nvSpPr>
-        <p:spPr>
-          <a:xfrm>
-            <a:off x="739228" y="1147941"/>
-            <a:ext cx="11039115" cy="4835574"/>
-          </a:xfrm>
-          <a:prstGeom prst="rect">
-            <a:avLst/>
-          </a:prstGeom>
-        </p:spPr>
-        <p:txBody>
-          <a:bodyPr vert="horz" lIns="91440" tIns="45720" rIns="91440" bIns="45720" rtlCol="0">
-            <a:normAutofit/>
-          </a:bodyPr>
-          <a:lstStyle>
-            <a:lvl1pPr marL="342900" indent="-342900" algn="l" defTabSz="457200" rtl="0" eaLnBrk="1" latinLnBrk="0" hangingPunct="1">
-              <a:spcBef>
-                <a:spcPts val="1000"/>
-              </a:spcBef>
-              <a:spcAft>
-                <a:spcPts val="0"/>
-              </a:spcAft>
-              <a:buClr>
-                <a:schemeClr val="accent1"/>
-              </a:buClr>
-              <a:buFont typeface="Wingdings 3" charset="2"/>
-              <a:buChar char=""/>
-              <a:defRPr sz="1800" kern="1200">
-                <a:solidFill>
-                  <a:schemeClr val="tx1">
-                    <a:lumMod val="75000"/>
-                    <a:lumOff val="25000"/>
-                  </a:schemeClr>
-                </a:solidFill>
-                <a:latin typeface="+mn-lt"/>
-                <a:ea typeface="+mn-ea"/>
-                <a:cs typeface="+mn-cs"/>
-              </a:defRPr>
-            </a:lvl1pPr>
-            <a:lvl2pPr marL="742950" indent="-285750" algn="l" defTabSz="457200" rtl="0" eaLnBrk="1" latinLnBrk="0" hangingPunct="1">
-              <a:spcBef>
-                <a:spcPts val="1000"/>
-              </a:spcBef>
-              <a:spcAft>
-                <a:spcPts val="0"/>
-              </a:spcAft>
-              <a:buClr>
-                <a:schemeClr val="accent1"/>
-              </a:buClr>
-              <a:buFont typeface="Wingdings 3" charset="2"/>
-              <a:buChar char=""/>
-              <a:defRPr sz="1600" kern="1200">
-                <a:solidFill>
-                  <a:schemeClr val="tx1">
-                    <a:lumMod val="75000"/>
-                    <a:lumOff val="25000"/>
-                  </a:schemeClr>
-                </a:solidFill>
-                <a:latin typeface="+mn-lt"/>
-                <a:ea typeface="+mn-ea"/>
-                <a:cs typeface="+mn-cs"/>
-              </a:defRPr>
-            </a:lvl2pPr>
-            <a:lvl3pPr marL="1143000" indent="-228600" algn="l" defTabSz="457200" rtl="0" eaLnBrk="1" latinLnBrk="0" hangingPunct="1">
-              <a:spcBef>
-                <a:spcPts val="1000"/>
-              </a:spcBef>
-              <a:spcAft>
-                <a:spcPts val="0"/>
-              </a:spcAft>
-              <a:buClr>
-                <a:schemeClr val="accent1"/>
-              </a:buClr>
-              <a:buFont typeface="Wingdings 3" charset="2"/>
-              <a:buChar char=""/>
-              <a:defRPr sz="1400" kern="1200">
-                <a:solidFill>
-                  <a:schemeClr val="tx1">
-                    <a:lumMod val="75000"/>
-                    <a:lumOff val="25000"/>
-                  </a:schemeClr>
-                </a:solidFill>
-                <a:latin typeface="+mn-lt"/>
-                <a:ea typeface="+mn-ea"/>
-                <a:cs typeface="+mn-cs"/>
-              </a:defRPr>
-            </a:lvl3pPr>
-            <a:lvl4pPr marL="1600200" indent="-228600" algn="l" defTabSz="457200" rtl="0" eaLnBrk="1" latinLnBrk="0" hangingPunct="1">
-              <a:spcBef>
-                <a:spcPts val="1000"/>
-              </a:spcBef>
-              <a:spcAft>
-                <a:spcPts val="0"/>
-              </a:spcAft>
-              <a:buClr>
-                <a:schemeClr val="accent1"/>
-              </a:buClr>
-              <a:buFont typeface="Wingdings 3" charset="2"/>
-              <a:buChar char=""/>
-              <a:defRPr sz="1200" kern="1200">
-                <a:solidFill>
-                  <a:schemeClr val="tx1">
-                    <a:lumMod val="75000"/>
-                    <a:lumOff val="25000"/>
-                  </a:schemeClr>
-                </a:solidFill>
-                <a:latin typeface="+mn-lt"/>
-                <a:ea typeface="+mn-ea"/>
-                <a:cs typeface="+mn-cs"/>
-              </a:defRPr>
-            </a:lvl4pPr>
-            <a:lvl5pPr marL="2057400" indent="-228600" algn="l" defTabSz="457200" rtl="0" eaLnBrk="1" latinLnBrk="0" hangingPunct="1">
-              <a:spcBef>
-                <a:spcPts val="1000"/>
-              </a:spcBef>
-              <a:spcAft>
-                <a:spcPts val="0"/>
-              </a:spcAft>
-              <a:buClr>
-                <a:schemeClr val="accent1"/>
-              </a:buClr>
-              <a:buFont typeface="Wingdings 3" charset="2"/>
-              <a:buChar char=""/>
-              <a:defRPr sz="1200" kern="1200">
-                <a:solidFill>
-                  <a:schemeClr val="tx1">
-                    <a:lumMod val="75000"/>
-                    <a:lumOff val="25000"/>
-                  </a:schemeClr>
-                </a:solidFill>
-                <a:latin typeface="+mn-lt"/>
-                <a:ea typeface="+mn-ea"/>
-                <a:cs typeface="+mn-cs"/>
-              </a:defRPr>
-            </a:lvl5pPr>
-            <a:lvl6pPr marL="2514600" indent="-228600" algn="l" defTabSz="457200" rtl="0" eaLnBrk="1" latinLnBrk="0" hangingPunct="1">
-              <a:spcBef>
-                <a:spcPts val="1000"/>
-              </a:spcBef>
-              <a:spcAft>
-                <a:spcPts val="0"/>
-              </a:spcAft>
-              <a:buClr>
-                <a:schemeClr val="accent1"/>
-              </a:buClr>
-              <a:buFont typeface="Wingdings 3" charset="2"/>
-              <a:buChar char=""/>
-              <a:defRPr sz="1200" kern="1200">
-                <a:solidFill>
-                  <a:schemeClr val="tx1">
-                    <a:lumMod val="75000"/>
-                    <a:lumOff val="25000"/>
-                  </a:schemeClr>
-                </a:solidFill>
-                <a:latin typeface="+mn-lt"/>
-                <a:ea typeface="+mn-ea"/>
-                <a:cs typeface="+mn-cs"/>
-              </a:defRPr>
-            </a:lvl6pPr>
-            <a:lvl7pPr marL="2971800" indent="-228600" algn="l" defTabSz="457200" rtl="0" eaLnBrk="1" latinLnBrk="0" hangingPunct="1">
-              <a:spcBef>
-                <a:spcPts val="1000"/>
-              </a:spcBef>
-              <a:spcAft>
-                <a:spcPts val="0"/>
-              </a:spcAft>
-              <a:buClr>
-                <a:schemeClr val="accent1"/>
-              </a:buClr>
-              <a:buFont typeface="Wingdings 3" charset="2"/>
-              <a:buChar char=""/>
-              <a:defRPr sz="1200" kern="1200">
-                <a:solidFill>
-                  <a:schemeClr val="tx1">
-                    <a:lumMod val="75000"/>
-                    <a:lumOff val="25000"/>
-                  </a:schemeClr>
-                </a:solidFill>
-                <a:latin typeface="+mn-lt"/>
-                <a:ea typeface="+mn-ea"/>
-                <a:cs typeface="+mn-cs"/>
-              </a:defRPr>
-            </a:lvl7pPr>
-            <a:lvl8pPr marL="3429000" indent="-228600" algn="l" defTabSz="457200" rtl="0" eaLnBrk="1" latinLnBrk="0" hangingPunct="1">
-              <a:spcBef>
-                <a:spcPts val="1000"/>
-              </a:spcBef>
-              <a:spcAft>
-                <a:spcPts val="0"/>
-              </a:spcAft>
-              <a:buClr>
-                <a:schemeClr val="accent1"/>
-              </a:buClr>
-              <a:buFont typeface="Wingdings 3" charset="2"/>
-              <a:buChar char=""/>
-              <a:defRPr sz="1200" kern="1200">
-                <a:solidFill>
-                  <a:schemeClr val="tx1">
-                    <a:lumMod val="75000"/>
-                    <a:lumOff val="25000"/>
-                  </a:schemeClr>
-                </a:solidFill>
-                <a:latin typeface="+mn-lt"/>
-                <a:ea typeface="+mn-ea"/>
-                <a:cs typeface="+mn-cs"/>
-              </a:defRPr>
-            </a:lvl8pPr>
-            <a:lvl9pPr marL="3886200" indent="-228600" algn="l" defTabSz="457200" rtl="0" eaLnBrk="1" latinLnBrk="0" hangingPunct="1">
-              <a:spcBef>
-                <a:spcPts val="1000"/>
-              </a:spcBef>
-              <a:spcAft>
-                <a:spcPts val="0"/>
-              </a:spcAft>
-              <a:buClr>
-                <a:schemeClr val="accent1"/>
-              </a:buClr>
-              <a:buFont typeface="Wingdings 3" charset="2"/>
-              <a:buChar char=""/>
-              <a:defRPr sz="1200" kern="1200">
-                <a:solidFill>
-                  <a:schemeClr val="tx1">
-                    <a:lumMod val="75000"/>
-                    <a:lumOff val="25000"/>
-                  </a:schemeClr>
-                </a:solidFill>
-                <a:latin typeface="+mn-lt"/>
-                <a:ea typeface="+mn-ea"/>
-                <a:cs typeface="+mn-cs"/>
-              </a:defRPr>
-            </a:lvl9pPr>
-          </a:lstStyle>
-          <a:p>
-            <a:pPr marL="0" indent="0">
-              <a:buFont typeface="Wingdings 3" charset="2"/>
-              <a:buNone/>
-            </a:pPr>
-            <a:endParaRPr lang="es-MX" sz="2400" dirty="0" smtClean="0"/>
-          </a:p>
-          <a:p>
-            <a:pPr marL="0" indent="0">
-              <a:buFont typeface="Wingdings 3" charset="2"/>
-              <a:buNone/>
-            </a:pPr>
-            <a:endParaRPr lang="es-MX" sz="4400" dirty="0"/>
-          </a:p>
-        </p:txBody>
-      </p:sp>
-    </p:spTree>
-    <p:extLst>
-      <p:ext uri="{BB962C8B-B14F-4D97-AF65-F5344CB8AC3E}">
-        <p14:creationId xmlns:p14="http://schemas.microsoft.com/office/powerpoint/2010/main" val="4076109101"/>
-      </p:ext>
-    </p:extLst>
-  </p:cSld>
-  <p:clrMapOvr>
-    <a:masterClrMapping/>
-  </p:clrMapOvr>
-  <p:timing>
-    <p:tnLst>
-      <p:par>
-        <p:cTn id="1" dur="indefinite" restart="never" nodeType="tmRoot"/>
-      </p:par>
-    </p:tnLst>
-  </p:timing>
-</p:sld>
-</file>
-
-<file path=ppt/slides/slide16.xml><?xml version="1.0" encoding="utf-8"?>
-<p:sld xmlns:a="http://schemas.openxmlformats.org/drawingml/2006/main" xmlns:r="http://schemas.openxmlformats.org/officeDocument/2006/relationships" xmlns:p="http://schemas.openxmlformats.org/presentationml/2006/main">
-  <p:cSld>
-    <p:spTree>
-      <p:nvGrpSpPr>
-        <p:cNvPr id="1" name=""/>
-        <p:cNvGrpSpPr/>
-        <p:nvPr/>
-      </p:nvGrpSpPr>
-      <p:grpSpPr>
-        <a:xfrm>
-          <a:off x="0" y="0"/>
-          <a:ext cx="0" cy="0"/>
-          <a:chOff x="0" y="0"/>
-          <a:chExt cx="0" cy="0"/>
-        </a:xfrm>
-      </p:grpSpPr>
-      <p:sp>
-        <p:nvSpPr>
           <p:cNvPr id="2" name="Título 1"/>
           <p:cNvSpPr>
             <a:spLocks noGrp="1"/>
@@ -12842,120 +12376,7 @@
 </p:sld>
 </file>
 
-<file path=ppt/slides/slide17.xml><?xml version="1.0" encoding="utf-8"?>
-<p:sld xmlns:a="http://schemas.openxmlformats.org/drawingml/2006/main" xmlns:r="http://schemas.openxmlformats.org/officeDocument/2006/relationships" xmlns:p="http://schemas.openxmlformats.org/presentationml/2006/main">
-  <p:cSld>
-    <p:spTree>
-      <p:nvGrpSpPr>
-        <p:cNvPr id="1" name=""/>
-        <p:cNvGrpSpPr/>
-        <p:nvPr/>
-      </p:nvGrpSpPr>
-      <p:grpSpPr>
-        <a:xfrm>
-          <a:off x="0" y="0"/>
-          <a:ext cx="0" cy="0"/>
-          <a:chOff x="0" y="0"/>
-          <a:chExt cx="0" cy="0"/>
-        </a:xfrm>
-      </p:grpSpPr>
-      <p:sp>
-        <p:nvSpPr>
-          <p:cNvPr id="2" name="Título 1"/>
-          <p:cNvSpPr>
-            <a:spLocks noGrp="1"/>
-          </p:cNvSpPr>
-          <p:nvPr>
-            <p:ph type="title"/>
-          </p:nvPr>
-        </p:nvSpPr>
-        <p:spPr/>
-        <p:txBody>
-          <a:bodyPr/>
-          <a:lstStyle/>
-          <a:p>
-            <a:r>
-              <a:rPr lang="es-MX" dirty="0" smtClean="0"/>
-              <a:t>Ordenamiento Shell</a:t>
-            </a:r>
-            <a:endParaRPr lang="es-MX" dirty="0"/>
-          </a:p>
-        </p:txBody>
-      </p:sp>
-      <p:sp>
-        <p:nvSpPr>
-          <p:cNvPr id="3" name="Marcador de contenido 2"/>
-          <p:cNvSpPr>
-            <a:spLocks noGrp="1"/>
-          </p:cNvSpPr>
-          <p:nvPr>
-            <p:ph idx="1"/>
-          </p:nvPr>
-        </p:nvSpPr>
-        <p:spPr/>
-        <p:txBody>
-          <a:bodyPr/>
-          <a:lstStyle/>
-          <a:p>
-            <a:endParaRPr lang="es-MX" dirty="0"/>
-          </a:p>
-        </p:txBody>
-      </p:sp>
-      <p:pic>
-        <p:nvPicPr>
-          <p:cNvPr id="1026" name="Picture 2" descr="http://image.slidesharecdn.com/mtododeordenamientoshell-110412124920-phpapp01/95/slide-5-728.jpg?1302630623"/>
-          <p:cNvPicPr>
-            <a:picLocks noChangeAspect="1" noChangeArrowheads="1"/>
-          </p:cNvPicPr>
-          <p:nvPr/>
-        </p:nvPicPr>
-        <p:blipFill>
-          <a:blip r:embed="rId2">
-            <a:extLst>
-              <a:ext uri="{28A0092B-C50C-407E-A947-70E740481C1C}">
-                <a14:useLocalDpi xmlns:a14="http://schemas.microsoft.com/office/drawing/2010/main" val="0"/>
-              </a:ext>
-            </a:extLst>
-          </a:blip>
-          <a:srcRect/>
-          <a:stretch>
-            <a:fillRect/>
-          </a:stretch>
-        </p:blipFill>
-        <p:spPr bwMode="auto">
-          <a:xfrm>
-            <a:off x="4436532" y="1905001"/>
-            <a:ext cx="6077479" cy="4558110"/>
-          </a:xfrm>
-          <a:prstGeom prst="rect">
-            <a:avLst/>
-          </a:prstGeom>
-          <a:noFill/>
-          <a:extLst>
-            <a:ext uri="{909E8E84-426E-40DD-AFC4-6F175D3DCCD1}">
-              <a14:hiddenFill xmlns:a14="http://schemas.microsoft.com/office/drawing/2010/main">
-                <a:solidFill>
-                  <a:srgbClr val="FFFFFF"/>
-                </a:solidFill>
-              </a14:hiddenFill>
-            </a:ext>
-          </a:extLst>
-        </p:spPr>
-      </p:pic>
-    </p:spTree>
-    <p:extLst>
-      <p:ext uri="{BB962C8B-B14F-4D97-AF65-F5344CB8AC3E}">
-        <p14:creationId xmlns:p14="http://schemas.microsoft.com/office/powerpoint/2010/main" val="2399686240"/>
-      </p:ext>
-    </p:extLst>
-  </p:cSld>
-  <p:clrMapOvr>
-    <a:masterClrMapping/>
-  </p:clrMapOvr>
-</p:sld>
-</file>
-
-<file path=ppt/slides/slide18.xml><?xml version="1.0" encoding="utf-8"?>
+<file path=ppt/slides/slide16.xml><?xml version="1.0" encoding="utf-8"?>
 <p:sld xmlns:a="http://schemas.openxmlformats.org/drawingml/2006/main" xmlns:r="http://schemas.openxmlformats.org/officeDocument/2006/relationships" xmlns:p="http://schemas.openxmlformats.org/presentationml/2006/main">
   <p:cSld>
     <p:spTree>
@@ -13012,7 +12433,7 @@
         </p:nvSpPr>
         <p:spPr>
           <a:xfrm>
-            <a:off x="1511973" y="1657611"/>
+            <a:off x="1334173" y="1466589"/>
             <a:ext cx="8915400" cy="3777622"/>
           </a:xfrm>
         </p:spPr>
@@ -13047,6 +12468,17 @@
             </a:r>
           </a:p>
           <a:p>
+            <a:r>
+              <a:rPr lang="es-MX" dirty="0" smtClean="0"/>
+              <a:t>Ordenamiento </a:t>
+            </a:r>
+            <a:r>
+              <a:rPr lang="es-MX" dirty="0" err="1" smtClean="0"/>
+              <a:t>Quicksort</a:t>
+            </a:r>
+            <a:endParaRPr lang="es-MX" dirty="0" smtClean="0"/>
+          </a:p>
+          <a:p>
             <a:endParaRPr lang="es-MX" dirty="0" smtClean="0"/>
           </a:p>
           <a:p>
@@ -13066,7 +12498,7 @@
             </a:pPr>
             <a:r>
               <a:rPr lang="es-MX" dirty="0" smtClean="0"/>
-              <a:t>Código impreso (documentado) de cada uno de ustedes</a:t>
+              <a:t>Código Ejemplo </a:t>
             </a:r>
           </a:p>
           <a:p>
@@ -13076,7 +12508,7 @@
             </a:pPr>
             <a:r>
               <a:rPr lang="es-MX" dirty="0" smtClean="0"/>
-              <a:t>Envío por correo electrónico a Esdras.chuc@upb.edu.mx</a:t>
+              <a:t>Impreso</a:t>
             </a:r>
           </a:p>
           <a:p>
@@ -13369,7 +12801,7 @@
           <a:p>
             <a:r>
               <a:rPr lang="es-MX" sz="4400" dirty="0" smtClean="0"/>
-              <a:t>UNIDAD 1</a:t>
+              <a:t>UNIDAD 2</a:t>
             </a:r>
             <a:endParaRPr lang="es-MX" sz="4400" dirty="0"/>
           </a:p>
@@ -13512,7 +12944,7 @@
     </p:spTree>
     <p:extLst>
       <p:ext uri="{BB962C8B-B14F-4D97-AF65-F5344CB8AC3E}">
-        <p14:creationId xmlns:p14="http://schemas.microsoft.com/office/powerpoint/2010/main" val="2834416495"/>
+        <p14:creationId xmlns:p14="http://schemas.microsoft.com/office/powerpoint/2010/main" val="1242272498"/>
       </p:ext>
     </p:extLst>
   </p:cSld>
@@ -13570,7 +13002,7 @@
           <a:p>
             <a:r>
               <a:rPr lang="es-MX" sz="4400" dirty="0" smtClean="0"/>
-              <a:t>UNIDAD 1</a:t>
+              <a:t>Optimizar</a:t>
             </a:r>
             <a:endParaRPr lang="es-MX" sz="4400" dirty="0"/>
           </a:p>
@@ -13578,7 +13010,7 @@
       </p:sp>
       <p:sp>
         <p:nvSpPr>
-          <p:cNvPr id="3" name="Marcador de contenido 2"/>
+          <p:cNvPr id="4" name="Marcador de contenido 3"/>
           <p:cNvSpPr>
             <a:spLocks noGrp="1"/>
           </p:cNvSpPr>
@@ -13586,134 +13018,222 @@
             <p:ph idx="1"/>
           </p:nvPr>
         </p:nvSpPr>
-        <p:spPr>
-          <a:xfrm>
-            <a:off x="830751" y="1134793"/>
-            <a:ext cx="10831366" cy="4942450"/>
-          </a:xfrm>
-        </p:spPr>
+        <p:spPr/>
         <p:txBody>
-          <a:bodyPr>
-            <a:normAutofit fontScale="70000" lnSpcReduction="20000"/>
-          </a:bodyPr>
+          <a:bodyPr/>
           <a:lstStyle/>
           <a:p>
-            <a:r>
-              <a:rPr lang="es-MX" sz="4400" dirty="0"/>
-              <a:t>¿</a:t>
-            </a:r>
-            <a:r>
-              <a:rPr lang="es-MX" sz="4400" dirty="0" smtClean="0"/>
-              <a:t>Que es optimizar?</a:t>
-            </a:r>
-          </a:p>
-          <a:p>
-            <a:r>
-              <a:rPr lang="es-MX" sz="4400" dirty="0" smtClean="0"/>
-              <a:t>Wikipedia: La</a:t>
-            </a:r>
-            <a:r>
-              <a:rPr lang="es-MX" sz="4400" dirty="0"/>
-              <a:t> </a:t>
-            </a:r>
-            <a:r>
-              <a:rPr lang="es-MX" sz="4400" b="1" dirty="0"/>
-              <a:t>optimización de software</a:t>
-            </a:r>
-            <a:r>
-              <a:rPr lang="es-MX" sz="4400" dirty="0"/>
-              <a:t> es el proceso de modificación de un </a:t>
-            </a:r>
-            <a:r>
-              <a:rPr lang="es-MX" sz="4400" dirty="0">
-                <a:hlinkClick r:id="rId2" tooltip="Software"/>
-              </a:rPr>
-              <a:t>software</a:t>
-            </a:r>
-            <a:r>
-              <a:rPr lang="es-MX" sz="4400" dirty="0"/>
-              <a:t> para hacer que algún aspecto del </a:t>
-            </a:r>
-            <a:r>
-              <a:rPr lang="es-MX" sz="4400" dirty="0" smtClean="0"/>
-              <a:t>“programa” funcione </a:t>
-            </a:r>
-            <a:r>
-              <a:rPr lang="es-MX" sz="4400" dirty="0"/>
-              <a:t>de manera más </a:t>
-            </a:r>
-            <a:r>
-              <a:rPr lang="es-MX" sz="4400" dirty="0">
-                <a:hlinkClick r:id="rId3" tooltip="Eficiente"/>
-              </a:rPr>
-              <a:t>eficiente</a:t>
-            </a:r>
-            <a:r>
-              <a:rPr lang="es-MX" sz="4400" dirty="0"/>
-              <a:t> y/o utilizar menos recursos (</a:t>
-            </a:r>
-            <a:r>
-              <a:rPr lang="es-MX" sz="4400" dirty="0" smtClean="0"/>
-              <a:t>mayor </a:t>
-            </a:r>
-            <a:r>
-              <a:rPr lang="es-MX" sz="4400" dirty="0" smtClean="0">
-                <a:hlinkClick r:id="rId4" tooltip="Rendimiento"/>
-              </a:rPr>
-              <a:t>rendimiento</a:t>
-            </a:r>
-            <a:r>
-              <a:rPr lang="es-MX" sz="4400" dirty="0"/>
-              <a:t>). En general, un </a:t>
-            </a:r>
-            <a:r>
-              <a:rPr lang="es-MX" sz="4400" dirty="0">
-                <a:hlinkClick r:id="rId5" tooltip="Programa informático"/>
-              </a:rPr>
-              <a:t>programa</a:t>
-            </a:r>
-            <a:r>
-              <a:rPr lang="es-MX" sz="4400" dirty="0"/>
-              <a:t> puede ser optimizado para que se ejecute más rápidamente, o sea capaz de operar con menos </a:t>
-            </a:r>
-            <a:r>
-              <a:rPr lang="es-MX" sz="4400" dirty="0">
-                <a:hlinkClick r:id="rId6" tooltip="Memoria (informática)"/>
-              </a:rPr>
-              <a:t>memoria</a:t>
-            </a:r>
-            <a:r>
-              <a:rPr lang="es-MX" sz="4400" dirty="0"/>
-              <a:t> u otros recursos, o consuman menos energía</a:t>
-            </a:r>
-            <a:r>
-              <a:rPr lang="es-MX" sz="4400" dirty="0" smtClean="0"/>
-              <a:t>.</a:t>
-            </a:r>
-          </a:p>
-          <a:p>
-            <a:r>
-              <a:rPr lang="es-MX" sz="3600" dirty="0"/>
-              <a:t>La palabra "optimización", comparte la misma raíz que "</a:t>
-            </a:r>
-            <a:r>
-              <a:rPr lang="es-MX" sz="3600" dirty="0" smtClean="0"/>
-              <a:t>óptimo“.</a:t>
-            </a:r>
-          </a:p>
-          <a:p>
-            <a:r>
-              <a:rPr lang="es-MX" sz="4400" dirty="0" smtClean="0"/>
-              <a:t>El objetivo del curso es aprender a optimizar nuestros códigos.</a:t>
-            </a:r>
-            <a:endParaRPr lang="es-MX" sz="4400" dirty="0"/>
+            <a:endParaRPr lang="es-MX" dirty="0"/>
           </a:p>
         </p:txBody>
       </p:sp>
+      <p:pic>
+        <p:nvPicPr>
+          <p:cNvPr id="1026" name="Picture 2" descr="http://i.emezeta.com/weblog/optimizar-rendimiento-web/optimizar-rendimiento-web.png"/>
+          <p:cNvPicPr>
+            <a:picLocks noChangeAspect="1" noChangeArrowheads="1"/>
+          </p:cNvPicPr>
+          <p:nvPr/>
+        </p:nvPicPr>
+        <p:blipFill rotWithShape="1">
+          <a:blip r:embed="rId2">
+            <a:extLst>
+              <a:ext uri="{28A0092B-C50C-407E-A947-70E740481C1C}">
+                <a14:useLocalDpi xmlns:a14="http://schemas.microsoft.com/office/drawing/2010/main" val="0"/>
+              </a:ext>
+            </a:extLst>
+          </a:blip>
+          <a:srcRect l="17194" t="2330" r="17051" b="15917"/>
+          <a:stretch/>
+        </p:blipFill>
+        <p:spPr bwMode="auto">
+          <a:xfrm>
+            <a:off x="450166" y="1294227"/>
+            <a:ext cx="3404382" cy="3643752"/>
+          </a:xfrm>
+          <a:prstGeom prst="rect">
+            <a:avLst/>
+          </a:prstGeom>
+          <a:noFill/>
+          <a:extLst>
+            <a:ext uri="{909E8E84-426E-40DD-AFC4-6F175D3DCCD1}">
+              <a14:hiddenFill xmlns:a14="http://schemas.microsoft.com/office/drawing/2010/main">
+                <a:solidFill>
+                  <a:srgbClr val="FFFFFF"/>
+                </a:solidFill>
+              </a14:hiddenFill>
+            </a:ext>
+          </a:extLst>
+        </p:spPr>
+      </p:pic>
+      <p:pic>
+        <p:nvPicPr>
+          <p:cNvPr id="1030" name="Picture 6" descr="http://blog.filmultimedia.com/wp-content/uploads/2013/04/optimizar-contenido-web.gif"/>
+          <p:cNvPicPr>
+            <a:picLocks noChangeAspect="1" noChangeArrowheads="1"/>
+          </p:cNvPicPr>
+          <p:nvPr/>
+        </p:nvPicPr>
+        <p:blipFill>
+          <a:blip r:embed="rId3">
+            <a:extLst>
+              <a:ext uri="{28A0092B-C50C-407E-A947-70E740481C1C}">
+                <a14:useLocalDpi xmlns:a14="http://schemas.microsoft.com/office/drawing/2010/main" val="0"/>
+              </a:ext>
+            </a:extLst>
+          </a:blip>
+          <a:srcRect/>
+          <a:stretch>
+            <a:fillRect/>
+          </a:stretch>
+        </p:blipFill>
+        <p:spPr bwMode="auto">
+          <a:xfrm>
+            <a:off x="4154976" y="1294227"/>
+            <a:ext cx="5591175" cy="2857500"/>
+          </a:xfrm>
+          <a:prstGeom prst="rect">
+            <a:avLst/>
+          </a:prstGeom>
+          <a:noFill/>
+          <a:extLst>
+            <a:ext uri="{909E8E84-426E-40DD-AFC4-6F175D3DCCD1}">
+              <a14:hiddenFill xmlns:a14="http://schemas.microsoft.com/office/drawing/2010/main">
+                <a:solidFill>
+                  <a:srgbClr val="FFFFFF"/>
+                </a:solidFill>
+              </a14:hiddenFill>
+            </a:ext>
+          </a:extLst>
+        </p:spPr>
+      </p:pic>
+      <p:pic>
+        <p:nvPicPr>
+          <p:cNvPr id="1032" name="Picture 8" descr="http://www.marketingguerrilla.es/wp-content/uploads/2012/09/optimizar_campa%C3%B1a_online.jpg"/>
+          <p:cNvPicPr>
+            <a:picLocks noChangeAspect="1" noChangeArrowheads="1"/>
+          </p:cNvPicPr>
+          <p:nvPr/>
+        </p:nvPicPr>
+        <p:blipFill>
+          <a:blip r:embed="rId4">
+            <a:extLst>
+              <a:ext uri="{28A0092B-C50C-407E-A947-70E740481C1C}">
+                <a14:useLocalDpi xmlns:a14="http://schemas.microsoft.com/office/drawing/2010/main" val="0"/>
+              </a:ext>
+            </a:extLst>
+          </a:blip>
+          <a:srcRect/>
+          <a:stretch>
+            <a:fillRect/>
+          </a:stretch>
+        </p:blipFill>
+        <p:spPr bwMode="auto">
+          <a:xfrm>
+            <a:off x="9391137" y="4255611"/>
+            <a:ext cx="2800863" cy="2397977"/>
+          </a:xfrm>
+          <a:prstGeom prst="rect">
+            <a:avLst/>
+          </a:prstGeom>
+          <a:noFill/>
+          <a:extLst>
+            <a:ext uri="{909E8E84-426E-40DD-AFC4-6F175D3DCCD1}">
+              <a14:hiddenFill xmlns:a14="http://schemas.microsoft.com/office/drawing/2010/main">
+                <a:solidFill>
+                  <a:srgbClr val="FFFFFF"/>
+                </a:solidFill>
+              </a14:hiddenFill>
+            </a:ext>
+          </a:extLst>
+        </p:spPr>
+      </p:pic>
+      <p:pic>
+        <p:nvPicPr>
+          <p:cNvPr id="1034" name="Picture 10" descr="http://www.kms-consultores.com/wp-content/uploads/2009/09/Fotolia_11415523_S-300x300.jpg"/>
+          <p:cNvPicPr>
+            <a:picLocks noChangeAspect="1" noChangeArrowheads="1"/>
+          </p:cNvPicPr>
+          <p:nvPr/>
+        </p:nvPicPr>
+        <p:blipFill>
+          <a:blip r:embed="rId5">
+            <a:extLst>
+              <a:ext uri="{28A0092B-C50C-407E-A947-70E740481C1C}">
+                <a14:useLocalDpi xmlns:a14="http://schemas.microsoft.com/office/drawing/2010/main" val="0"/>
+              </a:ext>
+            </a:extLst>
+          </a:blip>
+          <a:srcRect/>
+          <a:stretch>
+            <a:fillRect/>
+          </a:stretch>
+        </p:blipFill>
+        <p:spPr bwMode="auto">
+          <a:xfrm>
+            <a:off x="4149139" y="4269090"/>
+            <a:ext cx="2384498" cy="2384498"/>
+          </a:xfrm>
+          <a:prstGeom prst="rect">
+            <a:avLst/>
+          </a:prstGeom>
+          <a:noFill/>
+          <a:extLst>
+            <a:ext uri="{909E8E84-426E-40DD-AFC4-6F175D3DCCD1}">
+              <a14:hiddenFill xmlns:a14="http://schemas.microsoft.com/office/drawing/2010/main">
+                <a:solidFill>
+                  <a:srgbClr val="FFFFFF"/>
+                </a:solidFill>
+              </a14:hiddenFill>
+            </a:ext>
+          </a:extLst>
+        </p:spPr>
+      </p:pic>
+      <p:pic>
+        <p:nvPicPr>
+          <p:cNvPr id="1036" name="Picture 12" descr="http://avconsultorespymes.files.wordpress.com/2011/04/mejorarprocesos.jpg"/>
+          <p:cNvPicPr>
+            <a:picLocks noChangeAspect="1" noChangeArrowheads="1"/>
+          </p:cNvPicPr>
+          <p:nvPr/>
+        </p:nvPicPr>
+        <p:blipFill>
+          <a:blip r:embed="rId6">
+            <a:extLst>
+              <a:ext uri="{28A0092B-C50C-407E-A947-70E740481C1C}">
+                <a14:useLocalDpi xmlns:a14="http://schemas.microsoft.com/office/drawing/2010/main" val="0"/>
+              </a:ext>
+            </a:extLst>
+          </a:blip>
+          <a:srcRect/>
+          <a:stretch>
+            <a:fillRect/>
+          </a:stretch>
+        </p:blipFill>
+        <p:spPr bwMode="auto">
+          <a:xfrm>
+            <a:off x="6533637" y="4238612"/>
+            <a:ext cx="2857500" cy="2414976"/>
+          </a:xfrm>
+          <a:prstGeom prst="rect">
+            <a:avLst/>
+          </a:prstGeom>
+          <a:noFill/>
+          <a:extLst>
+            <a:ext uri="{909E8E84-426E-40DD-AFC4-6F175D3DCCD1}">
+              <a14:hiddenFill xmlns:a14="http://schemas.microsoft.com/office/drawing/2010/main">
+                <a:solidFill>
+                  <a:srgbClr val="FFFFFF"/>
+                </a:solidFill>
+              </a14:hiddenFill>
+            </a:ext>
+          </a:extLst>
+        </p:spPr>
+      </p:pic>
     </p:spTree>
     <p:extLst>
       <p:ext uri="{BB962C8B-B14F-4D97-AF65-F5344CB8AC3E}">
-        <p14:creationId xmlns:p14="http://schemas.microsoft.com/office/powerpoint/2010/main" val="1242272498"/>
+        <p14:creationId xmlns:p14="http://schemas.microsoft.com/office/powerpoint/2010/main" val="13344715"/>
       </p:ext>
     </p:extLst>
   </p:cSld>
@@ -13759,295 +13279,6 @@
         </p:nvSpPr>
         <p:spPr>
           <a:xfrm>
-            <a:off x="834464" y="286487"/>
-            <a:ext cx="8911687" cy="1280890"/>
-          </a:xfrm>
-        </p:spPr>
-        <p:txBody>
-          <a:bodyPr>
-            <a:noAutofit/>
-          </a:bodyPr>
-          <a:lstStyle/>
-          <a:p>
-            <a:r>
-              <a:rPr lang="es-MX" sz="4400" dirty="0" smtClean="0"/>
-              <a:t>Optimizar</a:t>
-            </a:r>
-            <a:endParaRPr lang="es-MX" sz="4400" dirty="0"/>
-          </a:p>
-        </p:txBody>
-      </p:sp>
-      <p:sp>
-        <p:nvSpPr>
-          <p:cNvPr id="4" name="Marcador de contenido 3"/>
-          <p:cNvSpPr>
-            <a:spLocks noGrp="1"/>
-          </p:cNvSpPr>
-          <p:nvPr>
-            <p:ph idx="1"/>
-          </p:nvPr>
-        </p:nvSpPr>
-        <p:spPr/>
-        <p:txBody>
-          <a:bodyPr/>
-          <a:lstStyle/>
-          <a:p>
-            <a:endParaRPr lang="es-MX" dirty="0"/>
-          </a:p>
-        </p:txBody>
-      </p:sp>
-      <p:pic>
-        <p:nvPicPr>
-          <p:cNvPr id="1026" name="Picture 2" descr="http://i.emezeta.com/weblog/optimizar-rendimiento-web/optimizar-rendimiento-web.png"/>
-          <p:cNvPicPr>
-            <a:picLocks noChangeAspect="1" noChangeArrowheads="1"/>
-          </p:cNvPicPr>
-          <p:nvPr/>
-        </p:nvPicPr>
-        <p:blipFill rotWithShape="1">
-          <a:blip r:embed="rId2">
-            <a:extLst>
-              <a:ext uri="{28A0092B-C50C-407E-A947-70E740481C1C}">
-                <a14:useLocalDpi xmlns:a14="http://schemas.microsoft.com/office/drawing/2010/main" val="0"/>
-              </a:ext>
-            </a:extLst>
-          </a:blip>
-          <a:srcRect l="17194" t="2330" r="17051" b="15917"/>
-          <a:stretch/>
-        </p:blipFill>
-        <p:spPr bwMode="auto">
-          <a:xfrm>
-            <a:off x="450166" y="1294227"/>
-            <a:ext cx="3404382" cy="3643752"/>
-          </a:xfrm>
-          <a:prstGeom prst="rect">
-            <a:avLst/>
-          </a:prstGeom>
-          <a:noFill/>
-          <a:extLst>
-            <a:ext uri="{909E8E84-426E-40DD-AFC4-6F175D3DCCD1}">
-              <a14:hiddenFill xmlns:a14="http://schemas.microsoft.com/office/drawing/2010/main">
-                <a:solidFill>
-                  <a:srgbClr val="FFFFFF"/>
-                </a:solidFill>
-              </a14:hiddenFill>
-            </a:ext>
-          </a:extLst>
-        </p:spPr>
-      </p:pic>
-      <p:pic>
-        <p:nvPicPr>
-          <p:cNvPr id="1030" name="Picture 6" descr="http://blog.filmultimedia.com/wp-content/uploads/2013/04/optimizar-contenido-web.gif"/>
-          <p:cNvPicPr>
-            <a:picLocks noChangeAspect="1" noChangeArrowheads="1"/>
-          </p:cNvPicPr>
-          <p:nvPr/>
-        </p:nvPicPr>
-        <p:blipFill>
-          <a:blip r:embed="rId3">
-            <a:extLst>
-              <a:ext uri="{28A0092B-C50C-407E-A947-70E740481C1C}">
-                <a14:useLocalDpi xmlns:a14="http://schemas.microsoft.com/office/drawing/2010/main" val="0"/>
-              </a:ext>
-            </a:extLst>
-          </a:blip>
-          <a:srcRect/>
-          <a:stretch>
-            <a:fillRect/>
-          </a:stretch>
-        </p:blipFill>
-        <p:spPr bwMode="auto">
-          <a:xfrm>
-            <a:off x="4154976" y="1294227"/>
-            <a:ext cx="5591175" cy="2857500"/>
-          </a:xfrm>
-          <a:prstGeom prst="rect">
-            <a:avLst/>
-          </a:prstGeom>
-          <a:noFill/>
-          <a:extLst>
-            <a:ext uri="{909E8E84-426E-40DD-AFC4-6F175D3DCCD1}">
-              <a14:hiddenFill xmlns:a14="http://schemas.microsoft.com/office/drawing/2010/main">
-                <a:solidFill>
-                  <a:srgbClr val="FFFFFF"/>
-                </a:solidFill>
-              </a14:hiddenFill>
-            </a:ext>
-          </a:extLst>
-        </p:spPr>
-      </p:pic>
-      <p:pic>
-        <p:nvPicPr>
-          <p:cNvPr id="1032" name="Picture 8" descr="http://www.marketingguerrilla.es/wp-content/uploads/2012/09/optimizar_campa%C3%B1a_online.jpg"/>
-          <p:cNvPicPr>
-            <a:picLocks noChangeAspect="1" noChangeArrowheads="1"/>
-          </p:cNvPicPr>
-          <p:nvPr/>
-        </p:nvPicPr>
-        <p:blipFill>
-          <a:blip r:embed="rId4">
-            <a:extLst>
-              <a:ext uri="{28A0092B-C50C-407E-A947-70E740481C1C}">
-                <a14:useLocalDpi xmlns:a14="http://schemas.microsoft.com/office/drawing/2010/main" val="0"/>
-              </a:ext>
-            </a:extLst>
-          </a:blip>
-          <a:srcRect/>
-          <a:stretch>
-            <a:fillRect/>
-          </a:stretch>
-        </p:blipFill>
-        <p:spPr bwMode="auto">
-          <a:xfrm>
-            <a:off x="9391137" y="4255611"/>
-            <a:ext cx="2800863" cy="2397977"/>
-          </a:xfrm>
-          <a:prstGeom prst="rect">
-            <a:avLst/>
-          </a:prstGeom>
-          <a:noFill/>
-          <a:extLst>
-            <a:ext uri="{909E8E84-426E-40DD-AFC4-6F175D3DCCD1}">
-              <a14:hiddenFill xmlns:a14="http://schemas.microsoft.com/office/drawing/2010/main">
-                <a:solidFill>
-                  <a:srgbClr val="FFFFFF"/>
-                </a:solidFill>
-              </a14:hiddenFill>
-            </a:ext>
-          </a:extLst>
-        </p:spPr>
-      </p:pic>
-      <p:pic>
-        <p:nvPicPr>
-          <p:cNvPr id="1034" name="Picture 10" descr="http://www.kms-consultores.com/wp-content/uploads/2009/09/Fotolia_11415523_S-300x300.jpg"/>
-          <p:cNvPicPr>
-            <a:picLocks noChangeAspect="1" noChangeArrowheads="1"/>
-          </p:cNvPicPr>
-          <p:nvPr/>
-        </p:nvPicPr>
-        <p:blipFill>
-          <a:blip r:embed="rId5">
-            <a:extLst>
-              <a:ext uri="{28A0092B-C50C-407E-A947-70E740481C1C}">
-                <a14:useLocalDpi xmlns:a14="http://schemas.microsoft.com/office/drawing/2010/main" val="0"/>
-              </a:ext>
-            </a:extLst>
-          </a:blip>
-          <a:srcRect/>
-          <a:stretch>
-            <a:fillRect/>
-          </a:stretch>
-        </p:blipFill>
-        <p:spPr bwMode="auto">
-          <a:xfrm>
-            <a:off x="4149139" y="4269090"/>
-            <a:ext cx="2384498" cy="2384498"/>
-          </a:xfrm>
-          <a:prstGeom prst="rect">
-            <a:avLst/>
-          </a:prstGeom>
-          <a:noFill/>
-          <a:extLst>
-            <a:ext uri="{909E8E84-426E-40DD-AFC4-6F175D3DCCD1}">
-              <a14:hiddenFill xmlns:a14="http://schemas.microsoft.com/office/drawing/2010/main">
-                <a:solidFill>
-                  <a:srgbClr val="FFFFFF"/>
-                </a:solidFill>
-              </a14:hiddenFill>
-            </a:ext>
-          </a:extLst>
-        </p:spPr>
-      </p:pic>
-      <p:pic>
-        <p:nvPicPr>
-          <p:cNvPr id="1036" name="Picture 12" descr="http://avconsultorespymes.files.wordpress.com/2011/04/mejorarprocesos.jpg"/>
-          <p:cNvPicPr>
-            <a:picLocks noChangeAspect="1" noChangeArrowheads="1"/>
-          </p:cNvPicPr>
-          <p:nvPr/>
-        </p:nvPicPr>
-        <p:blipFill>
-          <a:blip r:embed="rId6">
-            <a:extLst>
-              <a:ext uri="{28A0092B-C50C-407E-A947-70E740481C1C}">
-                <a14:useLocalDpi xmlns:a14="http://schemas.microsoft.com/office/drawing/2010/main" val="0"/>
-              </a:ext>
-            </a:extLst>
-          </a:blip>
-          <a:srcRect/>
-          <a:stretch>
-            <a:fillRect/>
-          </a:stretch>
-        </p:blipFill>
-        <p:spPr bwMode="auto">
-          <a:xfrm>
-            <a:off x="6533637" y="4238612"/>
-            <a:ext cx="2857500" cy="2414976"/>
-          </a:xfrm>
-          <a:prstGeom prst="rect">
-            <a:avLst/>
-          </a:prstGeom>
-          <a:noFill/>
-          <a:extLst>
-            <a:ext uri="{909E8E84-426E-40DD-AFC4-6F175D3DCCD1}">
-              <a14:hiddenFill xmlns:a14="http://schemas.microsoft.com/office/drawing/2010/main">
-                <a:solidFill>
-                  <a:srgbClr val="FFFFFF"/>
-                </a:solidFill>
-              </a14:hiddenFill>
-            </a:ext>
-          </a:extLst>
-        </p:spPr>
-      </p:pic>
-    </p:spTree>
-    <p:extLst>
-      <p:ext uri="{BB962C8B-B14F-4D97-AF65-F5344CB8AC3E}">
-        <p14:creationId xmlns:p14="http://schemas.microsoft.com/office/powerpoint/2010/main" val="13344715"/>
-      </p:ext>
-    </p:extLst>
-  </p:cSld>
-  <p:clrMapOvr>
-    <a:masterClrMapping/>
-  </p:clrMapOvr>
-  <p:timing>
-    <p:tnLst>
-      <p:par>
-        <p:cTn id="1" dur="indefinite" restart="never" nodeType="tmRoot"/>
-      </p:par>
-    </p:tnLst>
-  </p:timing>
-</p:sld>
-</file>
-
-<file path=ppt/slides/slide7.xml><?xml version="1.0" encoding="utf-8"?>
-<p:sld xmlns:a="http://schemas.openxmlformats.org/drawingml/2006/main" xmlns:r="http://schemas.openxmlformats.org/officeDocument/2006/relationships" xmlns:p="http://schemas.openxmlformats.org/presentationml/2006/main">
-  <p:cSld>
-    <p:spTree>
-      <p:nvGrpSpPr>
-        <p:cNvPr id="1" name=""/>
-        <p:cNvGrpSpPr/>
-        <p:nvPr/>
-      </p:nvGrpSpPr>
-      <p:grpSpPr>
-        <a:xfrm>
-          <a:off x="0" y="0"/>
-          <a:ext cx="0" cy="0"/>
-          <a:chOff x="0" y="0"/>
-          <a:chExt cx="0" cy="0"/>
-        </a:xfrm>
-      </p:grpSpPr>
-      <p:sp>
-        <p:nvSpPr>
-          <p:cNvPr id="2" name="Título 1"/>
-          <p:cNvSpPr>
-            <a:spLocks noGrp="1"/>
-          </p:cNvSpPr>
-          <p:nvPr>
-            <p:ph type="title"/>
-          </p:nvPr>
-        </p:nvSpPr>
-        <p:spPr>
-          <a:xfrm>
             <a:off x="862599" y="525637"/>
             <a:ext cx="8911687" cy="1280890"/>
           </a:xfrm>
@@ -14149,7 +13380,7 @@
 </p:sld>
 </file>
 
-<file path=ppt/slides/slide8.xml><?xml version="1.0" encoding="utf-8"?>
+<file path=ppt/slides/slide7.xml><?xml version="1.0" encoding="utf-8"?>
 <p:sld xmlns:a="http://schemas.openxmlformats.org/drawingml/2006/main" xmlns:r="http://schemas.openxmlformats.org/officeDocument/2006/relationships" xmlns:p="http://schemas.openxmlformats.org/presentationml/2006/main">
   <p:cSld>
     <p:spTree>
@@ -15266,6 +14497,407 @@
 </p:sld>
 </file>
 
+<file path=ppt/slides/slide8.xml><?xml version="1.0" encoding="utf-8"?>
+<p:sld xmlns:a="http://schemas.openxmlformats.org/drawingml/2006/main" xmlns:r="http://schemas.openxmlformats.org/officeDocument/2006/relationships" xmlns:p="http://schemas.openxmlformats.org/presentationml/2006/main">
+  <p:cSld>
+    <p:spTree>
+      <p:nvGrpSpPr>
+        <p:cNvPr id="1" name=""/>
+        <p:cNvGrpSpPr/>
+        <p:nvPr/>
+      </p:nvGrpSpPr>
+      <p:grpSpPr>
+        <a:xfrm>
+          <a:off x="0" y="0"/>
+          <a:ext cx="0" cy="0"/>
+          <a:chOff x="0" y="0"/>
+          <a:chExt cx="0" cy="0"/>
+        </a:xfrm>
+      </p:grpSpPr>
+      <p:sp>
+        <p:nvSpPr>
+          <p:cNvPr id="2" name="Título 1"/>
+          <p:cNvSpPr>
+            <a:spLocks noGrp="1"/>
+          </p:cNvSpPr>
+          <p:nvPr>
+            <p:ph type="title"/>
+          </p:nvPr>
+        </p:nvSpPr>
+        <p:spPr>
+          <a:xfrm>
+            <a:off x="862599" y="525637"/>
+            <a:ext cx="8911687" cy="1280890"/>
+          </a:xfrm>
+        </p:spPr>
+        <p:txBody>
+          <a:bodyPr>
+            <a:noAutofit/>
+          </a:bodyPr>
+          <a:lstStyle/>
+          <a:p>
+            <a:r>
+              <a:rPr lang="es-MX" sz="4400" dirty="0" smtClean="0"/>
+              <a:t>Ciclo </a:t>
+            </a:r>
+            <a:r>
+              <a:rPr lang="es-MX" sz="4400" dirty="0" err="1" smtClean="0"/>
+              <a:t>while</a:t>
+            </a:r>
+            <a:endParaRPr lang="es-MX" sz="4400" dirty="0"/>
+          </a:p>
+        </p:txBody>
+      </p:sp>
+      <p:sp>
+        <p:nvSpPr>
+          <p:cNvPr id="3" name="Marcador de contenido 2"/>
+          <p:cNvSpPr>
+            <a:spLocks noGrp="1"/>
+          </p:cNvSpPr>
+          <p:nvPr>
+            <p:ph idx="1"/>
+          </p:nvPr>
+        </p:nvSpPr>
+        <p:spPr>
+          <a:xfrm>
+            <a:off x="862599" y="1489026"/>
+            <a:ext cx="9997659" cy="4481731"/>
+          </a:xfrm>
+        </p:spPr>
+        <p:txBody>
+          <a:bodyPr>
+            <a:normAutofit fontScale="47500" lnSpcReduction="20000"/>
+          </a:bodyPr>
+          <a:lstStyle/>
+          <a:p>
+            <a:pPr marL="0" indent="0">
+              <a:spcBef>
+                <a:spcPts val="0"/>
+              </a:spcBef>
+              <a:buNone/>
+            </a:pPr>
+            <a:r>
+              <a:rPr lang="es-MX" sz="4400" dirty="0" smtClean="0"/>
+              <a:t>El ciclo </a:t>
+            </a:r>
+            <a:r>
+              <a:rPr lang="es-MX" sz="4400" dirty="0" err="1" smtClean="0"/>
+              <a:t>while</a:t>
+            </a:r>
+            <a:r>
+              <a:rPr lang="es-MX" sz="4400" dirty="0"/>
+              <a:t> </a:t>
+            </a:r>
+            <a:r>
+              <a:rPr lang="es-MX" sz="4400" dirty="0" smtClean="0"/>
+              <a:t> </a:t>
+            </a:r>
+            <a:r>
+              <a:rPr lang="es-MX" sz="4400" dirty="0"/>
+              <a:t>se repite continuamente mientras </a:t>
+            </a:r>
+            <a:r>
+              <a:rPr lang="es-MX" sz="4400" dirty="0" smtClean="0"/>
+              <a:t>una condición </a:t>
+            </a:r>
+            <a:r>
+              <a:rPr lang="es-MX" sz="4400" dirty="0"/>
+              <a:t>específica sea verdadera. A continuación </a:t>
+            </a:r>
+            <a:r>
+              <a:rPr lang="es-MX" sz="4400" dirty="0" smtClean="0"/>
+              <a:t>un </a:t>
+            </a:r>
+            <a:r>
+              <a:rPr lang="es-MX" sz="4400" dirty="0"/>
+              <a:t>ejemplo, que utiliza </a:t>
+            </a:r>
+            <a:r>
+              <a:rPr lang="es-MX" sz="4400" dirty="0" smtClean="0"/>
+              <a:t>un ciclo </a:t>
+            </a:r>
+            <a:r>
+              <a:rPr lang="es-MX" sz="4400" dirty="0" err="1" smtClean="0"/>
+              <a:t>while</a:t>
+            </a:r>
+            <a:r>
+              <a:rPr lang="es-MX" sz="4400" dirty="0" smtClean="0"/>
+              <a:t> para </a:t>
+            </a:r>
+            <a:r>
+              <a:rPr lang="es-MX" sz="4400" dirty="0"/>
+              <a:t>escribir </a:t>
+            </a:r>
+            <a:r>
+              <a:rPr lang="es-MX" sz="4400" dirty="0" smtClean="0"/>
+              <a:t>los número del 1 al 10.</a:t>
+            </a:r>
+          </a:p>
+          <a:p>
+            <a:pPr marL="0" indent="0">
+              <a:spcBef>
+                <a:spcPts val="0"/>
+              </a:spcBef>
+              <a:buNone/>
+            </a:pPr>
+            <a:endParaRPr lang="es-MX" sz="4400" dirty="0"/>
+          </a:p>
+          <a:p>
+            <a:pPr marL="0" indent="0">
+              <a:spcBef>
+                <a:spcPts val="0"/>
+              </a:spcBef>
+              <a:buNone/>
+            </a:pPr>
+            <a:r>
+              <a:rPr lang="es-MX" sz="4400" dirty="0">
+                <a:latin typeface="Courier New" panose="02070309020205020404" pitchFamily="49" charset="0"/>
+                <a:cs typeface="Courier New" panose="02070309020205020404" pitchFamily="49" charset="0"/>
+              </a:rPr>
+              <a:t>&lt;?</a:t>
+            </a:r>
+            <a:r>
+              <a:rPr lang="es-MX" sz="4400" dirty="0" err="1">
+                <a:latin typeface="Courier New" panose="02070309020205020404" pitchFamily="49" charset="0"/>
+                <a:cs typeface="Courier New" panose="02070309020205020404" pitchFamily="49" charset="0"/>
+              </a:rPr>
+              <a:t>php</a:t>
+            </a:r>
+            <a:endParaRPr lang="es-MX" sz="4400" dirty="0">
+              <a:latin typeface="Courier New" panose="02070309020205020404" pitchFamily="49" charset="0"/>
+              <a:cs typeface="Courier New" panose="02070309020205020404" pitchFamily="49" charset="0"/>
+            </a:endParaRPr>
+          </a:p>
+          <a:p>
+            <a:pPr marL="400050" lvl="1" indent="0">
+              <a:spcBef>
+                <a:spcPts val="0"/>
+              </a:spcBef>
+              <a:buNone/>
+            </a:pPr>
+            <a:r>
+              <a:rPr lang="es-MX" sz="4200" dirty="0" smtClean="0">
+                <a:latin typeface="Courier New" panose="02070309020205020404" pitchFamily="49" charset="0"/>
+                <a:cs typeface="Courier New" panose="02070309020205020404" pitchFamily="49" charset="0"/>
+              </a:rPr>
+              <a:t>// escribe los número del 1 al 10</a:t>
+            </a:r>
+            <a:endParaRPr lang="es-MX" sz="4200" dirty="0">
+              <a:latin typeface="Courier New" panose="02070309020205020404" pitchFamily="49" charset="0"/>
+              <a:cs typeface="Courier New" panose="02070309020205020404" pitchFamily="49" charset="0"/>
+            </a:endParaRPr>
+          </a:p>
+          <a:p>
+            <a:pPr marL="400050" lvl="1" indent="0">
+              <a:spcBef>
+                <a:spcPts val="0"/>
+              </a:spcBef>
+              <a:buNone/>
+            </a:pPr>
+            <a:r>
+              <a:rPr lang="es-MX" sz="4200" dirty="0">
+                <a:latin typeface="Courier New" panose="02070309020205020404" pitchFamily="49" charset="0"/>
+                <a:cs typeface="Courier New" panose="02070309020205020404" pitchFamily="49" charset="0"/>
+              </a:rPr>
+              <a:t>$contador = 1;</a:t>
+            </a:r>
+          </a:p>
+          <a:p>
+            <a:pPr marL="400050" lvl="1" indent="0">
+              <a:spcBef>
+                <a:spcPts val="0"/>
+              </a:spcBef>
+              <a:buNone/>
+            </a:pPr>
+            <a:r>
+              <a:rPr lang="es-MX" sz="4200" b="1" dirty="0" err="1">
+                <a:latin typeface="Courier New" panose="02070309020205020404" pitchFamily="49" charset="0"/>
+                <a:cs typeface="Courier New" panose="02070309020205020404" pitchFamily="49" charset="0"/>
+              </a:rPr>
+              <a:t>while</a:t>
+            </a:r>
+            <a:r>
+              <a:rPr lang="es-MX" sz="4200" dirty="0">
+                <a:latin typeface="Courier New" panose="02070309020205020404" pitchFamily="49" charset="0"/>
+                <a:cs typeface="Courier New" panose="02070309020205020404" pitchFamily="49" charset="0"/>
+              </a:rPr>
+              <a:t> ($contador </a:t>
+            </a:r>
+            <a:r>
+              <a:rPr lang="es-MX" sz="4200" dirty="0" smtClean="0">
+                <a:latin typeface="Courier New" panose="02070309020205020404" pitchFamily="49" charset="0"/>
+                <a:cs typeface="Courier New" panose="02070309020205020404" pitchFamily="49" charset="0"/>
+              </a:rPr>
+              <a:t>&lt;= </a:t>
+            </a:r>
+            <a:r>
+              <a:rPr lang="es-MX" sz="4200" dirty="0">
+                <a:latin typeface="Courier New" panose="02070309020205020404" pitchFamily="49" charset="0"/>
+                <a:cs typeface="Courier New" panose="02070309020205020404" pitchFamily="49" charset="0"/>
+              </a:rPr>
+              <a:t>10) {</a:t>
+            </a:r>
+          </a:p>
+          <a:p>
+            <a:pPr marL="800100" lvl="2" indent="0">
+              <a:spcBef>
+                <a:spcPts val="0"/>
+              </a:spcBef>
+              <a:buNone/>
+            </a:pPr>
+            <a:r>
+              <a:rPr lang="es-MX" sz="4000" dirty="0">
+                <a:latin typeface="Courier New" panose="02070309020205020404" pitchFamily="49" charset="0"/>
+                <a:cs typeface="Courier New" panose="02070309020205020404" pitchFamily="49" charset="0"/>
+              </a:rPr>
+              <a:t>e</a:t>
+            </a:r>
+            <a:r>
+              <a:rPr lang="es-MX" sz="4000" dirty="0" smtClean="0">
+                <a:latin typeface="Courier New" panose="02070309020205020404" pitchFamily="49" charset="0"/>
+                <a:cs typeface="Courier New" panose="02070309020205020404" pitchFamily="49" charset="0"/>
+              </a:rPr>
+              <a:t>cho '$contador';</a:t>
+            </a:r>
+            <a:endParaRPr lang="es-MX" sz="4000" dirty="0">
+              <a:latin typeface="Courier New" panose="02070309020205020404" pitchFamily="49" charset="0"/>
+              <a:cs typeface="Courier New" panose="02070309020205020404" pitchFamily="49" charset="0"/>
+            </a:endParaRPr>
+          </a:p>
+          <a:p>
+            <a:pPr marL="800100" lvl="2" indent="0">
+              <a:spcBef>
+                <a:spcPts val="0"/>
+              </a:spcBef>
+              <a:buNone/>
+            </a:pPr>
+            <a:r>
+              <a:rPr lang="es-MX" sz="4000" dirty="0">
+                <a:latin typeface="Courier New" panose="02070309020205020404" pitchFamily="49" charset="0"/>
+                <a:cs typeface="Courier New" panose="02070309020205020404" pitchFamily="49" charset="0"/>
+              </a:rPr>
+              <a:t>$contador++;</a:t>
+            </a:r>
+          </a:p>
+          <a:p>
+            <a:pPr marL="400050" lvl="1" indent="0">
+              <a:spcBef>
+                <a:spcPts val="0"/>
+              </a:spcBef>
+              <a:buNone/>
+            </a:pPr>
+            <a:r>
+              <a:rPr lang="es-MX" sz="4200" dirty="0" smtClean="0">
+                <a:latin typeface="Courier New" panose="02070309020205020404" pitchFamily="49" charset="0"/>
+                <a:cs typeface="Courier New" panose="02070309020205020404" pitchFamily="49" charset="0"/>
+              </a:rPr>
+              <a:t>}</a:t>
+            </a:r>
+          </a:p>
+          <a:p>
+            <a:pPr marL="400050" lvl="1" indent="0">
+              <a:spcBef>
+                <a:spcPts val="0"/>
+              </a:spcBef>
+              <a:buNone/>
+            </a:pPr>
+            <a:r>
+              <a:rPr lang="es-MX" sz="4200" dirty="0" smtClean="0">
+                <a:latin typeface="Courier New" panose="02070309020205020404" pitchFamily="49" charset="0"/>
+                <a:cs typeface="Courier New" panose="02070309020205020404" pitchFamily="49" charset="0"/>
+              </a:rPr>
+              <a:t>echo “Hemos terminado”;</a:t>
+            </a:r>
+            <a:endParaRPr lang="es-MX" sz="4200" dirty="0">
+              <a:latin typeface="Courier New" panose="02070309020205020404" pitchFamily="49" charset="0"/>
+              <a:cs typeface="Courier New" panose="02070309020205020404" pitchFamily="49" charset="0"/>
+            </a:endParaRPr>
+          </a:p>
+          <a:p>
+            <a:pPr marL="0" indent="0">
+              <a:spcBef>
+                <a:spcPts val="0"/>
+              </a:spcBef>
+              <a:buNone/>
+            </a:pPr>
+            <a:r>
+              <a:rPr lang="es-MX" sz="4400" dirty="0" smtClean="0">
+                <a:latin typeface="Courier New" panose="02070309020205020404" pitchFamily="49" charset="0"/>
+                <a:cs typeface="Courier New" panose="02070309020205020404" pitchFamily="49" charset="0"/>
+              </a:rPr>
+              <a:t>?&gt;</a:t>
+            </a:r>
+          </a:p>
+          <a:p>
+            <a:pPr marL="0" indent="0">
+              <a:spcBef>
+                <a:spcPts val="0"/>
+              </a:spcBef>
+              <a:buNone/>
+            </a:pPr>
+            <a:endParaRPr lang="es-MX" sz="4400" dirty="0">
+              <a:latin typeface="Courier New" panose="02070309020205020404" pitchFamily="49" charset="0"/>
+              <a:cs typeface="Courier New" panose="02070309020205020404" pitchFamily="49" charset="0"/>
+            </a:endParaRPr>
+          </a:p>
+          <a:p>
+            <a:pPr marL="0" indent="0">
+              <a:spcBef>
+                <a:spcPts val="0"/>
+              </a:spcBef>
+              <a:buNone/>
+            </a:pPr>
+            <a:r>
+              <a:rPr lang="es-MX" sz="4400" dirty="0"/>
+              <a:t>Observa la condición encerrada entre paréntesis: mientras sea verdadera, se ejecutará </a:t>
+            </a:r>
+            <a:r>
+              <a:rPr lang="es-MX" sz="4400" dirty="0" smtClean="0"/>
+              <a:t>el código </a:t>
+            </a:r>
+            <a:r>
+              <a:rPr lang="es-MX" sz="4400" dirty="0"/>
+              <a:t>entre las llaves. En cuanto la condición sea falsa, el </a:t>
+            </a:r>
+            <a:r>
+              <a:rPr lang="es-MX" sz="4400" dirty="0" smtClean="0"/>
+              <a:t>ciclo se </a:t>
+            </a:r>
+            <a:r>
+              <a:rPr lang="es-MX" sz="4400" dirty="0"/>
+              <a:t>detiene y las líneas que </a:t>
+            </a:r>
+            <a:r>
+              <a:rPr lang="es-MX" sz="4400" dirty="0" smtClean="0"/>
+              <a:t>le siguen </a:t>
+            </a:r>
+            <a:r>
+              <a:rPr lang="es-MX" sz="4400" dirty="0"/>
+              <a:t>se ejecutan de la manera usual.</a:t>
+            </a:r>
+          </a:p>
+        </p:txBody>
+      </p:sp>
+    </p:spTree>
+    <p:extLst>
+      <p:ext uri="{BB962C8B-B14F-4D97-AF65-F5344CB8AC3E}">
+        <p14:creationId xmlns:p14="http://schemas.microsoft.com/office/powerpoint/2010/main" val="3521697758"/>
+      </p:ext>
+    </p:extLst>
+  </p:cSld>
+  <p:clrMapOvr>
+    <a:masterClrMapping/>
+  </p:clrMapOvr>
+  <p:timing>
+    <p:tnLst>
+      <p:par>
+        <p:cTn id="1" dur="indefinite" restart="never" nodeType="tmRoot"/>
+      </p:par>
+    </p:tnLst>
+  </p:timing>
+</p:sld>
+</file>
+
 <file path=ppt/slides/slide9.xml><?xml version="1.0" encoding="utf-8"?>
 <p:sld xmlns:a="http://schemas.openxmlformats.org/drawingml/2006/main" xmlns:r="http://schemas.openxmlformats.org/officeDocument/2006/relationships" xmlns:p="http://schemas.openxmlformats.org/presentationml/2006/main">
   <p:cSld>
@@ -15307,7 +14939,7 @@
           <a:p>
             <a:r>
               <a:rPr lang="es-MX" sz="4400" dirty="0" smtClean="0"/>
-              <a:t>Ciclo </a:t>
+              <a:t>Ciclo do-</a:t>
             </a:r>
             <a:r>
               <a:rPr lang="es-MX" sz="4400" dirty="0" err="1" smtClean="0"/>
@@ -15330,7 +14962,7 @@
         <p:spPr>
           <a:xfrm>
             <a:off x="862599" y="1489026"/>
-            <a:ext cx="9997659" cy="4481731"/>
+            <a:ext cx="9997659" cy="4835574"/>
           </a:xfrm>
         </p:spPr>
         <p:txBody>
@@ -15340,14 +14972,11 @@
           <a:lstStyle/>
           <a:p>
             <a:pPr marL="0" indent="0">
-              <a:spcBef>
-                <a:spcPts val="0"/>
-              </a:spcBef>
               <a:buNone/>
             </a:pPr>
             <a:r>
               <a:rPr lang="es-MX" sz="4400" dirty="0" smtClean="0"/>
-              <a:t>El ciclo </a:t>
+              <a:t>El ciclo do-</a:t>
             </a:r>
             <a:r>
               <a:rPr lang="es-MX" sz="4400" dirty="0" err="1" smtClean="0"/>
@@ -15355,60 +14984,20 @@
             </a:r>
             <a:r>
               <a:rPr lang="es-MX" sz="4400" dirty="0"/>
-              <a:t> </a:t>
+              <a:t>, que evalúa la condición al final </a:t>
             </a:r>
             <a:r>
               <a:rPr lang="es-MX" sz="4400" dirty="0" smtClean="0"/>
-              <a:t> </a:t>
+              <a:t>de cada </a:t>
             </a:r>
             <a:r>
               <a:rPr lang="es-MX" sz="4400" dirty="0"/>
-              <a:t>se repite continuamente mientras </a:t>
+              <a:t>repetición. </a:t>
             </a:r>
             <a:r>
               <a:rPr lang="es-MX" sz="4400" dirty="0" smtClean="0"/>
-              <a:t>una condición </a:t>
-            </a:r>
-            <a:r>
-              <a:rPr lang="es-MX" sz="4400" dirty="0"/>
-              <a:t>específica sea verdadera. A continuación </a:t>
-            </a:r>
-            <a:r>
-              <a:rPr lang="es-MX" sz="4400" dirty="0" smtClean="0"/>
-              <a:t>un </a:t>
-            </a:r>
-            <a:r>
-              <a:rPr lang="es-MX" sz="4400" dirty="0"/>
-              <a:t>ejemplo, que utiliza </a:t>
-            </a:r>
-            <a:r>
-              <a:rPr lang="es-MX" sz="4400" dirty="0" smtClean="0"/>
-              <a:t>un ciclo </a:t>
-            </a:r>
-            <a:r>
-              <a:rPr lang="es-MX" sz="4400" dirty="0" err="1" smtClean="0"/>
-              <a:t>while</a:t>
-            </a:r>
-            <a:r>
-              <a:rPr lang="es-MX" sz="4400" dirty="0" smtClean="0"/>
-              <a:t> para </a:t>
-            </a:r>
-            <a:r>
-              <a:rPr lang="es-MX" sz="4400" dirty="0"/>
-              <a:t>escribir </a:t>
-            </a:r>
-            <a:r>
-              <a:rPr lang="es-MX" sz="4400" dirty="0" smtClean="0"/>
-              <a:t>los número del 1 al 10.</a:t>
-            </a:r>
-          </a:p>
-          <a:p>
-            <a:pPr marL="0" indent="0">
-              <a:spcBef>
-                <a:spcPts val="0"/>
-              </a:spcBef>
-              <a:buNone/>
-            </a:pPr>
+              <a:t>Ejemplo con los números del 1 al 10</a:t>
+            </a:r>
             <a:endParaRPr lang="es-MX" sz="4400" dirty="0"/>
           </a:p>
           <a:p>
@@ -15468,7 +15057,14 @@
                 <a:latin typeface="Courier New" panose="02070309020205020404" pitchFamily="49" charset="0"/>
                 <a:cs typeface="Courier New" panose="02070309020205020404" pitchFamily="49" charset="0"/>
               </a:rPr>
-              <a:t>$contador = 1;</a:t>
+              <a:t>$contador = 1</a:t>
+            </a:r>
+            <a:r>
+              <a:rPr lang="es-MX" sz="4200" dirty="0" smtClean="0">
+                <a:latin typeface="Courier New" panose="02070309020205020404" pitchFamily="49" charset="0"/>
+                <a:cs typeface="Courier New" panose="02070309020205020404" pitchFamily="49" charset="0"/>
+              </a:rPr>
+              <a:t>;</a:t>
             </a:r>
           </a:p>
           <a:p>
@@ -15478,6 +15074,99 @@
               </a:spcBef>
               <a:buNone/>
             </a:pPr>
+            <a:r>
+              <a:rPr lang="es-MX" sz="4200" b="1" dirty="0" smtClean="0">
+                <a:latin typeface="Courier New" panose="02070309020205020404" pitchFamily="49" charset="0"/>
+                <a:cs typeface="Courier New" panose="02070309020205020404" pitchFamily="49" charset="0"/>
+              </a:rPr>
+              <a:t>do</a:t>
+            </a:r>
+            <a:endParaRPr lang="es-MX" sz="4200" b="1" dirty="0">
+              <a:latin typeface="Courier New" panose="02070309020205020404" pitchFamily="49" charset="0"/>
+              <a:cs typeface="Courier New" panose="02070309020205020404" pitchFamily="49" charset="0"/>
+            </a:endParaRPr>
+          </a:p>
+          <a:p>
+            <a:pPr marL="400050" lvl="1" indent="0">
+              <a:spcBef>
+                <a:spcPts val="0"/>
+              </a:spcBef>
+              <a:buNone/>
+            </a:pPr>
+            <a:r>
+              <a:rPr lang="es-MX" sz="4200" dirty="0" smtClean="0">
+                <a:latin typeface="Courier New" panose="02070309020205020404" pitchFamily="49" charset="0"/>
+                <a:cs typeface="Courier New" panose="02070309020205020404" pitchFamily="49" charset="0"/>
+              </a:rPr>
+              <a:t>{</a:t>
+            </a:r>
+            <a:endParaRPr lang="es-MX" sz="4200" dirty="0">
+              <a:latin typeface="Courier New" panose="02070309020205020404" pitchFamily="49" charset="0"/>
+              <a:cs typeface="Courier New" panose="02070309020205020404" pitchFamily="49" charset="0"/>
+            </a:endParaRPr>
+          </a:p>
+          <a:p>
+            <a:pPr marL="800100" lvl="2" indent="0">
+              <a:spcBef>
+                <a:spcPts val="0"/>
+              </a:spcBef>
+              <a:buNone/>
+            </a:pPr>
+            <a:r>
+              <a:rPr lang="es-MX" sz="4000" dirty="0">
+                <a:latin typeface="Courier New" panose="02070309020205020404" pitchFamily="49" charset="0"/>
+                <a:cs typeface="Courier New" panose="02070309020205020404" pitchFamily="49" charset="0"/>
+              </a:rPr>
+              <a:t>e</a:t>
+            </a:r>
+            <a:r>
+              <a:rPr lang="es-MX" sz="4000" dirty="0" smtClean="0">
+                <a:latin typeface="Courier New" panose="02070309020205020404" pitchFamily="49" charset="0"/>
+                <a:cs typeface="Courier New" panose="02070309020205020404" pitchFamily="49" charset="0"/>
+              </a:rPr>
+              <a:t>cho '$contador';</a:t>
+            </a:r>
+            <a:endParaRPr lang="es-MX" sz="4000" dirty="0">
+              <a:latin typeface="Courier New" panose="02070309020205020404" pitchFamily="49" charset="0"/>
+              <a:cs typeface="Courier New" panose="02070309020205020404" pitchFamily="49" charset="0"/>
+            </a:endParaRPr>
+          </a:p>
+          <a:p>
+            <a:pPr marL="800100" lvl="2" indent="0">
+              <a:spcBef>
+                <a:spcPts val="0"/>
+              </a:spcBef>
+              <a:buNone/>
+            </a:pPr>
+            <a:r>
+              <a:rPr lang="es-MX" sz="4000" dirty="0">
+                <a:latin typeface="Courier New" panose="02070309020205020404" pitchFamily="49" charset="0"/>
+                <a:cs typeface="Courier New" panose="02070309020205020404" pitchFamily="49" charset="0"/>
+              </a:rPr>
+              <a:t>$contador++;</a:t>
+            </a:r>
+          </a:p>
+          <a:p>
+            <a:pPr marL="400050" lvl="1" indent="0">
+              <a:spcBef>
+                <a:spcPts val="0"/>
+              </a:spcBef>
+              <a:buNone/>
+            </a:pPr>
+            <a:r>
+              <a:rPr lang="es-MX" sz="4200" dirty="0" smtClean="0">
+                <a:latin typeface="Courier New" panose="02070309020205020404" pitchFamily="49" charset="0"/>
+                <a:cs typeface="Courier New" panose="02070309020205020404" pitchFamily="49" charset="0"/>
+              </a:rPr>
+              <a:t>}</a:t>
+            </a:r>
+            <a:r>
+              <a:rPr lang="es-MX" sz="4200" dirty="0">
+                <a:latin typeface="Courier New" panose="02070309020205020404" pitchFamily="49" charset="0"/>
+                <a:cs typeface="Courier New" panose="02070309020205020404" pitchFamily="49" charset="0"/>
+              </a:rPr>
+              <a:t> </a:t>
+            </a:r>
             <a:r>
               <a:rPr lang="es-MX" sz="4200" b="1" dirty="0" err="1">
                 <a:latin typeface="Courier New" panose="02070309020205020404" pitchFamily="49" charset="0"/>
@@ -15490,77 +15179,14 @@
                 <a:latin typeface="Courier New" panose="02070309020205020404" pitchFamily="49" charset="0"/>
                 <a:cs typeface="Courier New" panose="02070309020205020404" pitchFamily="49" charset="0"/>
               </a:rPr>
-              <a:t> ($contador </a:t>
+              <a:t> ($contador &lt;= 10</a:t>
             </a:r>
             <a:r>
               <a:rPr lang="es-MX" sz="4200" dirty="0" smtClean="0">
                 <a:latin typeface="Courier New" panose="02070309020205020404" pitchFamily="49" charset="0"/>
                 <a:cs typeface="Courier New" panose="02070309020205020404" pitchFamily="49" charset="0"/>
               </a:rPr>
-              <a:t>&lt;= </a:t>
-            </a:r>
-            <a:r>
-              <a:rPr lang="es-MX" sz="4200" dirty="0">
-                <a:latin typeface="Courier New" panose="02070309020205020404" pitchFamily="49" charset="0"/>
-                <a:cs typeface="Courier New" panose="02070309020205020404" pitchFamily="49" charset="0"/>
-              </a:rPr>
-              <a:t>10) {</a:t>
-            </a:r>
-          </a:p>
-          <a:p>
-            <a:pPr marL="800100" lvl="2" indent="0">
-              <a:spcBef>
-                <a:spcPts val="0"/>
-              </a:spcBef>
-              <a:buNone/>
-            </a:pPr>
-            <a:r>
-              <a:rPr lang="es-MX" sz="4000" dirty="0">
-                <a:latin typeface="Courier New" panose="02070309020205020404" pitchFamily="49" charset="0"/>
-                <a:cs typeface="Courier New" panose="02070309020205020404" pitchFamily="49" charset="0"/>
-              </a:rPr>
-              <a:t>e</a:t>
-            </a:r>
-            <a:r>
-              <a:rPr lang="es-MX" sz="4000" dirty="0" smtClean="0">
-                <a:latin typeface="Courier New" panose="02070309020205020404" pitchFamily="49" charset="0"/>
-                <a:cs typeface="Courier New" panose="02070309020205020404" pitchFamily="49" charset="0"/>
-              </a:rPr>
-              <a:t>cho '$contador';</a:t>
-            </a:r>
-            <a:endParaRPr lang="es-MX" sz="4000" dirty="0">
-              <a:latin typeface="Courier New" panose="02070309020205020404" pitchFamily="49" charset="0"/>
-              <a:cs typeface="Courier New" panose="02070309020205020404" pitchFamily="49" charset="0"/>
-            </a:endParaRPr>
-          </a:p>
-          <a:p>
-            <a:pPr marL="800100" lvl="2" indent="0">
-              <a:spcBef>
-                <a:spcPts val="0"/>
-              </a:spcBef>
-              <a:buNone/>
-            </a:pPr>
-            <a:r>
-              <a:rPr lang="es-MX" sz="4000" dirty="0">
-                <a:latin typeface="Courier New" panose="02070309020205020404" pitchFamily="49" charset="0"/>
-                <a:cs typeface="Courier New" panose="02070309020205020404" pitchFamily="49" charset="0"/>
-              </a:rPr>
-              <a:t>$contador++;</a:t>
-            </a:r>
-          </a:p>
-          <a:p>
-            <a:pPr marL="400050" lvl="1" indent="0">
-              <a:spcBef>
-                <a:spcPts val="0"/>
-              </a:spcBef>
-              <a:buNone/>
-            </a:pPr>
-            <a:r>
-              <a:rPr lang="es-MX" sz="4200" dirty="0" smtClean="0">
-                <a:latin typeface="Courier New" panose="02070309020205020404" pitchFamily="49" charset="0"/>
-                <a:cs typeface="Courier New" panose="02070309020205020404" pitchFamily="49" charset="0"/>
-              </a:rPr>
-              <a:t>}</a:t>
+              <a:t>);</a:t>
             </a:r>
           </a:p>
           <a:p>
@@ -15611,38 +15237,99 @@
           </a:p>
           <a:p>
             <a:pPr marL="0" indent="0">
-              <a:spcBef>
-                <a:spcPts val="0"/>
-              </a:spcBef>
               <a:buNone/>
             </a:pPr>
             <a:r>
+              <a:rPr lang="es-MX" sz="4400" dirty="0" smtClean="0"/>
+              <a:t>La principal diferencia con los ciclos </a:t>
+            </a:r>
+            <a:r>
+              <a:rPr lang="es-MX" sz="4400" b="1" dirty="0" err="1" smtClean="0"/>
+              <a:t>while</a:t>
+            </a:r>
+            <a:r>
+              <a:rPr lang="es-MX" sz="4400" dirty="0" smtClean="0"/>
+              <a:t> y </a:t>
+            </a:r>
+            <a:r>
+              <a:rPr lang="es-MX" sz="4400" b="1" dirty="0" smtClean="0"/>
+              <a:t>do-</a:t>
+            </a:r>
+            <a:r>
+              <a:rPr lang="es-MX" sz="4400" b="1" dirty="0" err="1" smtClean="0"/>
+              <a:t>while</a:t>
+            </a:r>
+            <a:r>
+              <a:rPr lang="es-MX" sz="4400" dirty="0" smtClean="0"/>
+              <a:t>, en primer caso </a:t>
+            </a:r>
+            <a:r>
+              <a:rPr lang="es-MX" sz="4400" b="1" dirty="0" err="1"/>
+              <a:t>while</a:t>
+            </a:r>
+            <a:r>
               <a:rPr lang="es-MX" sz="4400" dirty="0"/>
-              <a:t>Observa la condición encerrada entre paréntesis: mientras sea verdadera, se ejecutará </a:t>
+              <a:t>, si la expresión condicional es </a:t>
             </a:r>
             <a:r>
               <a:rPr lang="es-MX" sz="4400" dirty="0" smtClean="0"/>
-              <a:t>el código </a:t>
+              <a:t>falsa en </a:t>
             </a:r>
             <a:r>
               <a:rPr lang="es-MX" sz="4400" dirty="0"/>
-              <a:t>entre las llaves. En cuanto la condición sea falsa, el </a:t>
+              <a:t>la primera pasada, el </a:t>
             </a:r>
             <a:r>
               <a:rPr lang="es-MX" sz="4400" dirty="0" smtClean="0"/>
-              <a:t>ciclo se </a:t>
+              <a:t>ciclo nunca </a:t>
             </a:r>
             <a:r>
               <a:rPr lang="es-MX" sz="4400" dirty="0"/>
-              <a:t>detiene y las líneas que </a:t>
+              <a:t>se ejecutará. En cambio, el </a:t>
             </a:r>
             <a:r>
               <a:rPr lang="es-MX" sz="4400" dirty="0" smtClean="0"/>
-              <a:t>le siguen </a:t>
+              <a:t>ciclo </a:t>
+            </a:r>
+            <a:r>
+              <a:rPr lang="es-MX" sz="4400" b="1" dirty="0" smtClean="0"/>
+              <a:t>do-</a:t>
+            </a:r>
+            <a:r>
+              <a:rPr lang="es-MX" sz="4400" b="1" dirty="0" err="1" smtClean="0"/>
+              <a:t>while</a:t>
+            </a:r>
+            <a:r>
+              <a:rPr lang="es-MX" sz="4400" dirty="0" smtClean="0"/>
+              <a:t> </a:t>
             </a:r>
             <a:r>
               <a:rPr lang="es-MX" sz="4400" dirty="0"/>
-              <a:t>se ejecutan de la manera usual.</a:t>
+              <a:t>siempre </a:t>
+            </a:r>
+            <a:r>
+              <a:rPr lang="es-MX" sz="4400" dirty="0" smtClean="0"/>
+              <a:t>se ejecutará </a:t>
+            </a:r>
+            <a:r>
+              <a:rPr lang="es-MX" sz="4400" dirty="0"/>
+              <a:t>por lo menos una vez, aunque la expresión condicional sea falsa, porque la </a:t>
+            </a:r>
+            <a:r>
+              <a:rPr lang="es-MX" sz="4400" dirty="0" smtClean="0"/>
+              <a:t>condición se </a:t>
+            </a:r>
+            <a:r>
+              <a:rPr lang="es-MX" sz="4400" dirty="0"/>
+              <a:t>evalúa al final de la repetición del </a:t>
+            </a:r>
+            <a:r>
+              <a:rPr lang="es-MX" sz="4400" dirty="0" smtClean="0"/>
+              <a:t>ciclo y </a:t>
+            </a:r>
+            <a:r>
+              <a:rPr lang="es-MX" sz="4400" dirty="0"/>
+              <a:t>no al principio.</a:t>
             </a:r>
           </a:p>
         </p:txBody>
@@ -15650,7 +15337,7 @@
     </p:spTree>
     <p:extLst>
       <p:ext uri="{BB962C8B-B14F-4D97-AF65-F5344CB8AC3E}">
-        <p14:creationId xmlns:p14="http://schemas.microsoft.com/office/powerpoint/2010/main" val="3521697758"/>
+        <p14:creationId xmlns:p14="http://schemas.microsoft.com/office/powerpoint/2010/main" val="812291226"/>
       </p:ext>
     </p:extLst>
   </p:cSld>

</xml_diff>